<commit_message>
Ftrs Engg ppt update
</commit_message>
<xml_diff>
--- a/presentations/Feature_Engineering_ML_SSA19.pptx
+++ b/presentations/Feature_Engineering_ML_SSA19.pptx
@@ -5,7 +5,7 @@
     <p:sldMasterId id="2147483648" r:id="rId1"/>
   </p:sldMasterIdLst>
   <p:notesMasterIdLst>
-    <p:notesMasterId r:id="rId27"/>
+    <p:notesMasterId r:id="rId28"/>
   </p:notesMasterIdLst>
   <p:sldIdLst>
     <p:sldId id="256" r:id="rId2"/>
@@ -31,8 +31,9 @@
     <p:sldId id="272" r:id="rId22"/>
     <p:sldId id="277" r:id="rId23"/>
     <p:sldId id="273" r:id="rId24"/>
-    <p:sldId id="257" r:id="rId25"/>
-    <p:sldId id="258" r:id="rId26"/>
+    <p:sldId id="281" r:id="rId25"/>
+    <p:sldId id="257" r:id="rId26"/>
+    <p:sldId id="258" r:id="rId27"/>
   </p:sldIdLst>
   <p:sldSz cx="12192000" cy="6858000"/>
   <p:notesSz cx="6858000" cy="9144000"/>
@@ -221,7 +222,7 @@
           <a:p>
             <a:fld id="{FEB909F9-03D2-0440-B8E0-F1611228BF6C}" type="datetimeFigureOut">
               <a:rPr lang="en-US" smtClean="0"/>
-              <a:t>4/16/19</a:t>
+              <a:t>4/17/19</a:t>
             </a:fld>
             <a:endParaRPr lang="en-US"/>
           </a:p>
@@ -853,7 +854,7 @@
           <a:p>
             <a:fld id="{C33EC7A1-935E-D748-85B9-D6F830ED6136}" type="datetimeFigureOut">
               <a:rPr lang="en-US" smtClean="0"/>
-              <a:t>4/16/19</a:t>
+              <a:t>4/17/19</a:t>
             </a:fld>
             <a:endParaRPr lang="en-US"/>
           </a:p>
@@ -1051,7 +1052,7 @@
           <a:p>
             <a:fld id="{C33EC7A1-935E-D748-85B9-D6F830ED6136}" type="datetimeFigureOut">
               <a:rPr lang="en-US" smtClean="0"/>
-              <a:t>4/16/19</a:t>
+              <a:t>4/17/19</a:t>
             </a:fld>
             <a:endParaRPr lang="en-US"/>
           </a:p>
@@ -1259,7 +1260,7 @@
           <a:p>
             <a:fld id="{C33EC7A1-935E-D748-85B9-D6F830ED6136}" type="datetimeFigureOut">
               <a:rPr lang="en-US" smtClean="0"/>
-              <a:t>4/16/19</a:t>
+              <a:t>4/17/19</a:t>
             </a:fld>
             <a:endParaRPr lang="en-US"/>
           </a:p>
@@ -1457,7 +1458,7 @@
           <a:p>
             <a:fld id="{C33EC7A1-935E-D748-85B9-D6F830ED6136}" type="datetimeFigureOut">
               <a:rPr lang="en-US" smtClean="0"/>
-              <a:t>4/16/19</a:t>
+              <a:t>4/17/19</a:t>
             </a:fld>
             <a:endParaRPr lang="en-US"/>
           </a:p>
@@ -1732,7 +1733,7 @@
           <a:p>
             <a:fld id="{C33EC7A1-935E-D748-85B9-D6F830ED6136}" type="datetimeFigureOut">
               <a:rPr lang="en-US" smtClean="0"/>
-              <a:t>4/16/19</a:t>
+              <a:t>4/17/19</a:t>
             </a:fld>
             <a:endParaRPr lang="en-US"/>
           </a:p>
@@ -1997,7 +1998,7 @@
           <a:p>
             <a:fld id="{C33EC7A1-935E-D748-85B9-D6F830ED6136}" type="datetimeFigureOut">
               <a:rPr lang="en-US" smtClean="0"/>
-              <a:t>4/16/19</a:t>
+              <a:t>4/17/19</a:t>
             </a:fld>
             <a:endParaRPr lang="en-US"/>
           </a:p>
@@ -2409,7 +2410,7 @@
           <a:p>
             <a:fld id="{C33EC7A1-935E-D748-85B9-D6F830ED6136}" type="datetimeFigureOut">
               <a:rPr lang="en-US" smtClean="0"/>
-              <a:t>4/16/19</a:t>
+              <a:t>4/17/19</a:t>
             </a:fld>
             <a:endParaRPr lang="en-US"/>
           </a:p>
@@ -2550,7 +2551,7 @@
           <a:p>
             <a:fld id="{C33EC7A1-935E-D748-85B9-D6F830ED6136}" type="datetimeFigureOut">
               <a:rPr lang="en-US" smtClean="0"/>
-              <a:t>4/16/19</a:t>
+              <a:t>4/17/19</a:t>
             </a:fld>
             <a:endParaRPr lang="en-US"/>
           </a:p>
@@ -2663,7 +2664,7 @@
           <a:p>
             <a:fld id="{C33EC7A1-935E-D748-85B9-D6F830ED6136}" type="datetimeFigureOut">
               <a:rPr lang="en-US" smtClean="0"/>
-              <a:t>4/16/19</a:t>
+              <a:t>4/17/19</a:t>
             </a:fld>
             <a:endParaRPr lang="en-US"/>
           </a:p>
@@ -2974,7 +2975,7 @@
           <a:p>
             <a:fld id="{C33EC7A1-935E-D748-85B9-D6F830ED6136}" type="datetimeFigureOut">
               <a:rPr lang="en-US" smtClean="0"/>
-              <a:t>4/16/19</a:t>
+              <a:t>4/17/19</a:t>
             </a:fld>
             <a:endParaRPr lang="en-US"/>
           </a:p>
@@ -3262,7 +3263,7 @@
           <a:p>
             <a:fld id="{C33EC7A1-935E-D748-85B9-D6F830ED6136}" type="datetimeFigureOut">
               <a:rPr lang="en-US" smtClean="0"/>
-              <a:t>4/16/19</a:t>
+              <a:t>4/17/19</a:t>
             </a:fld>
             <a:endParaRPr lang="en-US"/>
           </a:p>
@@ -3503,7 +3504,7 @@
           <a:p>
             <a:fld id="{C33EC7A1-935E-D748-85B9-D6F830ED6136}" type="datetimeFigureOut">
               <a:rPr lang="en-US" smtClean="0"/>
-              <a:t>4/16/19</a:t>
+              <a:t>4/17/19</a:t>
             </a:fld>
             <a:endParaRPr lang="en-US"/>
           </a:p>
@@ -4100,7 +4101,7 @@
           <a:effectLst/>
           <a:extLst>
             <a:ext uri="{909E8E84-426E-40dd-AFC4-6F175D3DCCD1}">
-              <a14:hiddenFill xmlns:a14="http://schemas.microsoft.com/office/drawing/2010/main" xmlns="">
+              <a14:hiddenFill xmlns="" xmlns:a14="http://schemas.microsoft.com/office/drawing/2010/main">
                 <a:solidFill>
                   <a:srgbClr val="FFFFFF"/>
                 </a:solidFill>
@@ -6359,6 +6360,92 @@
           <p:cNvPr id="2" name="Title 1">
             <a:extLst>
               <a:ext uri="{FF2B5EF4-FFF2-40B4-BE49-F238E27FC236}">
+                <a16:creationId xmlns:a16="http://schemas.microsoft.com/office/drawing/2014/main" id="{24BCF473-821F-E846-841E-C625AFF0FFD5}"/>
+              </a:ext>
+            </a:extLst>
+          </p:cNvPr>
+          <p:cNvSpPr>
+            <a:spLocks noGrp="1"/>
+          </p:cNvSpPr>
+          <p:nvPr>
+            <p:ph type="title"/>
+          </p:nvPr>
+        </p:nvSpPr>
+        <p:spPr>
+          <a:xfrm>
+            <a:off x="838200" y="2510448"/>
+            <a:ext cx="10515600" cy="1325563"/>
+          </a:xfrm>
+        </p:spPr>
+        <p:txBody>
+          <a:bodyPr>
+            <a:normAutofit/>
+          </a:bodyPr>
+          <a:lstStyle/>
+          <a:p>
+            <a:pPr algn="ctr"/>
+            <a:r>
+              <a:rPr lang="en-US" sz="8000" dirty="0">
+                <a:solidFill>
+                  <a:srgbClr val="0070C0"/>
+                </a:solidFill>
+              </a:rPr>
+              <a:t> </a:t>
+            </a:r>
+            <a:r>
+              <a:rPr lang="en-US" sz="8000" b="1" dirty="0">
+                <a:solidFill>
+                  <a:srgbClr val="0070C0"/>
+                </a:solidFill>
+              </a:rPr>
+              <a:t>Questions</a:t>
+            </a:r>
+            <a:r>
+              <a:rPr lang="en-US" sz="8000" dirty="0">
+                <a:solidFill>
+                  <a:srgbClr val="0070C0"/>
+                </a:solidFill>
+              </a:rPr>
+              <a:t>?</a:t>
+            </a:r>
+          </a:p>
+        </p:txBody>
+      </p:sp>
+    </p:spTree>
+    <p:extLst>
+      <p:ext uri="{BB962C8B-B14F-4D97-AF65-F5344CB8AC3E}">
+        <p14:creationId xmlns:p14="http://schemas.microsoft.com/office/powerpoint/2010/main" val="2476179661"/>
+      </p:ext>
+    </p:extLst>
+  </p:cSld>
+  <p:clrMapOvr>
+    <a:masterClrMapping/>
+  </p:clrMapOvr>
+</p:sld>
+</file>
+
+<file path=ppt/slides/slide25.xml><?xml version="1.0" encoding="utf-8"?>
+<p:sld xmlns:a="http://schemas.openxmlformats.org/drawingml/2006/main" xmlns:r="http://schemas.openxmlformats.org/officeDocument/2006/relationships" xmlns:p="http://schemas.openxmlformats.org/presentationml/2006/main">
+  <p:cSld>
+    <p:spTree>
+      <p:nvGrpSpPr>
+        <p:cNvPr id="1" name=""/>
+        <p:cNvGrpSpPr/>
+        <p:nvPr/>
+      </p:nvGrpSpPr>
+      <p:grpSpPr>
+        <a:xfrm>
+          <a:off x="0" y="0"/>
+          <a:ext cx="0" cy="0"/>
+          <a:chOff x="0" y="0"/>
+          <a:chExt cx="0" cy="0"/>
+        </a:xfrm>
+      </p:grpSpPr>
+      <p:sp>
+        <p:nvSpPr>
+          <p:cNvPr id="2" name="Title 1">
+            <a:extLst>
+              <a:ext uri="{FF2B5EF4-FFF2-40B4-BE49-F238E27FC236}">
                 <a16:creationId xmlns:a16="http://schemas.microsoft.com/office/drawing/2014/main" id="{D39A7480-940B-064B-A2DB-97503F2BB48E}"/>
               </a:ext>
             </a:extLst>
@@ -6450,7 +6537,7 @@
 </p:sld>
 </file>
 
-<file path=ppt/slides/slide25.xml><?xml version="1.0" encoding="utf-8"?>
+<file path=ppt/slides/slide26.xml><?xml version="1.0" encoding="utf-8"?>
 <p:sld xmlns:a="http://schemas.openxmlformats.org/drawingml/2006/main" xmlns:r="http://schemas.openxmlformats.org/officeDocument/2006/relationships" xmlns:p="http://schemas.openxmlformats.org/presentationml/2006/main">
   <p:cSld>
     <p:spTree>

</xml_diff>

<commit_message>
Ftrs engg and selection ppt update
</commit_message>
<xml_diff>
--- a/presentations/Feature_Engineering_ML_SSA19.pptx
+++ b/presentations/Feature_Engineering_ML_SSA19.pptx
@@ -5,7 +5,7 @@
     <p:sldMasterId id="2147483648" r:id="rId1"/>
   </p:sldMasterIdLst>
   <p:notesMasterIdLst>
-    <p:notesMasterId r:id="rId28"/>
+    <p:notesMasterId r:id="rId30"/>
   </p:notesMasterIdLst>
   <p:sldIdLst>
     <p:sldId id="256" r:id="rId2"/>
@@ -21,19 +21,21 @@
     <p:sldId id="280" r:id="rId12"/>
     <p:sldId id="279" r:id="rId13"/>
     <p:sldId id="265" r:id="rId14"/>
-    <p:sldId id="276" r:id="rId15"/>
-    <p:sldId id="266" r:id="rId16"/>
-    <p:sldId id="267" r:id="rId17"/>
-    <p:sldId id="268" r:id="rId18"/>
-    <p:sldId id="269" r:id="rId19"/>
-    <p:sldId id="270" r:id="rId20"/>
-    <p:sldId id="271" r:id="rId21"/>
-    <p:sldId id="272" r:id="rId22"/>
-    <p:sldId id="277" r:id="rId23"/>
-    <p:sldId id="273" r:id="rId24"/>
-    <p:sldId id="281" r:id="rId25"/>
-    <p:sldId id="257" r:id="rId26"/>
-    <p:sldId id="258" r:id="rId27"/>
+    <p:sldId id="283" r:id="rId15"/>
+    <p:sldId id="284" r:id="rId16"/>
+    <p:sldId id="282" r:id="rId17"/>
+    <p:sldId id="276" r:id="rId18"/>
+    <p:sldId id="266" r:id="rId19"/>
+    <p:sldId id="267" r:id="rId20"/>
+    <p:sldId id="268" r:id="rId21"/>
+    <p:sldId id="269" r:id="rId22"/>
+    <p:sldId id="271" r:id="rId23"/>
+    <p:sldId id="272" r:id="rId24"/>
+    <p:sldId id="277" r:id="rId25"/>
+    <p:sldId id="273" r:id="rId26"/>
+    <p:sldId id="281" r:id="rId27"/>
+    <p:sldId id="257" r:id="rId28"/>
+    <p:sldId id="258" r:id="rId29"/>
   </p:sldIdLst>
   <p:sldSz cx="12192000" cy="6858000"/>
   <p:notesSz cx="6858000" cy="9144000"/>
@@ -4101,7 +4103,7 @@
           <a:effectLst/>
           <a:extLst>
             <a:ext uri="{909E8E84-426E-40dd-AFC4-6F175D3DCCD1}">
-              <a14:hiddenFill xmlns="" xmlns:a14="http://schemas.microsoft.com/office/drawing/2010/main">
+              <a14:hiddenFill xmlns:a14="http://schemas.microsoft.com/office/drawing/2010/main" xmlns="">
                 <a:solidFill>
                   <a:srgbClr val="FFFFFF"/>
                 </a:solidFill>
@@ -5041,9 +5043,16 @@
             <p:ph type="title"/>
           </p:nvPr>
         </p:nvSpPr>
-        <p:spPr/>
-        <p:txBody>
-          <a:bodyPr/>
+        <p:spPr>
+          <a:xfrm>
+            <a:off x="69795" y="11659"/>
+            <a:ext cx="12040241" cy="895057"/>
+          </a:xfrm>
+        </p:spPr>
+        <p:txBody>
+          <a:bodyPr>
+            <a:normAutofit/>
+          </a:bodyPr>
           <a:lstStyle/>
           <a:p>
             <a:r>
@@ -5060,7 +5069,23 @@
                   <a:srgbClr val="0070C0"/>
                 </a:solidFill>
               </a:rPr>
-              <a:t> – Feature selection</a:t>
+              <a:t> – Feature selection basics (</a:t>
+            </a:r>
+            <a:r>
+              <a:rPr lang="en-US" b="1" dirty="0" err="1">
+                <a:solidFill>
+                  <a:srgbClr val="0070C0"/>
+                </a:solidFill>
+              </a:rPr>
+              <a:t>select_features</a:t>
+            </a:r>
+            <a:r>
+              <a:rPr lang="en-US" b="1" dirty="0">
+                <a:solidFill>
+                  <a:srgbClr val="0070C0"/>
+                </a:solidFill>
+              </a:rPr>
+              <a:t>)</a:t>
             </a:r>
           </a:p>
         </p:txBody>
@@ -5081,10 +5106,15 @@
             <p:ph idx="1"/>
           </p:nvPr>
         </p:nvSpPr>
-        <p:spPr/>
+        <p:spPr>
+          <a:xfrm>
+            <a:off x="69796" y="981103"/>
+            <a:ext cx="12040240" cy="4794838"/>
+          </a:xfrm>
+        </p:spPr>
         <p:txBody>
           <a:bodyPr>
-            <a:normAutofit fontScale="92500"/>
+            <a:normAutofit fontScale="92500" lnSpcReduction="10000"/>
           </a:bodyPr>
           <a:lstStyle/>
           <a:p>
@@ -5122,11 +5152,117 @@
           <a:p>
             <a:r>
               <a:rPr lang="en-US" dirty="0"/>
-              <a:t>It is based on the well developed theory of hypothesis testing and uses a multiple test procedure. As a result the filtering process mathematically controls the percentage of irrelevant extracted features.</a:t>
-            </a:r>
-          </a:p>
-        </p:txBody>
-      </p:sp>
+              <a:t>It is based on the well developed theory of hypothesis testing and uses a multiple test procedure. </a:t>
+            </a:r>
+          </a:p>
+          <a:p>
+            <a:r>
+              <a:rPr lang="en-US" dirty="0"/>
+              <a:t>As a result the filtering process mathematically controls the percentage of irrelevant extracted features.</a:t>
+            </a:r>
+          </a:p>
+          <a:p>
+            <a:r>
+              <a:rPr lang="en-US" b="1" dirty="0"/>
+              <a:t>from </a:t>
+            </a:r>
+            <a:r>
+              <a:rPr lang="en-US" b="1" dirty="0" err="1"/>
+              <a:t>tsfresh</a:t>
+            </a:r>
+            <a:r>
+              <a:rPr lang="en-US" b="1" dirty="0"/>
+              <a:t> import </a:t>
+            </a:r>
+            <a:r>
+              <a:rPr lang="en-US" b="1" dirty="0" err="1"/>
+              <a:t>select_features</a:t>
+            </a:r>
+            <a:endParaRPr lang="en-US" b="1" dirty="0"/>
+          </a:p>
+        </p:txBody>
+      </p:sp>
+      <p:grpSp>
+        <p:nvGrpSpPr>
+          <p:cNvPr id="8" name="Group 7">
+            <a:extLst>
+              <a:ext uri="{FF2B5EF4-FFF2-40B4-BE49-F238E27FC236}">
+                <a16:creationId xmlns:a16="http://schemas.microsoft.com/office/drawing/2014/main" id="{EBD5FC86-7EBB-5342-B105-ED6BB1AA6358}"/>
+              </a:ext>
+            </a:extLst>
+          </p:cNvPr>
+          <p:cNvGrpSpPr/>
+          <p:nvPr/>
+        </p:nvGrpSpPr>
+        <p:grpSpPr>
+          <a:xfrm>
+            <a:off x="1860550" y="5885438"/>
+            <a:ext cx="8470900" cy="766737"/>
+            <a:chOff x="1860550" y="5332187"/>
+            <a:chExt cx="8470900" cy="766737"/>
+          </a:xfrm>
+        </p:grpSpPr>
+        <p:pic>
+          <p:nvPicPr>
+            <p:cNvPr id="5" name="Picture 4">
+              <a:extLst>
+                <a:ext uri="{FF2B5EF4-FFF2-40B4-BE49-F238E27FC236}">
+                  <a16:creationId xmlns:a16="http://schemas.microsoft.com/office/drawing/2014/main" id="{7E5DB106-A0B6-5F4F-BB9C-91D4C127B67B}"/>
+                </a:ext>
+              </a:extLst>
+            </p:cNvPr>
+            <p:cNvPicPr>
+              <a:picLocks noChangeAspect="1"/>
+            </p:cNvPicPr>
+            <p:nvPr/>
+          </p:nvPicPr>
+          <p:blipFill>
+            <a:blip r:embed="rId2"/>
+            <a:stretch>
+              <a:fillRect/>
+            </a:stretch>
+          </p:blipFill>
+          <p:spPr>
+            <a:xfrm>
+              <a:off x="1860550" y="5551182"/>
+              <a:ext cx="8470900" cy="547742"/>
+            </a:xfrm>
+            <a:prstGeom prst="rect">
+              <a:avLst/>
+            </a:prstGeom>
+          </p:spPr>
+        </p:pic>
+        <p:pic>
+          <p:nvPicPr>
+            <p:cNvPr id="7" name="Picture 6">
+              <a:extLst>
+                <a:ext uri="{FF2B5EF4-FFF2-40B4-BE49-F238E27FC236}">
+                  <a16:creationId xmlns:a16="http://schemas.microsoft.com/office/drawing/2014/main" id="{132536D9-7139-F842-A157-C02D3394B338}"/>
+                </a:ext>
+              </a:extLst>
+            </p:cNvPr>
+            <p:cNvPicPr>
+              <a:picLocks noChangeAspect="1"/>
+            </p:cNvPicPr>
+            <p:nvPr/>
+          </p:nvPicPr>
+          <p:blipFill>
+            <a:blip r:embed="rId3"/>
+            <a:stretch>
+              <a:fillRect/>
+            </a:stretch>
+          </p:blipFill>
+          <p:spPr>
+            <a:xfrm>
+              <a:off x="1860550" y="5332187"/>
+              <a:ext cx="8470900" cy="228600"/>
+            </a:xfrm>
+            <a:prstGeom prst="rect">
+              <a:avLst/>
+            </a:prstGeom>
+          </p:spPr>
+        </p:pic>
+      </p:grpSp>
     </p:spTree>
     <p:extLst>
       <p:ext uri="{BB962C8B-B14F-4D97-AF65-F5344CB8AC3E}">
@@ -5173,9 +5309,16 @@
             <p:ph type="title"/>
           </p:nvPr>
         </p:nvSpPr>
-        <p:spPr/>
-        <p:txBody>
-          <a:bodyPr/>
+        <p:spPr>
+          <a:xfrm>
+            <a:off x="69796" y="417826"/>
+            <a:ext cx="10515600" cy="662782"/>
+          </a:xfrm>
+        </p:spPr>
+        <p:txBody>
+          <a:bodyPr>
+            <a:noAutofit/>
+          </a:bodyPr>
           <a:lstStyle/>
           <a:p>
             <a:r>
@@ -5192,7 +5335,594 @@
                   <a:srgbClr val="0070C0"/>
                 </a:solidFill>
               </a:rPr>
-              <a:t> – Feature selection</a:t>
+              <a:t> – Feature selection </a:t>
+            </a:r>
+            <a:r>
+              <a:rPr lang="en-US" sz="4000" b="1" dirty="0">
+                <a:solidFill>
+                  <a:srgbClr val="0070C0"/>
+                </a:solidFill>
+              </a:rPr>
+              <a:t>(null hypothesis)</a:t>
+            </a:r>
+          </a:p>
+        </p:txBody>
+      </p:sp>
+      <p:sp>
+        <p:nvSpPr>
+          <p:cNvPr id="3" name="Content Placeholder 2">
+            <a:extLst>
+              <a:ext uri="{FF2B5EF4-FFF2-40B4-BE49-F238E27FC236}">
+                <a16:creationId xmlns:a16="http://schemas.microsoft.com/office/drawing/2014/main" id="{F21F1551-71FB-9546-80F4-DFF7DA1697AE}"/>
+              </a:ext>
+            </a:extLst>
+          </p:cNvPr>
+          <p:cNvSpPr>
+            <a:spLocks noGrp="1"/>
+          </p:cNvSpPr>
+          <p:nvPr>
+            <p:ph idx="1"/>
+          </p:nvPr>
+        </p:nvSpPr>
+        <p:spPr>
+          <a:xfrm>
+            <a:off x="69796" y="1671944"/>
+            <a:ext cx="11855823" cy="3975821"/>
+          </a:xfrm>
+        </p:spPr>
+        <p:txBody>
+          <a:bodyPr>
+            <a:normAutofit/>
+          </a:bodyPr>
+          <a:lstStyle/>
+          <a:p>
+            <a:r>
+              <a:rPr lang="en-US" dirty="0"/>
+              <a:t>Each feature vector is evaluated individually and independently based on its importance for predicting the target or class label.</a:t>
+            </a:r>
+          </a:p>
+          <a:p>
+            <a:r>
+              <a:rPr lang="en-US" dirty="0"/>
+              <a:t>We are testing</a:t>
+            </a:r>
+          </a:p>
+          <a:p>
+            <a:pPr lvl="1"/>
+            <a:r>
+              <a:rPr lang="en-US" dirty="0"/>
+              <a:t>H</a:t>
+            </a:r>
+            <a:r>
+              <a:rPr lang="en-US" baseline="-25000" dirty="0"/>
+              <a:t>0</a:t>
+            </a:r>
+            <a:r>
+              <a:rPr lang="en-US" dirty="0"/>
+              <a:t> = the Feature is not relevant and should not be added</a:t>
+            </a:r>
+          </a:p>
+          <a:p>
+            <a:r>
+              <a:rPr lang="en-US" dirty="0"/>
+              <a:t>against the following</a:t>
+            </a:r>
+          </a:p>
+          <a:p>
+            <a:pPr lvl="1"/>
+            <a:r>
+              <a:rPr lang="en-US" dirty="0"/>
+              <a:t>H</a:t>
+            </a:r>
+            <a:r>
+              <a:rPr lang="en-US" baseline="-25000" dirty="0"/>
+              <a:t>1</a:t>
+            </a:r>
+            <a:r>
+              <a:rPr lang="en-US" dirty="0"/>
+              <a:t> = the Feature is relevant and should be kept</a:t>
+            </a:r>
+          </a:p>
+          <a:p>
+            <a:r>
+              <a:rPr lang="en-US" dirty="0"/>
+              <a:t>Or in other words</a:t>
+            </a:r>
+          </a:p>
+          <a:p>
+            <a:pPr lvl="1"/>
+            <a:r>
+              <a:rPr lang="en-US" dirty="0"/>
+              <a:t>H</a:t>
+            </a:r>
+            <a:r>
+              <a:rPr lang="en-US" baseline="-25000" dirty="0"/>
+              <a:t>0</a:t>
+            </a:r>
+            <a:r>
+              <a:rPr lang="en-US" dirty="0"/>
+              <a:t> = Target and Feature are independent / the Feature has no influence on the target</a:t>
+            </a:r>
+          </a:p>
+          <a:p>
+            <a:pPr lvl="1"/>
+            <a:r>
+              <a:rPr lang="en-US" dirty="0"/>
+              <a:t>H</a:t>
+            </a:r>
+            <a:r>
+              <a:rPr lang="en-US" baseline="-25000" dirty="0"/>
+              <a:t>1</a:t>
+            </a:r>
+            <a:r>
+              <a:rPr lang="en-US" dirty="0"/>
+              <a:t> = Target and Feature are associated / dependent</a:t>
+            </a:r>
+          </a:p>
+        </p:txBody>
+      </p:sp>
+    </p:spTree>
+    <p:extLst>
+      <p:ext uri="{BB962C8B-B14F-4D97-AF65-F5344CB8AC3E}">
+        <p14:creationId xmlns:p14="http://schemas.microsoft.com/office/powerpoint/2010/main" val="3845737687"/>
+      </p:ext>
+    </p:extLst>
+  </p:cSld>
+  <p:clrMapOvr>
+    <a:masterClrMapping/>
+  </p:clrMapOvr>
+</p:sld>
+</file>
+
+<file path=ppt/slides/slide15.xml><?xml version="1.0" encoding="utf-8"?>
+<p:sld xmlns:a="http://schemas.openxmlformats.org/drawingml/2006/main" xmlns:r="http://schemas.openxmlformats.org/officeDocument/2006/relationships" xmlns:p="http://schemas.openxmlformats.org/presentationml/2006/main">
+  <p:cSld>
+    <p:spTree>
+      <p:nvGrpSpPr>
+        <p:cNvPr id="1" name=""/>
+        <p:cNvGrpSpPr/>
+        <p:nvPr/>
+      </p:nvGrpSpPr>
+      <p:grpSpPr>
+        <a:xfrm>
+          <a:off x="0" y="0"/>
+          <a:ext cx="0" cy="0"/>
+          <a:chOff x="0" y="0"/>
+          <a:chExt cx="0" cy="0"/>
+        </a:xfrm>
+      </p:grpSpPr>
+      <p:sp>
+        <p:nvSpPr>
+          <p:cNvPr id="2" name="Title 1">
+            <a:extLst>
+              <a:ext uri="{FF2B5EF4-FFF2-40B4-BE49-F238E27FC236}">
+                <a16:creationId xmlns:a16="http://schemas.microsoft.com/office/drawing/2014/main" id="{01560502-1667-5140-AF58-5D0A5B061D91}"/>
+              </a:ext>
+            </a:extLst>
+          </p:cNvPr>
+          <p:cNvSpPr>
+            <a:spLocks noGrp="1"/>
+          </p:cNvSpPr>
+          <p:nvPr>
+            <p:ph type="title"/>
+          </p:nvPr>
+        </p:nvSpPr>
+        <p:spPr>
+          <a:xfrm>
+            <a:off x="399570" y="348669"/>
+            <a:ext cx="10515600" cy="662782"/>
+          </a:xfrm>
+        </p:spPr>
+        <p:txBody>
+          <a:bodyPr>
+            <a:noAutofit/>
+          </a:bodyPr>
+          <a:lstStyle/>
+          <a:p>
+            <a:r>
+              <a:rPr lang="en-US" b="1" dirty="0" err="1">
+                <a:solidFill>
+                  <a:srgbClr val="0070C0"/>
+                </a:solidFill>
+              </a:rPr>
+              <a:t>tsfresh</a:t>
+            </a:r>
+            <a:r>
+              <a:rPr lang="en-US" b="1" dirty="0">
+                <a:solidFill>
+                  <a:srgbClr val="0070C0"/>
+                </a:solidFill>
+              </a:rPr>
+              <a:t> – Feature selection </a:t>
+            </a:r>
+            <a:r>
+              <a:rPr lang="en-US" sz="4000" b="1" dirty="0">
+                <a:solidFill>
+                  <a:srgbClr val="0070C0"/>
+                </a:solidFill>
+              </a:rPr>
+              <a:t>(p-value)</a:t>
+            </a:r>
+          </a:p>
+        </p:txBody>
+      </p:sp>
+      <p:sp>
+        <p:nvSpPr>
+          <p:cNvPr id="3" name="Content Placeholder 2">
+            <a:extLst>
+              <a:ext uri="{FF2B5EF4-FFF2-40B4-BE49-F238E27FC236}">
+                <a16:creationId xmlns:a16="http://schemas.microsoft.com/office/drawing/2014/main" id="{F21F1551-71FB-9546-80F4-DFF7DA1697AE}"/>
+              </a:ext>
+            </a:extLst>
+          </p:cNvPr>
+          <p:cNvSpPr>
+            <a:spLocks noGrp="1"/>
+          </p:cNvSpPr>
+          <p:nvPr>
+            <p:ph idx="1"/>
+          </p:nvPr>
+        </p:nvSpPr>
+        <p:spPr>
+          <a:xfrm>
+            <a:off x="168088" y="1771836"/>
+            <a:ext cx="11918897" cy="4575176"/>
+          </a:xfrm>
+        </p:spPr>
+        <p:txBody>
+          <a:bodyPr>
+            <a:normAutofit/>
+          </a:bodyPr>
+          <a:lstStyle/>
+          <a:p>
+            <a:r>
+              <a:rPr lang="en-US" dirty="0"/>
+              <a:t>When you perform a hypothesis test in statistics, a </a:t>
+            </a:r>
+            <a:r>
+              <a:rPr lang="en-US" b="1" dirty="0"/>
+              <a:t>p</a:t>
+            </a:r>
+            <a:r>
+              <a:rPr lang="en-US" dirty="0"/>
+              <a:t>-</a:t>
+            </a:r>
+            <a:r>
+              <a:rPr lang="en-US" b="1" dirty="0"/>
+              <a:t>value</a:t>
+            </a:r>
+            <a:r>
+              <a:rPr lang="en-US" dirty="0"/>
+              <a:t> helps you determine the significance of your results. </a:t>
+            </a:r>
+          </a:p>
+          <a:p>
+            <a:r>
+              <a:rPr lang="en-US" dirty="0"/>
+              <a:t>The </a:t>
+            </a:r>
+            <a:r>
+              <a:rPr lang="en-US" b="1" dirty="0"/>
+              <a:t>p</a:t>
+            </a:r>
+            <a:r>
+              <a:rPr lang="en-US" dirty="0"/>
+              <a:t>-</a:t>
+            </a:r>
+            <a:r>
+              <a:rPr lang="en-US" b="1" dirty="0"/>
+              <a:t>value</a:t>
+            </a:r>
+            <a:r>
+              <a:rPr lang="en-US" dirty="0"/>
+              <a:t> is a number between 0 and 1 and interpreted in the following way: </a:t>
+            </a:r>
+          </a:p>
+          <a:p>
+            <a:pPr lvl="1"/>
+            <a:r>
+              <a:rPr lang="en-US" dirty="0"/>
+              <a:t>A </a:t>
+            </a:r>
+            <a:r>
+              <a:rPr lang="en-US" b="1" dirty="0"/>
+              <a:t>small p</a:t>
+            </a:r>
+            <a:r>
+              <a:rPr lang="en-US" dirty="0"/>
+              <a:t>-</a:t>
+            </a:r>
+            <a:r>
+              <a:rPr lang="en-US" b="1" dirty="0"/>
+              <a:t>value</a:t>
+            </a:r>
+            <a:r>
+              <a:rPr lang="en-US" dirty="0"/>
+              <a:t> (typically ≤ 0.05) indicates strong evidence against the null hypothesis that the feature is not relevant and should not be added</a:t>
+            </a:r>
+          </a:p>
+          <a:p>
+            <a:pPr lvl="1"/>
+            <a:r>
+              <a:rPr lang="en-US" dirty="0"/>
+              <a:t>Meaning that, we reject the null hypothesis and the feature should be kept.</a:t>
+            </a:r>
+          </a:p>
+          <a:p>
+            <a:pPr lvl="1"/>
+            <a:r>
+              <a:rPr lang="en-US" dirty="0"/>
+              <a:t>A </a:t>
+            </a:r>
+            <a:r>
+              <a:rPr lang="en-US" b="1" dirty="0"/>
+              <a:t>large p-value </a:t>
+            </a:r>
+            <a:r>
+              <a:rPr lang="en-US" dirty="0"/>
+              <a:t>(&gt;0.05) indicates weak evidence against the null hypothesis, so we fail to reject the null hypothesis.</a:t>
+            </a:r>
+          </a:p>
+          <a:p>
+            <a:r>
+              <a:rPr lang="en-US" dirty="0"/>
+              <a:t>Always report the </a:t>
+            </a:r>
+            <a:r>
+              <a:rPr lang="en-US" b="1" i="1" dirty="0"/>
+              <a:t>p</a:t>
+            </a:r>
+            <a:r>
+              <a:rPr lang="en-US" b="1" dirty="0"/>
+              <a:t>-value</a:t>
+            </a:r>
+            <a:r>
+              <a:rPr lang="en-US" dirty="0"/>
+              <a:t> so your readers can draw their own conclusions.</a:t>
+            </a:r>
+          </a:p>
+        </p:txBody>
+      </p:sp>
+    </p:spTree>
+    <p:extLst>
+      <p:ext uri="{BB962C8B-B14F-4D97-AF65-F5344CB8AC3E}">
+        <p14:creationId xmlns:p14="http://schemas.microsoft.com/office/powerpoint/2010/main" val="1032148696"/>
+      </p:ext>
+    </p:extLst>
+  </p:cSld>
+  <p:clrMapOvr>
+    <a:masterClrMapping/>
+  </p:clrMapOvr>
+</p:sld>
+</file>
+
+<file path=ppt/slides/slide16.xml><?xml version="1.0" encoding="utf-8"?>
+<p:sld xmlns:a="http://schemas.openxmlformats.org/drawingml/2006/main" xmlns:r="http://schemas.openxmlformats.org/officeDocument/2006/relationships" xmlns:p="http://schemas.openxmlformats.org/presentationml/2006/main">
+  <p:cSld>
+    <p:spTree>
+      <p:nvGrpSpPr>
+        <p:cNvPr id="1" name=""/>
+        <p:cNvGrpSpPr/>
+        <p:nvPr/>
+      </p:nvGrpSpPr>
+      <p:grpSpPr>
+        <a:xfrm>
+          <a:off x="0" y="0"/>
+          <a:ext cx="0" cy="0"/>
+          <a:chOff x="0" y="0"/>
+          <a:chExt cx="0" cy="0"/>
+        </a:xfrm>
+      </p:grpSpPr>
+      <p:sp>
+        <p:nvSpPr>
+          <p:cNvPr id="2" name="Title 1">
+            <a:extLst>
+              <a:ext uri="{FF2B5EF4-FFF2-40B4-BE49-F238E27FC236}">
+                <a16:creationId xmlns:a16="http://schemas.microsoft.com/office/drawing/2014/main" id="{01560502-1667-5140-AF58-5D0A5B061D91}"/>
+              </a:ext>
+            </a:extLst>
+          </p:cNvPr>
+          <p:cNvSpPr>
+            <a:spLocks noGrp="1"/>
+          </p:cNvSpPr>
+          <p:nvPr>
+            <p:ph type="title"/>
+          </p:nvPr>
+        </p:nvSpPr>
+        <p:spPr/>
+        <p:txBody>
+          <a:bodyPr/>
+          <a:lstStyle/>
+          <a:p>
+            <a:r>
+              <a:rPr lang="en-US" b="1" dirty="0" err="1">
+                <a:solidFill>
+                  <a:srgbClr val="0070C0"/>
+                </a:solidFill>
+              </a:rPr>
+              <a:t>tsfresh</a:t>
+            </a:r>
+            <a:r>
+              <a:rPr lang="en-US" b="1" dirty="0">
+                <a:solidFill>
+                  <a:srgbClr val="0070C0"/>
+                </a:solidFill>
+              </a:rPr>
+              <a:t> – Feature selection </a:t>
+            </a:r>
+            <a:r>
+              <a:rPr lang="en-US" sz="2800" b="1" dirty="0">
+                <a:solidFill>
+                  <a:srgbClr val="0070C0"/>
+                </a:solidFill>
+              </a:rPr>
+              <a:t>(testing procedure)</a:t>
+            </a:r>
+          </a:p>
+        </p:txBody>
+      </p:sp>
+      <p:sp>
+        <p:nvSpPr>
+          <p:cNvPr id="3" name="Content Placeholder 2">
+            <a:extLst>
+              <a:ext uri="{FF2B5EF4-FFF2-40B4-BE49-F238E27FC236}">
+                <a16:creationId xmlns:a16="http://schemas.microsoft.com/office/drawing/2014/main" id="{F21F1551-71FB-9546-80F4-DFF7DA1697AE}"/>
+              </a:ext>
+            </a:extLst>
+          </p:cNvPr>
+          <p:cNvSpPr>
+            <a:spLocks noGrp="1"/>
+          </p:cNvSpPr>
+          <p:nvPr>
+            <p:ph idx="1"/>
+          </p:nvPr>
+        </p:nvSpPr>
+        <p:spPr/>
+        <p:txBody>
+          <a:bodyPr>
+            <a:normAutofit/>
+          </a:bodyPr>
+          <a:lstStyle/>
+          <a:p>
+            <a:r>
+              <a:rPr lang="en-US" b="1" dirty="0" err="1"/>
+              <a:t>Benjamini</a:t>
+            </a:r>
+            <a:r>
+              <a:rPr lang="en-US" b="1" dirty="0"/>
+              <a:t> Hochberg procedure</a:t>
+            </a:r>
+          </a:p>
+          <a:p>
+            <a:pPr lvl="1"/>
+            <a:r>
+              <a:rPr lang="en-US" dirty="0"/>
+              <a:t>It is a multiple testing procedure decides which features to keep and which to cut off (solely based on the p-values)</a:t>
+            </a:r>
+          </a:p>
+          <a:p>
+            <a:pPr lvl="1"/>
+            <a:r>
+              <a:rPr lang="en-US" dirty="0"/>
+              <a:t>Determines if the null hypothesis for a given feature can be rejected.</a:t>
+            </a:r>
+          </a:p>
+          <a:p>
+            <a:pPr lvl="1"/>
+            <a:r>
+              <a:rPr lang="en-US" dirty="0"/>
+              <a:t>For this the test regards the features’ p-values and controls the global false discovery rate</a:t>
+            </a:r>
+          </a:p>
+          <a:p>
+            <a:pPr lvl="1"/>
+            <a:r>
+              <a:rPr lang="en-US" dirty="0"/>
+              <a:t>Global false discovery rate (FDR) is the ratio of false rejections by all rejections:</a:t>
+            </a:r>
+          </a:p>
+        </p:txBody>
+      </p:sp>
+      <p:pic>
+        <p:nvPicPr>
+          <p:cNvPr id="5" name="Picture 4">
+            <a:extLst>
+              <a:ext uri="{FF2B5EF4-FFF2-40B4-BE49-F238E27FC236}">
+                <a16:creationId xmlns:a16="http://schemas.microsoft.com/office/drawing/2014/main" id="{FD83D616-754D-CF4C-B594-6B7C1B824916}"/>
+              </a:ext>
+            </a:extLst>
+          </p:cNvPr>
+          <p:cNvPicPr>
+            <a:picLocks noChangeAspect="1"/>
+          </p:cNvPicPr>
+          <p:nvPr/>
+        </p:nvPicPr>
+        <p:blipFill>
+          <a:blip r:embed="rId2"/>
+          <a:stretch>
+            <a:fillRect/>
+          </a:stretch>
+        </p:blipFill>
+        <p:spPr>
+          <a:xfrm>
+            <a:off x="3162138" y="4874787"/>
+            <a:ext cx="5372592" cy="1437113"/>
+          </a:xfrm>
+          <a:prstGeom prst="rect">
+            <a:avLst/>
+          </a:prstGeom>
+        </p:spPr>
+      </p:pic>
+    </p:spTree>
+    <p:extLst>
+      <p:ext uri="{BB962C8B-B14F-4D97-AF65-F5344CB8AC3E}">
+        <p14:creationId xmlns:p14="http://schemas.microsoft.com/office/powerpoint/2010/main" val="4117742035"/>
+      </p:ext>
+    </p:extLst>
+  </p:cSld>
+  <p:clrMapOvr>
+    <a:masterClrMapping/>
+  </p:clrMapOvr>
+</p:sld>
+</file>
+
+<file path=ppt/slides/slide17.xml><?xml version="1.0" encoding="utf-8"?>
+<p:sld xmlns:a="http://schemas.openxmlformats.org/drawingml/2006/main" xmlns:r="http://schemas.openxmlformats.org/officeDocument/2006/relationships" xmlns:p="http://schemas.openxmlformats.org/presentationml/2006/main">
+  <p:cSld>
+    <p:spTree>
+      <p:nvGrpSpPr>
+        <p:cNvPr id="1" name=""/>
+        <p:cNvGrpSpPr/>
+        <p:nvPr/>
+      </p:nvGrpSpPr>
+      <p:grpSpPr>
+        <a:xfrm>
+          <a:off x="0" y="0"/>
+          <a:ext cx="0" cy="0"/>
+          <a:chOff x="0" y="0"/>
+          <a:chExt cx="0" cy="0"/>
+        </a:xfrm>
+      </p:grpSpPr>
+      <p:sp>
+        <p:nvSpPr>
+          <p:cNvPr id="2" name="Title 1">
+            <a:extLst>
+              <a:ext uri="{FF2B5EF4-FFF2-40B4-BE49-F238E27FC236}">
+                <a16:creationId xmlns:a16="http://schemas.microsoft.com/office/drawing/2014/main" id="{01560502-1667-5140-AF58-5D0A5B061D91}"/>
+              </a:ext>
+            </a:extLst>
+          </p:cNvPr>
+          <p:cNvSpPr>
+            <a:spLocks noGrp="1"/>
+          </p:cNvSpPr>
+          <p:nvPr>
+            <p:ph type="title"/>
+          </p:nvPr>
+        </p:nvSpPr>
+        <p:spPr>
+          <a:xfrm>
+            <a:off x="838200" y="25388"/>
+            <a:ext cx="10515600" cy="1325563"/>
+          </a:xfrm>
+        </p:spPr>
+        <p:txBody>
+          <a:bodyPr/>
+          <a:lstStyle/>
+          <a:p>
+            <a:r>
+              <a:rPr lang="en-US" b="1" dirty="0" err="1">
+                <a:solidFill>
+                  <a:srgbClr val="0070C0"/>
+                </a:solidFill>
+              </a:rPr>
+              <a:t>tsfresh</a:t>
+            </a:r>
+            <a:r>
+              <a:rPr lang="en-US" b="1" dirty="0">
+                <a:solidFill>
+                  <a:srgbClr val="0070C0"/>
+                </a:solidFill>
+              </a:rPr>
+              <a:t> – Feature selection summary</a:t>
             </a:r>
           </a:p>
         </p:txBody>
@@ -5240,307 +5970,6 @@
 </p:sld>
 </file>
 
-<file path=ppt/slides/slide15.xml><?xml version="1.0" encoding="utf-8"?>
-<p:sld xmlns:a="http://schemas.openxmlformats.org/drawingml/2006/main" xmlns:r="http://schemas.openxmlformats.org/officeDocument/2006/relationships" xmlns:p="http://schemas.openxmlformats.org/presentationml/2006/main">
-  <p:cSld>
-    <p:spTree>
-      <p:nvGrpSpPr>
-        <p:cNvPr id="1" name=""/>
-        <p:cNvGrpSpPr/>
-        <p:nvPr/>
-      </p:nvGrpSpPr>
-      <p:grpSpPr>
-        <a:xfrm>
-          <a:off x="0" y="0"/>
-          <a:ext cx="0" cy="0"/>
-          <a:chOff x="0" y="0"/>
-          <a:chExt cx="0" cy="0"/>
-        </a:xfrm>
-      </p:grpSpPr>
-      <p:sp>
-        <p:nvSpPr>
-          <p:cNvPr id="2" name="Title 1">
-            <a:extLst>
-              <a:ext uri="{FF2B5EF4-FFF2-40B4-BE49-F238E27FC236}">
-                <a16:creationId xmlns:a16="http://schemas.microsoft.com/office/drawing/2014/main" id="{01560502-1667-5140-AF58-5D0A5B061D91}"/>
-              </a:ext>
-            </a:extLst>
-          </p:cNvPr>
-          <p:cNvSpPr>
-            <a:spLocks noGrp="1"/>
-          </p:cNvSpPr>
-          <p:nvPr>
-            <p:ph type="title"/>
-          </p:nvPr>
-        </p:nvSpPr>
-        <p:spPr/>
-        <p:txBody>
-          <a:bodyPr/>
-          <a:lstStyle/>
-          <a:p>
-            <a:r>
-              <a:rPr lang="en-US" b="1" dirty="0" err="1">
-                <a:solidFill>
-                  <a:srgbClr val="0070C0"/>
-                </a:solidFill>
-              </a:rPr>
-              <a:t>tsfresh</a:t>
-            </a:r>
-            <a:r>
-              <a:rPr lang="en-US" b="1" dirty="0">
-                <a:solidFill>
-                  <a:srgbClr val="0070C0"/>
-                </a:solidFill>
-              </a:rPr>
-              <a:t> – Data Formats</a:t>
-            </a:r>
-          </a:p>
-        </p:txBody>
-      </p:sp>
-      <p:sp>
-        <p:nvSpPr>
-          <p:cNvPr id="3" name="Content Placeholder 2">
-            <a:extLst>
-              <a:ext uri="{FF2B5EF4-FFF2-40B4-BE49-F238E27FC236}">
-                <a16:creationId xmlns:a16="http://schemas.microsoft.com/office/drawing/2014/main" id="{F21F1551-71FB-9546-80F4-DFF7DA1697AE}"/>
-              </a:ext>
-            </a:extLst>
-          </p:cNvPr>
-          <p:cNvSpPr>
-            <a:spLocks noGrp="1"/>
-          </p:cNvSpPr>
-          <p:nvPr>
-            <p:ph idx="1"/>
-          </p:nvPr>
-        </p:nvSpPr>
-        <p:spPr/>
-        <p:txBody>
-          <a:bodyPr/>
-          <a:lstStyle/>
-          <a:p>
-            <a:endParaRPr lang="en-US" dirty="0"/>
-          </a:p>
-        </p:txBody>
-      </p:sp>
-    </p:spTree>
-    <p:extLst>
-      <p:ext uri="{BB962C8B-B14F-4D97-AF65-F5344CB8AC3E}">
-        <p14:creationId xmlns:p14="http://schemas.microsoft.com/office/powerpoint/2010/main" val="396562324"/>
-      </p:ext>
-    </p:extLst>
-  </p:cSld>
-  <p:clrMapOvr>
-    <a:masterClrMapping/>
-  </p:clrMapOvr>
-</p:sld>
-</file>
-
-<file path=ppt/slides/slide16.xml><?xml version="1.0" encoding="utf-8"?>
-<p:sld xmlns:a="http://schemas.openxmlformats.org/drawingml/2006/main" xmlns:r="http://schemas.openxmlformats.org/officeDocument/2006/relationships" xmlns:p="http://schemas.openxmlformats.org/presentationml/2006/main">
-  <p:cSld>
-    <p:spTree>
-      <p:nvGrpSpPr>
-        <p:cNvPr id="1" name=""/>
-        <p:cNvGrpSpPr/>
-        <p:nvPr/>
-      </p:nvGrpSpPr>
-      <p:grpSpPr>
-        <a:xfrm>
-          <a:off x="0" y="0"/>
-          <a:ext cx="0" cy="0"/>
-          <a:chOff x="0" y="0"/>
-          <a:chExt cx="0" cy="0"/>
-        </a:xfrm>
-      </p:grpSpPr>
-      <p:sp>
-        <p:nvSpPr>
-          <p:cNvPr id="2" name="Title 1">
-            <a:extLst>
-              <a:ext uri="{FF2B5EF4-FFF2-40B4-BE49-F238E27FC236}">
-                <a16:creationId xmlns:a16="http://schemas.microsoft.com/office/drawing/2014/main" id="{01560502-1667-5140-AF58-5D0A5B061D91}"/>
-              </a:ext>
-            </a:extLst>
-          </p:cNvPr>
-          <p:cNvSpPr>
-            <a:spLocks noGrp="1"/>
-          </p:cNvSpPr>
-          <p:nvPr>
-            <p:ph type="title"/>
-          </p:nvPr>
-        </p:nvSpPr>
-        <p:spPr/>
-        <p:txBody>
-          <a:bodyPr/>
-          <a:lstStyle/>
-          <a:p>
-            <a:r>
-              <a:rPr lang="en-US" b="1" dirty="0" err="1">
-                <a:solidFill>
-                  <a:srgbClr val="0070C0"/>
-                </a:solidFill>
-              </a:rPr>
-              <a:t>tsfresh</a:t>
-            </a:r>
-            <a:r>
-              <a:rPr lang="en-US" b="1" dirty="0">
-                <a:solidFill>
-                  <a:srgbClr val="0070C0"/>
-                </a:solidFill>
-              </a:rPr>
-              <a:t> – </a:t>
-            </a:r>
-            <a:r>
-              <a:rPr lang="en-US" b="1" dirty="0" err="1">
-                <a:solidFill>
-                  <a:srgbClr val="0070C0"/>
-                </a:solidFill>
-              </a:rPr>
-              <a:t>scikit</a:t>
-            </a:r>
-            <a:r>
-              <a:rPr lang="en-US" b="1" dirty="0">
-                <a:solidFill>
-                  <a:srgbClr val="0070C0"/>
-                </a:solidFill>
-              </a:rPr>
-              <a:t>-learn Transformers</a:t>
-            </a:r>
-          </a:p>
-        </p:txBody>
-      </p:sp>
-      <p:sp>
-        <p:nvSpPr>
-          <p:cNvPr id="3" name="Content Placeholder 2">
-            <a:extLst>
-              <a:ext uri="{FF2B5EF4-FFF2-40B4-BE49-F238E27FC236}">
-                <a16:creationId xmlns:a16="http://schemas.microsoft.com/office/drawing/2014/main" id="{F21F1551-71FB-9546-80F4-DFF7DA1697AE}"/>
-              </a:ext>
-            </a:extLst>
-          </p:cNvPr>
-          <p:cNvSpPr>
-            <a:spLocks noGrp="1"/>
-          </p:cNvSpPr>
-          <p:nvPr>
-            <p:ph idx="1"/>
-          </p:nvPr>
-        </p:nvSpPr>
-        <p:spPr/>
-        <p:txBody>
-          <a:bodyPr/>
-          <a:lstStyle/>
-          <a:p>
-            <a:endParaRPr lang="en-US" dirty="0"/>
-          </a:p>
-        </p:txBody>
-      </p:sp>
-    </p:spTree>
-    <p:extLst>
-      <p:ext uri="{BB962C8B-B14F-4D97-AF65-F5344CB8AC3E}">
-        <p14:creationId xmlns:p14="http://schemas.microsoft.com/office/powerpoint/2010/main" val="636674178"/>
-      </p:ext>
-    </p:extLst>
-  </p:cSld>
-  <p:clrMapOvr>
-    <a:masterClrMapping/>
-  </p:clrMapOvr>
-</p:sld>
-</file>
-
-<file path=ppt/slides/slide17.xml><?xml version="1.0" encoding="utf-8"?>
-<p:sld xmlns:a="http://schemas.openxmlformats.org/drawingml/2006/main" xmlns:r="http://schemas.openxmlformats.org/officeDocument/2006/relationships" xmlns:p="http://schemas.openxmlformats.org/presentationml/2006/main">
-  <p:cSld>
-    <p:spTree>
-      <p:nvGrpSpPr>
-        <p:cNvPr id="1" name=""/>
-        <p:cNvGrpSpPr/>
-        <p:nvPr/>
-      </p:nvGrpSpPr>
-      <p:grpSpPr>
-        <a:xfrm>
-          <a:off x="0" y="0"/>
-          <a:ext cx="0" cy="0"/>
-          <a:chOff x="0" y="0"/>
-          <a:chExt cx="0" cy="0"/>
-        </a:xfrm>
-      </p:grpSpPr>
-      <p:sp>
-        <p:nvSpPr>
-          <p:cNvPr id="2" name="Title 1">
-            <a:extLst>
-              <a:ext uri="{FF2B5EF4-FFF2-40B4-BE49-F238E27FC236}">
-                <a16:creationId xmlns:a16="http://schemas.microsoft.com/office/drawing/2014/main" id="{01560502-1667-5140-AF58-5D0A5B061D91}"/>
-              </a:ext>
-            </a:extLst>
-          </p:cNvPr>
-          <p:cNvSpPr>
-            <a:spLocks noGrp="1"/>
-          </p:cNvSpPr>
-          <p:nvPr>
-            <p:ph type="title"/>
-          </p:nvPr>
-        </p:nvSpPr>
-        <p:spPr/>
-        <p:txBody>
-          <a:bodyPr/>
-          <a:lstStyle/>
-          <a:p>
-            <a:r>
-              <a:rPr lang="en-US" b="1" dirty="0" err="1">
-                <a:solidFill>
-                  <a:srgbClr val="0070C0"/>
-                </a:solidFill>
-              </a:rPr>
-              <a:t>tsfresh</a:t>
-            </a:r>
-            <a:r>
-              <a:rPr lang="en-US" b="1" dirty="0">
-                <a:solidFill>
-                  <a:srgbClr val="0070C0"/>
-                </a:solidFill>
-              </a:rPr>
-              <a:t> – Feature extraction settings</a:t>
-            </a:r>
-          </a:p>
-        </p:txBody>
-      </p:sp>
-      <p:sp>
-        <p:nvSpPr>
-          <p:cNvPr id="3" name="Content Placeholder 2">
-            <a:extLst>
-              <a:ext uri="{FF2B5EF4-FFF2-40B4-BE49-F238E27FC236}">
-                <a16:creationId xmlns:a16="http://schemas.microsoft.com/office/drawing/2014/main" id="{F21F1551-71FB-9546-80F4-DFF7DA1697AE}"/>
-              </a:ext>
-            </a:extLst>
-          </p:cNvPr>
-          <p:cNvSpPr>
-            <a:spLocks noGrp="1"/>
-          </p:cNvSpPr>
-          <p:nvPr>
-            <p:ph idx="1"/>
-          </p:nvPr>
-        </p:nvSpPr>
-        <p:spPr/>
-        <p:txBody>
-          <a:bodyPr/>
-          <a:lstStyle/>
-          <a:p>
-            <a:endParaRPr lang="en-US" dirty="0"/>
-          </a:p>
-        </p:txBody>
-      </p:sp>
-    </p:spTree>
-    <p:extLst>
-      <p:ext uri="{BB962C8B-B14F-4D97-AF65-F5344CB8AC3E}">
-        <p14:creationId xmlns:p14="http://schemas.microsoft.com/office/powerpoint/2010/main" val="582790990"/>
-      </p:ext>
-    </p:extLst>
-  </p:cSld>
-  <p:clrMapOvr>
-    <a:masterClrMapping/>
-  </p:clrMapOvr>
-</p:sld>
-</file>
-
 <file path=ppt/slides/slide18.xml><?xml version="1.0" encoding="utf-8"?>
 <p:sld xmlns:a="http://schemas.openxmlformats.org/drawingml/2006/main" xmlns:r="http://schemas.openxmlformats.org/officeDocument/2006/relationships" xmlns:p="http://schemas.openxmlformats.org/presentationml/2006/main">
   <p:cSld>
@@ -5593,15 +6022,7 @@
                   <a:srgbClr val="0070C0"/>
                 </a:solidFill>
               </a:rPr>
-              <a:t> – Feature selection </a:t>
-            </a:r>
-            <a:r>
-              <a:rPr lang="en-US" sz="2800" b="1" dirty="0">
-                <a:solidFill>
-                  <a:srgbClr val="0070C0"/>
-                </a:solidFill>
-              </a:rPr>
-              <a:t>(Feature significance testing)</a:t>
+              <a:t> – Data Formats</a:t>
             </a:r>
           </a:p>
         </p:txBody>
@@ -5634,7 +6055,7 @@
     </p:spTree>
     <p:extLst>
       <p:ext uri="{BB962C8B-B14F-4D97-AF65-F5344CB8AC3E}">
-        <p14:creationId xmlns:p14="http://schemas.microsoft.com/office/powerpoint/2010/main" val="1908171576"/>
+        <p14:creationId xmlns:p14="http://schemas.microsoft.com/office/powerpoint/2010/main" val="396562324"/>
       </p:ext>
     </p:extLst>
   </p:cSld>
@@ -5696,15 +6117,23 @@
                   <a:srgbClr val="0070C0"/>
                 </a:solidFill>
               </a:rPr>
-              <a:t> – Feature selection </a:t>
-            </a:r>
-            <a:r>
-              <a:rPr lang="en-US" sz="2800" b="1" dirty="0">
+              <a:t> – </a:t>
+            </a:r>
+            <a:r>
+              <a:rPr lang="en-US" b="1" dirty="0" err="1">
                 <a:solidFill>
                   <a:srgbClr val="0070C0"/>
                 </a:solidFill>
               </a:rPr>
-              <a:t>(Multiple test procedure)</a:t>
+              <a:t>scikit</a:t>
+            </a:r>
+            <a:r>
+              <a:rPr lang="en-US" b="1" dirty="0">
+                <a:solidFill>
+                  <a:srgbClr val="0070C0"/>
+                </a:solidFill>
+              </a:rPr>
+              <a:t>-learn Transformers</a:t>
             </a:r>
           </a:p>
         </p:txBody>
@@ -5737,7 +6166,7 @@
     </p:spTree>
     <p:extLst>
       <p:ext uri="{BB962C8B-B14F-4D97-AF65-F5344CB8AC3E}">
-        <p14:creationId xmlns:p14="http://schemas.microsoft.com/office/powerpoint/2010/main" val="1977775710"/>
+        <p14:creationId xmlns:p14="http://schemas.microsoft.com/office/powerpoint/2010/main" val="636674178"/>
       </p:ext>
     </p:extLst>
   </p:cSld>
@@ -5950,7 +6379,7 @@
                   <a:srgbClr val="0070C0"/>
                 </a:solidFill>
               </a:rPr>
-              <a:t> – Parallelization</a:t>
+              <a:t> – Feature extraction settings</a:t>
             </a:r>
           </a:p>
         </p:txBody>
@@ -5976,14 +6405,143 @@
           <a:bodyPr/>
           <a:lstStyle/>
           <a:p>
+            <a:r>
+              <a:rPr lang="en-US" dirty="0" err="1"/>
+              <a:t>MinimalFCParameters</a:t>
+            </a:r>
             <a:endParaRPr lang="en-US" dirty="0"/>
           </a:p>
-        </p:txBody>
-      </p:sp>
+          <a:p>
+            <a:endParaRPr lang="en-US" dirty="0"/>
+          </a:p>
+          <a:p>
+            <a:pPr marL="0" indent="0">
+              <a:buNone/>
+            </a:pPr>
+            <a:endParaRPr lang="en-US" dirty="0"/>
+          </a:p>
+          <a:p>
+            <a:r>
+              <a:rPr lang="en-US" dirty="0" err="1"/>
+              <a:t>EfficientFCParameters</a:t>
+            </a:r>
+            <a:endParaRPr lang="en-US" dirty="0"/>
+          </a:p>
+          <a:p>
+            <a:endParaRPr lang="en-US" dirty="0"/>
+          </a:p>
+          <a:p>
+            <a:endParaRPr lang="en-US" dirty="0"/>
+          </a:p>
+          <a:p>
+            <a:r>
+              <a:rPr lang="en-US" dirty="0" err="1"/>
+              <a:t>ComprehensiveFCParameters</a:t>
+            </a:r>
+            <a:endParaRPr lang="en-US" dirty="0"/>
+          </a:p>
+          <a:p>
+            <a:endParaRPr lang="en-US" dirty="0"/>
+          </a:p>
+          <a:p>
+            <a:endParaRPr lang="en-US" dirty="0"/>
+          </a:p>
+        </p:txBody>
+      </p:sp>
+      <p:pic>
+        <p:nvPicPr>
+          <p:cNvPr id="13" name="Picture 12">
+            <a:extLst>
+              <a:ext uri="{FF2B5EF4-FFF2-40B4-BE49-F238E27FC236}">
+                <a16:creationId xmlns:a16="http://schemas.microsoft.com/office/drawing/2014/main" id="{C682ECAD-A1D7-9A4A-8B08-3F79369FD8A1}"/>
+              </a:ext>
+            </a:extLst>
+          </p:cNvPr>
+          <p:cNvPicPr>
+            <a:picLocks noChangeAspect="1"/>
+          </p:cNvPicPr>
+          <p:nvPr/>
+        </p:nvPicPr>
+        <p:blipFill>
+          <a:blip r:embed="rId2"/>
+          <a:stretch>
+            <a:fillRect/>
+          </a:stretch>
+        </p:blipFill>
+        <p:spPr>
+          <a:xfrm>
+            <a:off x="1725226" y="2393844"/>
+            <a:ext cx="8572500" cy="825500"/>
+          </a:xfrm>
+          <a:prstGeom prst="rect">
+            <a:avLst/>
+          </a:prstGeom>
+        </p:spPr>
+      </p:pic>
+      <p:pic>
+        <p:nvPicPr>
+          <p:cNvPr id="15" name="Picture 14">
+            <a:extLst>
+              <a:ext uri="{FF2B5EF4-FFF2-40B4-BE49-F238E27FC236}">
+                <a16:creationId xmlns:a16="http://schemas.microsoft.com/office/drawing/2014/main" id="{79048863-719E-7240-AAC6-5708C5F14816}"/>
+              </a:ext>
+            </a:extLst>
+          </p:cNvPr>
+          <p:cNvPicPr>
+            <a:picLocks noChangeAspect="1"/>
+          </p:cNvPicPr>
+          <p:nvPr/>
+        </p:nvPicPr>
+        <p:blipFill>
+          <a:blip r:embed="rId3"/>
+          <a:stretch>
+            <a:fillRect/>
+          </a:stretch>
+        </p:blipFill>
+        <p:spPr>
+          <a:xfrm>
+            <a:off x="1687126" y="3898053"/>
+            <a:ext cx="8648700" cy="800100"/>
+          </a:xfrm>
+          <a:prstGeom prst="rect">
+            <a:avLst/>
+          </a:prstGeom>
+        </p:spPr>
+      </p:pic>
+      <p:pic>
+        <p:nvPicPr>
+          <p:cNvPr id="17" name="Picture 16">
+            <a:extLst>
+              <a:ext uri="{FF2B5EF4-FFF2-40B4-BE49-F238E27FC236}">
+                <a16:creationId xmlns:a16="http://schemas.microsoft.com/office/drawing/2014/main" id="{1B5C8D7D-1629-8D4F-A28A-F14EF4D6A0D1}"/>
+              </a:ext>
+            </a:extLst>
+          </p:cNvPr>
+          <p:cNvPicPr>
+            <a:picLocks noChangeAspect="1"/>
+          </p:cNvPicPr>
+          <p:nvPr/>
+        </p:nvPicPr>
+        <p:blipFill>
+          <a:blip r:embed="rId4"/>
+          <a:stretch>
+            <a:fillRect/>
+          </a:stretch>
+        </p:blipFill>
+        <p:spPr>
+          <a:xfrm>
+            <a:off x="1687126" y="5473700"/>
+            <a:ext cx="8597900" cy="838200"/>
+          </a:xfrm>
+          <a:prstGeom prst="rect">
+            <a:avLst/>
+          </a:prstGeom>
+        </p:spPr>
+      </p:pic>
     </p:spTree>
     <p:extLst>
       <p:ext uri="{BB962C8B-B14F-4D97-AF65-F5344CB8AC3E}">
-        <p14:creationId xmlns:p14="http://schemas.microsoft.com/office/powerpoint/2010/main" val="1004027388"/>
+        <p14:creationId xmlns:p14="http://schemas.microsoft.com/office/powerpoint/2010/main" val="582790990"/>
       </p:ext>
     </p:extLst>
   </p:cSld>
@@ -6045,6 +6603,204 @@
                   <a:srgbClr val="0070C0"/>
                 </a:solidFill>
               </a:rPr>
+              <a:t> – Feature selection </a:t>
+            </a:r>
+            <a:r>
+              <a:rPr lang="en-US" sz="2800" b="1" dirty="0">
+                <a:solidFill>
+                  <a:srgbClr val="0070C0"/>
+                </a:solidFill>
+              </a:rPr>
+              <a:t>(Feature significance testing)</a:t>
+            </a:r>
+          </a:p>
+        </p:txBody>
+      </p:sp>
+      <p:sp>
+        <p:nvSpPr>
+          <p:cNvPr id="3" name="Content Placeholder 2">
+            <a:extLst>
+              <a:ext uri="{FF2B5EF4-FFF2-40B4-BE49-F238E27FC236}">
+                <a16:creationId xmlns:a16="http://schemas.microsoft.com/office/drawing/2014/main" id="{F21F1551-71FB-9546-80F4-DFF7DA1697AE}"/>
+              </a:ext>
+            </a:extLst>
+          </p:cNvPr>
+          <p:cNvSpPr>
+            <a:spLocks noGrp="1"/>
+          </p:cNvSpPr>
+          <p:nvPr>
+            <p:ph idx="1"/>
+          </p:nvPr>
+        </p:nvSpPr>
+        <p:spPr/>
+        <p:txBody>
+          <a:bodyPr/>
+          <a:lstStyle/>
+          <a:p>
+            <a:endParaRPr lang="en-US" dirty="0"/>
+          </a:p>
+        </p:txBody>
+      </p:sp>
+    </p:spTree>
+    <p:extLst>
+      <p:ext uri="{BB962C8B-B14F-4D97-AF65-F5344CB8AC3E}">
+        <p14:creationId xmlns:p14="http://schemas.microsoft.com/office/powerpoint/2010/main" val="1908171576"/>
+      </p:ext>
+    </p:extLst>
+  </p:cSld>
+  <p:clrMapOvr>
+    <a:masterClrMapping/>
+  </p:clrMapOvr>
+</p:sld>
+</file>
+
+<file path=ppt/slides/slide22.xml><?xml version="1.0" encoding="utf-8"?>
+<p:sld xmlns:a="http://schemas.openxmlformats.org/drawingml/2006/main" xmlns:r="http://schemas.openxmlformats.org/officeDocument/2006/relationships" xmlns:p="http://schemas.openxmlformats.org/presentationml/2006/main">
+  <p:cSld>
+    <p:spTree>
+      <p:nvGrpSpPr>
+        <p:cNvPr id="1" name=""/>
+        <p:cNvGrpSpPr/>
+        <p:nvPr/>
+      </p:nvGrpSpPr>
+      <p:grpSpPr>
+        <a:xfrm>
+          <a:off x="0" y="0"/>
+          <a:ext cx="0" cy="0"/>
+          <a:chOff x="0" y="0"/>
+          <a:chExt cx="0" cy="0"/>
+        </a:xfrm>
+      </p:grpSpPr>
+      <p:sp>
+        <p:nvSpPr>
+          <p:cNvPr id="2" name="Title 1">
+            <a:extLst>
+              <a:ext uri="{FF2B5EF4-FFF2-40B4-BE49-F238E27FC236}">
+                <a16:creationId xmlns:a16="http://schemas.microsoft.com/office/drawing/2014/main" id="{01560502-1667-5140-AF58-5D0A5B061D91}"/>
+              </a:ext>
+            </a:extLst>
+          </p:cNvPr>
+          <p:cNvSpPr>
+            <a:spLocks noGrp="1"/>
+          </p:cNvSpPr>
+          <p:nvPr>
+            <p:ph type="title"/>
+          </p:nvPr>
+        </p:nvSpPr>
+        <p:spPr/>
+        <p:txBody>
+          <a:bodyPr/>
+          <a:lstStyle/>
+          <a:p>
+            <a:r>
+              <a:rPr lang="en-US" b="1" dirty="0" err="1">
+                <a:solidFill>
+                  <a:srgbClr val="0070C0"/>
+                </a:solidFill>
+              </a:rPr>
+              <a:t>tsfresh</a:t>
+            </a:r>
+            <a:r>
+              <a:rPr lang="en-US" b="1" dirty="0">
+                <a:solidFill>
+                  <a:srgbClr val="0070C0"/>
+                </a:solidFill>
+              </a:rPr>
+              <a:t> – Parallelization</a:t>
+            </a:r>
+          </a:p>
+        </p:txBody>
+      </p:sp>
+      <p:sp>
+        <p:nvSpPr>
+          <p:cNvPr id="3" name="Content Placeholder 2">
+            <a:extLst>
+              <a:ext uri="{FF2B5EF4-FFF2-40B4-BE49-F238E27FC236}">
+                <a16:creationId xmlns:a16="http://schemas.microsoft.com/office/drawing/2014/main" id="{F21F1551-71FB-9546-80F4-DFF7DA1697AE}"/>
+              </a:ext>
+            </a:extLst>
+          </p:cNvPr>
+          <p:cNvSpPr>
+            <a:spLocks noGrp="1"/>
+          </p:cNvSpPr>
+          <p:nvPr>
+            <p:ph idx="1"/>
+          </p:nvPr>
+        </p:nvSpPr>
+        <p:spPr/>
+        <p:txBody>
+          <a:bodyPr/>
+          <a:lstStyle/>
+          <a:p>
+            <a:endParaRPr lang="en-US" dirty="0"/>
+          </a:p>
+        </p:txBody>
+      </p:sp>
+    </p:spTree>
+    <p:extLst>
+      <p:ext uri="{BB962C8B-B14F-4D97-AF65-F5344CB8AC3E}">
+        <p14:creationId xmlns:p14="http://schemas.microsoft.com/office/powerpoint/2010/main" val="1004027388"/>
+      </p:ext>
+    </p:extLst>
+  </p:cSld>
+  <p:clrMapOvr>
+    <a:masterClrMapping/>
+  </p:clrMapOvr>
+</p:sld>
+</file>
+
+<file path=ppt/slides/slide23.xml><?xml version="1.0" encoding="utf-8"?>
+<p:sld xmlns:a="http://schemas.openxmlformats.org/drawingml/2006/main" xmlns:r="http://schemas.openxmlformats.org/officeDocument/2006/relationships" xmlns:p="http://schemas.openxmlformats.org/presentationml/2006/main">
+  <p:cSld>
+    <p:spTree>
+      <p:nvGrpSpPr>
+        <p:cNvPr id="1" name=""/>
+        <p:cNvGrpSpPr/>
+        <p:nvPr/>
+      </p:nvGrpSpPr>
+      <p:grpSpPr>
+        <a:xfrm>
+          <a:off x="0" y="0"/>
+          <a:ext cx="0" cy="0"/>
+          <a:chOff x="0" y="0"/>
+          <a:chExt cx="0" cy="0"/>
+        </a:xfrm>
+      </p:grpSpPr>
+      <p:sp>
+        <p:nvSpPr>
+          <p:cNvPr id="2" name="Title 1">
+            <a:extLst>
+              <a:ext uri="{FF2B5EF4-FFF2-40B4-BE49-F238E27FC236}">
+                <a16:creationId xmlns:a16="http://schemas.microsoft.com/office/drawing/2014/main" id="{01560502-1667-5140-AF58-5D0A5B061D91}"/>
+              </a:ext>
+            </a:extLst>
+          </p:cNvPr>
+          <p:cNvSpPr>
+            <a:spLocks noGrp="1"/>
+          </p:cNvSpPr>
+          <p:nvPr>
+            <p:ph type="title"/>
+          </p:nvPr>
+        </p:nvSpPr>
+        <p:spPr/>
+        <p:txBody>
+          <a:bodyPr/>
+          <a:lstStyle/>
+          <a:p>
+            <a:r>
+              <a:rPr lang="en-US" b="1" dirty="0" err="1">
+                <a:solidFill>
+                  <a:srgbClr val="0070C0"/>
+                </a:solidFill>
+              </a:rPr>
+              <a:t>tsfresh</a:t>
+            </a:r>
+            <a:r>
+              <a:rPr lang="en-US" b="1" dirty="0">
+                <a:solidFill>
+                  <a:srgbClr val="0070C0"/>
+                </a:solidFill>
+              </a:rPr>
               <a:t> – Basics of time-series forecasting</a:t>
             </a:r>
           </a:p>
@@ -6088,7 +6844,7 @@
 </p:sld>
 </file>
 
-<file path=ppt/slides/slide22.xml><?xml version="1.0" encoding="utf-8"?>
+<file path=ppt/slides/slide24.xml><?xml version="1.0" encoding="utf-8"?>
 <p:sld xmlns:a="http://schemas.openxmlformats.org/drawingml/2006/main" xmlns:r="http://schemas.openxmlformats.org/officeDocument/2006/relationships" xmlns:p="http://schemas.openxmlformats.org/presentationml/2006/main">
   <p:cSld>
     <p:spTree>
@@ -6218,212 +6974,6 @@
 </p:sld>
 </file>
 
-<file path=ppt/slides/slide23.xml><?xml version="1.0" encoding="utf-8"?>
-<p:sld xmlns:a="http://schemas.openxmlformats.org/drawingml/2006/main" xmlns:r="http://schemas.openxmlformats.org/officeDocument/2006/relationships" xmlns:p="http://schemas.openxmlformats.org/presentationml/2006/main">
-  <p:cSld>
-    <p:spTree>
-      <p:nvGrpSpPr>
-        <p:cNvPr id="1" name=""/>
-        <p:cNvGrpSpPr/>
-        <p:nvPr/>
-      </p:nvGrpSpPr>
-      <p:grpSpPr>
-        <a:xfrm>
-          <a:off x="0" y="0"/>
-          <a:ext cx="0" cy="0"/>
-          <a:chOff x="0" y="0"/>
-          <a:chExt cx="0" cy="0"/>
-        </a:xfrm>
-      </p:grpSpPr>
-      <p:sp>
-        <p:nvSpPr>
-          <p:cNvPr id="2" name="Title 1">
-            <a:extLst>
-              <a:ext uri="{FF2B5EF4-FFF2-40B4-BE49-F238E27FC236}">
-                <a16:creationId xmlns:a16="http://schemas.microsoft.com/office/drawing/2014/main" id="{01560502-1667-5140-AF58-5D0A5B061D91}"/>
-              </a:ext>
-            </a:extLst>
-          </p:cNvPr>
-          <p:cNvSpPr>
-            <a:spLocks noGrp="1"/>
-          </p:cNvSpPr>
-          <p:nvPr>
-            <p:ph type="title"/>
-          </p:nvPr>
-        </p:nvSpPr>
-        <p:spPr/>
-        <p:txBody>
-          <a:bodyPr/>
-          <a:lstStyle/>
-          <a:p>
-            <a:r>
-              <a:rPr lang="en-US" b="1" dirty="0">
-                <a:solidFill>
-                  <a:srgbClr val="0070C0"/>
-                </a:solidFill>
-              </a:rPr>
-              <a:t>References &amp; Useful Resources</a:t>
-            </a:r>
-          </a:p>
-        </p:txBody>
-      </p:sp>
-      <p:sp>
-        <p:nvSpPr>
-          <p:cNvPr id="3" name="Content Placeholder 2">
-            <a:extLst>
-              <a:ext uri="{FF2B5EF4-FFF2-40B4-BE49-F238E27FC236}">
-                <a16:creationId xmlns:a16="http://schemas.microsoft.com/office/drawing/2014/main" id="{F21F1551-71FB-9546-80F4-DFF7DA1697AE}"/>
-              </a:ext>
-            </a:extLst>
-          </p:cNvPr>
-          <p:cNvSpPr>
-            <a:spLocks noGrp="1"/>
-          </p:cNvSpPr>
-          <p:nvPr>
-            <p:ph idx="1"/>
-          </p:nvPr>
-        </p:nvSpPr>
-        <p:spPr/>
-        <p:txBody>
-          <a:bodyPr/>
-          <a:lstStyle/>
-          <a:p>
-            <a:r>
-              <a:rPr lang="en-US" dirty="0">
-                <a:hlinkClick r:id="rId2"/>
-              </a:rPr>
-              <a:t>https://github.com/benfulcher/hctsa</a:t>
-            </a:r>
-            <a:endParaRPr lang="en-US" dirty="0"/>
-          </a:p>
-          <a:p>
-            <a:r>
-              <a:rPr lang="en-US" dirty="0">
-                <a:hlinkClick r:id="rId3"/>
-              </a:rPr>
-              <a:t>https://tsfresh.readthedocs.io/en/latest/</a:t>
-            </a:r>
-            <a:r>
-              <a:rPr lang="en-US" dirty="0"/>
-              <a:t> </a:t>
-            </a:r>
-          </a:p>
-          <a:p>
-            <a:r>
-              <a:rPr lang="en-US" dirty="0">
-                <a:hlinkClick r:id="rId4"/>
-              </a:rPr>
-              <a:t>https://github.com/blue-yonder/tsfresh</a:t>
-            </a:r>
-            <a:r>
-              <a:rPr lang="en-US" dirty="0"/>
-              <a:t> </a:t>
-            </a:r>
-          </a:p>
-          <a:p>
-            <a:endParaRPr lang="en-US" dirty="0"/>
-          </a:p>
-        </p:txBody>
-      </p:sp>
-    </p:spTree>
-    <p:extLst>
-      <p:ext uri="{BB962C8B-B14F-4D97-AF65-F5344CB8AC3E}">
-        <p14:creationId xmlns:p14="http://schemas.microsoft.com/office/powerpoint/2010/main" val="533690633"/>
-      </p:ext>
-    </p:extLst>
-  </p:cSld>
-  <p:clrMapOvr>
-    <a:masterClrMapping/>
-  </p:clrMapOvr>
-</p:sld>
-</file>
-
-<file path=ppt/slides/slide24.xml><?xml version="1.0" encoding="utf-8"?>
-<p:sld xmlns:a="http://schemas.openxmlformats.org/drawingml/2006/main" xmlns:r="http://schemas.openxmlformats.org/officeDocument/2006/relationships" xmlns:p="http://schemas.openxmlformats.org/presentationml/2006/main">
-  <p:cSld>
-    <p:spTree>
-      <p:nvGrpSpPr>
-        <p:cNvPr id="1" name=""/>
-        <p:cNvGrpSpPr/>
-        <p:nvPr/>
-      </p:nvGrpSpPr>
-      <p:grpSpPr>
-        <a:xfrm>
-          <a:off x="0" y="0"/>
-          <a:ext cx="0" cy="0"/>
-          <a:chOff x="0" y="0"/>
-          <a:chExt cx="0" cy="0"/>
-        </a:xfrm>
-      </p:grpSpPr>
-      <p:sp>
-        <p:nvSpPr>
-          <p:cNvPr id="2" name="Title 1">
-            <a:extLst>
-              <a:ext uri="{FF2B5EF4-FFF2-40B4-BE49-F238E27FC236}">
-                <a16:creationId xmlns:a16="http://schemas.microsoft.com/office/drawing/2014/main" id="{24BCF473-821F-E846-841E-C625AFF0FFD5}"/>
-              </a:ext>
-            </a:extLst>
-          </p:cNvPr>
-          <p:cNvSpPr>
-            <a:spLocks noGrp="1"/>
-          </p:cNvSpPr>
-          <p:nvPr>
-            <p:ph type="title"/>
-          </p:nvPr>
-        </p:nvSpPr>
-        <p:spPr>
-          <a:xfrm>
-            <a:off x="838200" y="2510448"/>
-            <a:ext cx="10515600" cy="1325563"/>
-          </a:xfrm>
-        </p:spPr>
-        <p:txBody>
-          <a:bodyPr>
-            <a:normAutofit/>
-          </a:bodyPr>
-          <a:lstStyle/>
-          <a:p>
-            <a:pPr algn="ctr"/>
-            <a:r>
-              <a:rPr lang="en-US" sz="8000" dirty="0">
-                <a:solidFill>
-                  <a:srgbClr val="0070C0"/>
-                </a:solidFill>
-              </a:rPr>
-              <a:t> </a:t>
-            </a:r>
-            <a:r>
-              <a:rPr lang="en-US" sz="8000" b="1" dirty="0">
-                <a:solidFill>
-                  <a:srgbClr val="0070C0"/>
-                </a:solidFill>
-              </a:rPr>
-              <a:t>Questions</a:t>
-            </a:r>
-            <a:r>
-              <a:rPr lang="en-US" sz="8000" dirty="0">
-                <a:solidFill>
-                  <a:srgbClr val="0070C0"/>
-                </a:solidFill>
-              </a:rPr>
-              <a:t>?</a:t>
-            </a:r>
-          </a:p>
-        </p:txBody>
-      </p:sp>
-    </p:spTree>
-    <p:extLst>
-      <p:ext uri="{BB962C8B-B14F-4D97-AF65-F5344CB8AC3E}">
-        <p14:creationId xmlns:p14="http://schemas.microsoft.com/office/powerpoint/2010/main" val="2476179661"/>
-      </p:ext>
-    </p:extLst>
-  </p:cSld>
-  <p:clrMapOvr>
-    <a:masterClrMapping/>
-  </p:clrMapOvr>
-</p:sld>
-</file>
-
 <file path=ppt/slides/slide25.xml><?xml version="1.0" encoding="utf-8"?>
 <p:sld xmlns:a="http://schemas.openxmlformats.org/drawingml/2006/main" xmlns:r="http://schemas.openxmlformats.org/officeDocument/2006/relationships" xmlns:p="http://schemas.openxmlformats.org/presentationml/2006/main">
   <p:cSld>
@@ -6446,6 +6996,250 @@
           <p:cNvPr id="2" name="Title 1">
             <a:extLst>
               <a:ext uri="{FF2B5EF4-FFF2-40B4-BE49-F238E27FC236}">
+                <a16:creationId xmlns:a16="http://schemas.microsoft.com/office/drawing/2014/main" id="{01560502-1667-5140-AF58-5D0A5B061D91}"/>
+              </a:ext>
+            </a:extLst>
+          </p:cNvPr>
+          <p:cNvSpPr>
+            <a:spLocks noGrp="1"/>
+          </p:cNvSpPr>
+          <p:nvPr>
+            <p:ph type="title"/>
+          </p:nvPr>
+        </p:nvSpPr>
+        <p:spPr/>
+        <p:txBody>
+          <a:bodyPr/>
+          <a:lstStyle/>
+          <a:p>
+            <a:r>
+              <a:rPr lang="en-US" b="1" dirty="0">
+                <a:solidFill>
+                  <a:srgbClr val="0070C0"/>
+                </a:solidFill>
+              </a:rPr>
+              <a:t>References &amp; Useful Resources</a:t>
+            </a:r>
+          </a:p>
+        </p:txBody>
+      </p:sp>
+      <p:sp>
+        <p:nvSpPr>
+          <p:cNvPr id="3" name="Content Placeholder 2">
+            <a:extLst>
+              <a:ext uri="{FF2B5EF4-FFF2-40B4-BE49-F238E27FC236}">
+                <a16:creationId xmlns:a16="http://schemas.microsoft.com/office/drawing/2014/main" id="{F21F1551-71FB-9546-80F4-DFF7DA1697AE}"/>
+              </a:ext>
+            </a:extLst>
+          </p:cNvPr>
+          <p:cNvSpPr>
+            <a:spLocks noGrp="1"/>
+          </p:cNvSpPr>
+          <p:nvPr>
+            <p:ph idx="1"/>
+          </p:nvPr>
+        </p:nvSpPr>
+        <p:spPr/>
+        <p:txBody>
+          <a:bodyPr/>
+          <a:lstStyle/>
+          <a:p>
+            <a:r>
+              <a:rPr lang="en-US" dirty="0">
+                <a:hlinkClick r:id="rId2"/>
+              </a:rPr>
+              <a:t>https://github.com/benfulcher/hctsa</a:t>
+            </a:r>
+            <a:endParaRPr lang="en-US" dirty="0"/>
+          </a:p>
+          <a:p>
+            <a:r>
+              <a:rPr lang="en-US" dirty="0">
+                <a:hlinkClick r:id="rId3"/>
+              </a:rPr>
+              <a:t>https://tsfresh.readthedocs.io/en/latest/</a:t>
+            </a:r>
+            <a:r>
+              <a:rPr lang="en-US" dirty="0"/>
+              <a:t> </a:t>
+            </a:r>
+          </a:p>
+          <a:p>
+            <a:r>
+              <a:rPr lang="en-US" dirty="0">
+                <a:hlinkClick r:id="rId4"/>
+              </a:rPr>
+              <a:t>https://github.com/blue-yonder/tsfresh</a:t>
+            </a:r>
+            <a:r>
+              <a:rPr lang="en-US" dirty="0"/>
+              <a:t> </a:t>
+            </a:r>
+          </a:p>
+          <a:p>
+            <a:endParaRPr lang="en-US" dirty="0"/>
+          </a:p>
+        </p:txBody>
+      </p:sp>
+    </p:spTree>
+    <p:extLst>
+      <p:ext uri="{BB962C8B-B14F-4D97-AF65-F5344CB8AC3E}">
+        <p14:creationId xmlns:p14="http://schemas.microsoft.com/office/powerpoint/2010/main" val="533690633"/>
+      </p:ext>
+    </p:extLst>
+  </p:cSld>
+  <p:clrMapOvr>
+    <a:masterClrMapping/>
+  </p:clrMapOvr>
+</p:sld>
+</file>
+
+<file path=ppt/slides/slide26.xml><?xml version="1.0" encoding="utf-8"?>
+<p:sld xmlns:a="http://schemas.openxmlformats.org/drawingml/2006/main" xmlns:r="http://schemas.openxmlformats.org/officeDocument/2006/relationships" xmlns:p="http://schemas.openxmlformats.org/presentationml/2006/main">
+  <p:cSld>
+    <p:spTree>
+      <p:nvGrpSpPr>
+        <p:cNvPr id="1" name=""/>
+        <p:cNvGrpSpPr/>
+        <p:nvPr/>
+      </p:nvGrpSpPr>
+      <p:grpSpPr>
+        <a:xfrm>
+          <a:off x="0" y="0"/>
+          <a:ext cx="0" cy="0"/>
+          <a:chOff x="0" y="0"/>
+          <a:chExt cx="0" cy="0"/>
+        </a:xfrm>
+      </p:grpSpPr>
+      <p:sp>
+        <p:nvSpPr>
+          <p:cNvPr id="2" name="Title 1">
+            <a:extLst>
+              <a:ext uri="{FF2B5EF4-FFF2-40B4-BE49-F238E27FC236}">
+                <a16:creationId xmlns:a16="http://schemas.microsoft.com/office/drawing/2014/main" id="{24BCF473-821F-E846-841E-C625AFF0FFD5}"/>
+              </a:ext>
+            </a:extLst>
+          </p:cNvPr>
+          <p:cNvSpPr>
+            <a:spLocks noGrp="1"/>
+          </p:cNvSpPr>
+          <p:nvPr>
+            <p:ph type="title"/>
+          </p:nvPr>
+        </p:nvSpPr>
+        <p:spPr>
+          <a:xfrm>
+            <a:off x="838200" y="2510448"/>
+            <a:ext cx="10515600" cy="1325563"/>
+          </a:xfrm>
+        </p:spPr>
+        <p:txBody>
+          <a:bodyPr>
+            <a:normAutofit fontScale="90000"/>
+          </a:bodyPr>
+          <a:lstStyle/>
+          <a:p>
+            <a:pPr algn="ctr"/>
+            <a:r>
+              <a:rPr lang="en-US" sz="8000" dirty="0">
+                <a:solidFill>
+                  <a:srgbClr val="0070C0"/>
+                </a:solidFill>
+              </a:rPr>
+              <a:t> </a:t>
+            </a:r>
+            <a:r>
+              <a:rPr lang="en-US" sz="8000" b="1" dirty="0">
+                <a:solidFill>
+                  <a:srgbClr val="0070C0"/>
+                </a:solidFill>
+              </a:rPr>
+              <a:t>Questions</a:t>
+            </a:r>
+            <a:r>
+              <a:rPr lang="en-US" sz="8000" dirty="0">
+                <a:solidFill>
+                  <a:srgbClr val="0070C0"/>
+                </a:solidFill>
+              </a:rPr>
+              <a:t>?</a:t>
+            </a:r>
+            <a:br>
+              <a:rPr lang="en-US" sz="8000" dirty="0">
+                <a:solidFill>
+                  <a:srgbClr val="0070C0"/>
+                </a:solidFill>
+              </a:rPr>
+            </a:br>
+            <a:br>
+              <a:rPr lang="en-US" sz="8000" dirty="0">
+                <a:solidFill>
+                  <a:srgbClr val="0070C0"/>
+                </a:solidFill>
+              </a:rPr>
+            </a:br>
+            <a:r>
+              <a:rPr lang="en-US" sz="8000" dirty="0">
+                <a:solidFill>
+                  <a:srgbClr val="0070C0"/>
+                </a:solidFill>
+              </a:rPr>
+              <a:t>Lets go to the </a:t>
+            </a:r>
+            <a:r>
+              <a:rPr lang="en-US" sz="8000" dirty="0" err="1">
+                <a:solidFill>
+                  <a:srgbClr val="0070C0"/>
+                </a:solidFill>
+              </a:rPr>
+              <a:t>ipython</a:t>
+            </a:r>
+            <a:r>
+              <a:rPr lang="en-US" sz="8000" dirty="0">
+                <a:solidFill>
+                  <a:srgbClr val="0070C0"/>
+                </a:solidFill>
+              </a:rPr>
+              <a:t> notebook</a:t>
+            </a:r>
+          </a:p>
+        </p:txBody>
+      </p:sp>
+    </p:spTree>
+    <p:extLst>
+      <p:ext uri="{BB962C8B-B14F-4D97-AF65-F5344CB8AC3E}">
+        <p14:creationId xmlns:p14="http://schemas.microsoft.com/office/powerpoint/2010/main" val="2476179661"/>
+      </p:ext>
+    </p:extLst>
+  </p:cSld>
+  <p:clrMapOvr>
+    <a:masterClrMapping/>
+  </p:clrMapOvr>
+</p:sld>
+</file>
+
+<file path=ppt/slides/slide27.xml><?xml version="1.0" encoding="utf-8"?>
+<p:sld xmlns:a="http://schemas.openxmlformats.org/drawingml/2006/main" xmlns:r="http://schemas.openxmlformats.org/officeDocument/2006/relationships" xmlns:p="http://schemas.openxmlformats.org/presentationml/2006/main">
+  <p:cSld>
+    <p:spTree>
+      <p:nvGrpSpPr>
+        <p:cNvPr id="1" name=""/>
+        <p:cNvGrpSpPr/>
+        <p:nvPr/>
+      </p:nvGrpSpPr>
+      <p:grpSpPr>
+        <a:xfrm>
+          <a:off x="0" y="0"/>
+          <a:ext cx="0" cy="0"/>
+          <a:chOff x="0" y="0"/>
+          <a:chExt cx="0" cy="0"/>
+        </a:xfrm>
+      </p:grpSpPr>
+      <p:sp>
+        <p:nvSpPr>
+          <p:cNvPr id="2" name="Title 1">
+            <a:extLst>
+              <a:ext uri="{FF2B5EF4-FFF2-40B4-BE49-F238E27FC236}">
                 <a16:creationId xmlns:a16="http://schemas.microsoft.com/office/drawing/2014/main" id="{D39A7480-940B-064B-A2DB-97503F2BB48E}"/>
               </a:ext>
             </a:extLst>
@@ -6537,7 +7331,7 @@
 </p:sld>
 </file>
 
-<file path=ppt/slides/slide26.xml><?xml version="1.0" encoding="utf-8"?>
+<file path=ppt/slides/slide28.xml><?xml version="1.0" encoding="utf-8"?>
 <p:sld xmlns:a="http://schemas.openxmlformats.org/drawingml/2006/main" xmlns:r="http://schemas.openxmlformats.org/officeDocument/2006/relationships" xmlns:p="http://schemas.openxmlformats.org/presentationml/2006/main">
   <p:cSld>
     <p:spTree>

</xml_diff>

<commit_message>
Feature engineering presentation update
</commit_message>
<xml_diff>
--- a/presentations/Feature_Engineering_ML_SSA19.pptx
+++ b/presentations/Feature_Engineering_ML_SSA19.pptx
@@ -5,7 +5,7 @@
     <p:sldMasterId id="2147483648" r:id="rId1"/>
   </p:sldMasterIdLst>
   <p:notesMasterIdLst>
-    <p:notesMasterId r:id="rId30"/>
+    <p:notesMasterId r:id="rId28"/>
   </p:notesMasterIdLst>
   <p:sldIdLst>
     <p:sldId id="256" r:id="rId2"/>
@@ -18,24 +18,22 @@
     <p:sldId id="278" r:id="rId9"/>
     <p:sldId id="261" r:id="rId10"/>
     <p:sldId id="264" r:id="rId11"/>
-    <p:sldId id="280" r:id="rId12"/>
-    <p:sldId id="279" r:id="rId13"/>
-    <p:sldId id="265" r:id="rId14"/>
-    <p:sldId id="283" r:id="rId15"/>
-    <p:sldId id="284" r:id="rId16"/>
-    <p:sldId id="282" r:id="rId17"/>
-    <p:sldId id="276" r:id="rId18"/>
-    <p:sldId id="266" r:id="rId19"/>
-    <p:sldId id="267" r:id="rId20"/>
-    <p:sldId id="268" r:id="rId21"/>
-    <p:sldId id="269" r:id="rId22"/>
-    <p:sldId id="271" r:id="rId23"/>
+    <p:sldId id="268" r:id="rId12"/>
+    <p:sldId id="280" r:id="rId13"/>
+    <p:sldId id="279" r:id="rId14"/>
+    <p:sldId id="265" r:id="rId15"/>
+    <p:sldId id="283" r:id="rId16"/>
+    <p:sldId id="284" r:id="rId17"/>
+    <p:sldId id="282" r:id="rId18"/>
+    <p:sldId id="276" r:id="rId19"/>
+    <p:sldId id="266" r:id="rId20"/>
+    <p:sldId id="267" r:id="rId21"/>
+    <p:sldId id="271" r:id="rId22"/>
+    <p:sldId id="277" r:id="rId23"/>
     <p:sldId id="272" r:id="rId24"/>
-    <p:sldId id="277" r:id="rId25"/>
+    <p:sldId id="285" r:id="rId25"/>
     <p:sldId id="273" r:id="rId26"/>
     <p:sldId id="281" r:id="rId27"/>
-    <p:sldId id="257" r:id="rId28"/>
-    <p:sldId id="258" r:id="rId29"/>
   </p:sldIdLst>
   <p:sldSz cx="12192000" cy="6858000"/>
   <p:notesSz cx="6858000" cy="9144000"/>
@@ -224,7 +222,7 @@
           <a:p>
             <a:fld id="{FEB909F9-03D2-0440-B8E0-F1611228BF6C}" type="datetimeFigureOut">
               <a:rPr lang="en-US" smtClean="0"/>
-              <a:t>4/17/19</a:t>
+              <a:t>4/19/19</a:t>
             </a:fld>
             <a:endParaRPr lang="en-US"/>
           </a:p>
@@ -856,7 +854,7 @@
           <a:p>
             <a:fld id="{C33EC7A1-935E-D748-85B9-D6F830ED6136}" type="datetimeFigureOut">
               <a:rPr lang="en-US" smtClean="0"/>
-              <a:t>4/17/19</a:t>
+              <a:t>4/19/19</a:t>
             </a:fld>
             <a:endParaRPr lang="en-US"/>
           </a:p>
@@ -1054,7 +1052,7 @@
           <a:p>
             <a:fld id="{C33EC7A1-935E-D748-85B9-D6F830ED6136}" type="datetimeFigureOut">
               <a:rPr lang="en-US" smtClean="0"/>
-              <a:t>4/17/19</a:t>
+              <a:t>4/19/19</a:t>
             </a:fld>
             <a:endParaRPr lang="en-US"/>
           </a:p>
@@ -1262,7 +1260,7 @@
           <a:p>
             <a:fld id="{C33EC7A1-935E-D748-85B9-D6F830ED6136}" type="datetimeFigureOut">
               <a:rPr lang="en-US" smtClean="0"/>
-              <a:t>4/17/19</a:t>
+              <a:t>4/19/19</a:t>
             </a:fld>
             <a:endParaRPr lang="en-US"/>
           </a:p>
@@ -1460,7 +1458,7 @@
           <a:p>
             <a:fld id="{C33EC7A1-935E-D748-85B9-D6F830ED6136}" type="datetimeFigureOut">
               <a:rPr lang="en-US" smtClean="0"/>
-              <a:t>4/17/19</a:t>
+              <a:t>4/19/19</a:t>
             </a:fld>
             <a:endParaRPr lang="en-US"/>
           </a:p>
@@ -1735,7 +1733,7 @@
           <a:p>
             <a:fld id="{C33EC7A1-935E-D748-85B9-D6F830ED6136}" type="datetimeFigureOut">
               <a:rPr lang="en-US" smtClean="0"/>
-              <a:t>4/17/19</a:t>
+              <a:t>4/19/19</a:t>
             </a:fld>
             <a:endParaRPr lang="en-US"/>
           </a:p>
@@ -2000,7 +1998,7 @@
           <a:p>
             <a:fld id="{C33EC7A1-935E-D748-85B9-D6F830ED6136}" type="datetimeFigureOut">
               <a:rPr lang="en-US" smtClean="0"/>
-              <a:t>4/17/19</a:t>
+              <a:t>4/19/19</a:t>
             </a:fld>
             <a:endParaRPr lang="en-US"/>
           </a:p>
@@ -2412,7 +2410,7 @@
           <a:p>
             <a:fld id="{C33EC7A1-935E-D748-85B9-D6F830ED6136}" type="datetimeFigureOut">
               <a:rPr lang="en-US" smtClean="0"/>
-              <a:t>4/17/19</a:t>
+              <a:t>4/19/19</a:t>
             </a:fld>
             <a:endParaRPr lang="en-US"/>
           </a:p>
@@ -2553,7 +2551,7 @@
           <a:p>
             <a:fld id="{C33EC7A1-935E-D748-85B9-D6F830ED6136}" type="datetimeFigureOut">
               <a:rPr lang="en-US" smtClean="0"/>
-              <a:t>4/17/19</a:t>
+              <a:t>4/19/19</a:t>
             </a:fld>
             <a:endParaRPr lang="en-US"/>
           </a:p>
@@ -2666,7 +2664,7 @@
           <a:p>
             <a:fld id="{C33EC7A1-935E-D748-85B9-D6F830ED6136}" type="datetimeFigureOut">
               <a:rPr lang="en-US" smtClean="0"/>
-              <a:t>4/17/19</a:t>
+              <a:t>4/19/19</a:t>
             </a:fld>
             <a:endParaRPr lang="en-US"/>
           </a:p>
@@ -2977,7 +2975,7 @@
           <a:p>
             <a:fld id="{C33EC7A1-935E-D748-85B9-D6F830ED6136}" type="datetimeFigureOut">
               <a:rPr lang="en-US" smtClean="0"/>
-              <a:t>4/17/19</a:t>
+              <a:t>4/19/19</a:t>
             </a:fld>
             <a:endParaRPr lang="en-US"/>
           </a:p>
@@ -3265,7 +3263,7 @@
           <a:p>
             <a:fld id="{C33EC7A1-935E-D748-85B9-D6F830ED6136}" type="datetimeFigureOut">
               <a:rPr lang="en-US" smtClean="0"/>
-              <a:t>4/17/19</a:t>
+              <a:t>4/19/19</a:t>
             </a:fld>
             <a:endParaRPr lang="en-US"/>
           </a:p>
@@ -3506,7 +3504,7 @@
           <a:p>
             <a:fld id="{C33EC7A1-935E-D748-85B9-D6F830ED6136}" type="datetimeFigureOut">
               <a:rPr lang="en-US" smtClean="0"/>
-              <a:t>4/17/19</a:t>
+              <a:t>4/19/19</a:t>
             </a:fld>
             <a:endParaRPr lang="en-US"/>
           </a:p>
@@ -4103,7 +4101,7 @@
           <a:effectLst/>
           <a:extLst>
             <a:ext uri="{909E8E84-426E-40dd-AFC4-6F175D3DCCD1}">
-              <a14:hiddenFill xmlns:a14="http://schemas.microsoft.com/office/drawing/2010/main" xmlns="">
+              <a14:hiddenFill xmlns="" xmlns:a14="http://schemas.microsoft.com/office/drawing/2010/main">
                 <a:solidFill>
                   <a:srgbClr val="FFFFFF"/>
                 </a:solidFill>
@@ -4530,6 +4528,259 @@
         </p:nvSpPr>
         <p:spPr>
           <a:xfrm>
+            <a:off x="94343" y="365125"/>
+            <a:ext cx="12032343" cy="1166132"/>
+          </a:xfrm>
+        </p:spPr>
+        <p:txBody>
+          <a:bodyPr/>
+          <a:lstStyle/>
+          <a:p>
+            <a:r>
+              <a:rPr lang="en-US" b="1" dirty="0" err="1">
+                <a:solidFill>
+                  <a:srgbClr val="0070C0"/>
+                </a:solidFill>
+              </a:rPr>
+              <a:t>tsfresh</a:t>
+            </a:r>
+            <a:r>
+              <a:rPr lang="en-US" b="1" dirty="0">
+                <a:solidFill>
+                  <a:srgbClr val="0070C0"/>
+                </a:solidFill>
+              </a:rPr>
+              <a:t> – Feature extraction settings </a:t>
+            </a:r>
+            <a:r>
+              <a:rPr lang="en-US" sz="3600" b="1" dirty="0">
+                <a:solidFill>
+                  <a:srgbClr val="0070C0"/>
+                </a:solidFill>
+              </a:rPr>
+              <a:t>(</a:t>
+            </a:r>
+            <a:r>
+              <a:rPr lang="en-US" sz="3600" b="1" dirty="0" err="1">
+                <a:solidFill>
+                  <a:srgbClr val="0070C0"/>
+                </a:solidFill>
+              </a:rPr>
+              <a:t>extract_features</a:t>
+            </a:r>
+            <a:r>
+              <a:rPr lang="en-US" sz="3600" b="1" dirty="0">
+                <a:solidFill>
+                  <a:srgbClr val="0070C0"/>
+                </a:solidFill>
+              </a:rPr>
+              <a:t>)</a:t>
+            </a:r>
+          </a:p>
+        </p:txBody>
+      </p:sp>
+      <p:sp>
+        <p:nvSpPr>
+          <p:cNvPr id="3" name="Content Placeholder 2">
+            <a:extLst>
+              <a:ext uri="{FF2B5EF4-FFF2-40B4-BE49-F238E27FC236}">
+                <a16:creationId xmlns:a16="http://schemas.microsoft.com/office/drawing/2014/main" id="{F21F1551-71FB-9546-80F4-DFF7DA1697AE}"/>
+              </a:ext>
+            </a:extLst>
+          </p:cNvPr>
+          <p:cNvSpPr>
+            <a:spLocks noGrp="1"/>
+          </p:cNvSpPr>
+          <p:nvPr>
+            <p:ph idx="1"/>
+          </p:nvPr>
+        </p:nvSpPr>
+        <p:spPr/>
+        <p:txBody>
+          <a:bodyPr/>
+          <a:lstStyle/>
+          <a:p>
+            <a:r>
+              <a:rPr lang="en-US" dirty="0" err="1"/>
+              <a:t>MinimalFCParameters</a:t>
+            </a:r>
+            <a:endParaRPr lang="en-US" dirty="0"/>
+          </a:p>
+          <a:p>
+            <a:endParaRPr lang="en-US" dirty="0"/>
+          </a:p>
+          <a:p>
+            <a:pPr marL="0" indent="0">
+              <a:buNone/>
+            </a:pPr>
+            <a:endParaRPr lang="en-US" dirty="0"/>
+          </a:p>
+          <a:p>
+            <a:r>
+              <a:rPr lang="en-US" dirty="0" err="1"/>
+              <a:t>EfficientFCParameters</a:t>
+            </a:r>
+            <a:endParaRPr lang="en-US" dirty="0"/>
+          </a:p>
+          <a:p>
+            <a:endParaRPr lang="en-US" dirty="0"/>
+          </a:p>
+          <a:p>
+            <a:endParaRPr lang="en-US" dirty="0"/>
+          </a:p>
+          <a:p>
+            <a:r>
+              <a:rPr lang="en-US" dirty="0" err="1"/>
+              <a:t>ComprehensiveFCParameters</a:t>
+            </a:r>
+            <a:endParaRPr lang="en-US" dirty="0"/>
+          </a:p>
+          <a:p>
+            <a:endParaRPr lang="en-US" dirty="0"/>
+          </a:p>
+          <a:p>
+            <a:endParaRPr lang="en-US" dirty="0"/>
+          </a:p>
+        </p:txBody>
+      </p:sp>
+      <p:pic>
+        <p:nvPicPr>
+          <p:cNvPr id="13" name="Picture 12">
+            <a:extLst>
+              <a:ext uri="{FF2B5EF4-FFF2-40B4-BE49-F238E27FC236}">
+                <a16:creationId xmlns:a16="http://schemas.microsoft.com/office/drawing/2014/main" id="{C682ECAD-A1D7-9A4A-8B08-3F79369FD8A1}"/>
+              </a:ext>
+            </a:extLst>
+          </p:cNvPr>
+          <p:cNvPicPr>
+            <a:picLocks noChangeAspect="1"/>
+          </p:cNvPicPr>
+          <p:nvPr/>
+        </p:nvPicPr>
+        <p:blipFill>
+          <a:blip r:embed="rId2"/>
+          <a:stretch>
+            <a:fillRect/>
+          </a:stretch>
+        </p:blipFill>
+        <p:spPr>
+          <a:xfrm>
+            <a:off x="1725226" y="2393844"/>
+            <a:ext cx="8572500" cy="825500"/>
+          </a:xfrm>
+          <a:prstGeom prst="rect">
+            <a:avLst/>
+          </a:prstGeom>
+        </p:spPr>
+      </p:pic>
+      <p:pic>
+        <p:nvPicPr>
+          <p:cNvPr id="15" name="Picture 14">
+            <a:extLst>
+              <a:ext uri="{FF2B5EF4-FFF2-40B4-BE49-F238E27FC236}">
+                <a16:creationId xmlns:a16="http://schemas.microsoft.com/office/drawing/2014/main" id="{79048863-719E-7240-AAC6-5708C5F14816}"/>
+              </a:ext>
+            </a:extLst>
+          </p:cNvPr>
+          <p:cNvPicPr>
+            <a:picLocks noChangeAspect="1"/>
+          </p:cNvPicPr>
+          <p:nvPr/>
+        </p:nvPicPr>
+        <p:blipFill>
+          <a:blip r:embed="rId3"/>
+          <a:stretch>
+            <a:fillRect/>
+          </a:stretch>
+        </p:blipFill>
+        <p:spPr>
+          <a:xfrm>
+            <a:off x="1687126" y="3898053"/>
+            <a:ext cx="8648700" cy="800100"/>
+          </a:xfrm>
+          <a:prstGeom prst="rect">
+            <a:avLst/>
+          </a:prstGeom>
+        </p:spPr>
+      </p:pic>
+      <p:pic>
+        <p:nvPicPr>
+          <p:cNvPr id="17" name="Picture 16">
+            <a:extLst>
+              <a:ext uri="{FF2B5EF4-FFF2-40B4-BE49-F238E27FC236}">
+                <a16:creationId xmlns:a16="http://schemas.microsoft.com/office/drawing/2014/main" id="{1B5C8D7D-1629-8D4F-A28A-F14EF4D6A0D1}"/>
+              </a:ext>
+            </a:extLst>
+          </p:cNvPr>
+          <p:cNvPicPr>
+            <a:picLocks noChangeAspect="1"/>
+          </p:cNvPicPr>
+          <p:nvPr/>
+        </p:nvPicPr>
+        <p:blipFill>
+          <a:blip r:embed="rId4"/>
+          <a:stretch>
+            <a:fillRect/>
+          </a:stretch>
+        </p:blipFill>
+        <p:spPr>
+          <a:xfrm>
+            <a:off x="1687126" y="5473700"/>
+            <a:ext cx="8597900" cy="838200"/>
+          </a:xfrm>
+          <a:prstGeom prst="rect">
+            <a:avLst/>
+          </a:prstGeom>
+        </p:spPr>
+      </p:pic>
+    </p:spTree>
+    <p:extLst>
+      <p:ext uri="{BB962C8B-B14F-4D97-AF65-F5344CB8AC3E}">
+        <p14:creationId xmlns:p14="http://schemas.microsoft.com/office/powerpoint/2010/main" val="582790990"/>
+      </p:ext>
+    </p:extLst>
+  </p:cSld>
+  <p:clrMapOvr>
+    <a:masterClrMapping/>
+  </p:clrMapOvr>
+</p:sld>
+</file>
+
+<file path=ppt/slides/slide12.xml><?xml version="1.0" encoding="utf-8"?>
+<p:sld xmlns:a="http://schemas.openxmlformats.org/drawingml/2006/main" xmlns:r="http://schemas.openxmlformats.org/officeDocument/2006/relationships" xmlns:p="http://schemas.openxmlformats.org/presentationml/2006/main">
+  <p:cSld>
+    <p:spTree>
+      <p:nvGrpSpPr>
+        <p:cNvPr id="1" name=""/>
+        <p:cNvGrpSpPr/>
+        <p:nvPr/>
+      </p:nvGrpSpPr>
+      <p:grpSpPr>
+        <a:xfrm>
+          <a:off x="0" y="0"/>
+          <a:ext cx="0" cy="0"/>
+          <a:chOff x="0" y="0"/>
+          <a:chExt cx="0" cy="0"/>
+        </a:xfrm>
+      </p:grpSpPr>
+      <p:sp>
+        <p:nvSpPr>
+          <p:cNvPr id="2" name="Title 1">
+            <a:extLst>
+              <a:ext uri="{FF2B5EF4-FFF2-40B4-BE49-F238E27FC236}">
+                <a16:creationId xmlns:a16="http://schemas.microsoft.com/office/drawing/2014/main" id="{01560502-1667-5140-AF58-5D0A5B061D91}"/>
+              </a:ext>
+            </a:extLst>
+          </p:cNvPr>
+          <p:cNvSpPr>
+            <a:spLocks noGrp="1"/>
+          </p:cNvSpPr>
+          <p:nvPr>
+            <p:ph type="title"/>
+          </p:nvPr>
+        </p:nvSpPr>
+        <p:spPr>
+          <a:xfrm>
             <a:off x="71034" y="18256"/>
             <a:ext cx="10515600" cy="662782"/>
           </a:xfrm>
@@ -4696,7 +4947,7 @@
 </p:sld>
 </file>
 
-<file path=ppt/slides/slide12.xml><?xml version="1.0" encoding="utf-8"?>
+<file path=ppt/slides/slide13.xml><?xml version="1.0" encoding="utf-8"?>
 <p:sld xmlns:a="http://schemas.openxmlformats.org/drawingml/2006/main" xmlns:r="http://schemas.openxmlformats.org/officeDocument/2006/relationships" xmlns:p="http://schemas.openxmlformats.org/presentationml/2006/main">
   <p:cSld>
     <p:spTree>
@@ -5010,7 +5261,7 @@
 </p:sld>
 </file>
 
-<file path=ppt/slides/slide13.xml><?xml version="1.0" encoding="utf-8"?>
+<file path=ppt/slides/slide14.xml><?xml version="1.0" encoding="utf-8"?>
 <p:sld xmlns:a="http://schemas.openxmlformats.org/drawingml/2006/main" xmlns:r="http://schemas.openxmlformats.org/officeDocument/2006/relationships" xmlns:p="http://schemas.openxmlformats.org/presentationml/2006/main">
   <p:cSld>
     <p:spTree>
@@ -5276,204 +5527,6 @@
 </p:sld>
 </file>
 
-<file path=ppt/slides/slide14.xml><?xml version="1.0" encoding="utf-8"?>
-<p:sld xmlns:a="http://schemas.openxmlformats.org/drawingml/2006/main" xmlns:r="http://schemas.openxmlformats.org/officeDocument/2006/relationships" xmlns:p="http://schemas.openxmlformats.org/presentationml/2006/main">
-  <p:cSld>
-    <p:spTree>
-      <p:nvGrpSpPr>
-        <p:cNvPr id="1" name=""/>
-        <p:cNvGrpSpPr/>
-        <p:nvPr/>
-      </p:nvGrpSpPr>
-      <p:grpSpPr>
-        <a:xfrm>
-          <a:off x="0" y="0"/>
-          <a:ext cx="0" cy="0"/>
-          <a:chOff x="0" y="0"/>
-          <a:chExt cx="0" cy="0"/>
-        </a:xfrm>
-      </p:grpSpPr>
-      <p:sp>
-        <p:nvSpPr>
-          <p:cNvPr id="2" name="Title 1">
-            <a:extLst>
-              <a:ext uri="{FF2B5EF4-FFF2-40B4-BE49-F238E27FC236}">
-                <a16:creationId xmlns:a16="http://schemas.microsoft.com/office/drawing/2014/main" id="{01560502-1667-5140-AF58-5D0A5B061D91}"/>
-              </a:ext>
-            </a:extLst>
-          </p:cNvPr>
-          <p:cNvSpPr>
-            <a:spLocks noGrp="1"/>
-          </p:cNvSpPr>
-          <p:nvPr>
-            <p:ph type="title"/>
-          </p:nvPr>
-        </p:nvSpPr>
-        <p:spPr>
-          <a:xfrm>
-            <a:off x="69796" y="417826"/>
-            <a:ext cx="10515600" cy="662782"/>
-          </a:xfrm>
-        </p:spPr>
-        <p:txBody>
-          <a:bodyPr>
-            <a:noAutofit/>
-          </a:bodyPr>
-          <a:lstStyle/>
-          <a:p>
-            <a:r>
-              <a:rPr lang="en-US" b="1" dirty="0" err="1">
-                <a:solidFill>
-                  <a:srgbClr val="0070C0"/>
-                </a:solidFill>
-              </a:rPr>
-              <a:t>tsfresh</a:t>
-            </a:r>
-            <a:r>
-              <a:rPr lang="en-US" b="1" dirty="0">
-                <a:solidFill>
-                  <a:srgbClr val="0070C0"/>
-                </a:solidFill>
-              </a:rPr>
-              <a:t> – Feature selection </a:t>
-            </a:r>
-            <a:r>
-              <a:rPr lang="en-US" sz="4000" b="1" dirty="0">
-                <a:solidFill>
-                  <a:srgbClr val="0070C0"/>
-                </a:solidFill>
-              </a:rPr>
-              <a:t>(null hypothesis)</a:t>
-            </a:r>
-          </a:p>
-        </p:txBody>
-      </p:sp>
-      <p:sp>
-        <p:nvSpPr>
-          <p:cNvPr id="3" name="Content Placeholder 2">
-            <a:extLst>
-              <a:ext uri="{FF2B5EF4-FFF2-40B4-BE49-F238E27FC236}">
-                <a16:creationId xmlns:a16="http://schemas.microsoft.com/office/drawing/2014/main" id="{F21F1551-71FB-9546-80F4-DFF7DA1697AE}"/>
-              </a:ext>
-            </a:extLst>
-          </p:cNvPr>
-          <p:cNvSpPr>
-            <a:spLocks noGrp="1"/>
-          </p:cNvSpPr>
-          <p:nvPr>
-            <p:ph idx="1"/>
-          </p:nvPr>
-        </p:nvSpPr>
-        <p:spPr>
-          <a:xfrm>
-            <a:off x="69796" y="1671944"/>
-            <a:ext cx="11855823" cy="3975821"/>
-          </a:xfrm>
-        </p:spPr>
-        <p:txBody>
-          <a:bodyPr>
-            <a:normAutofit/>
-          </a:bodyPr>
-          <a:lstStyle/>
-          <a:p>
-            <a:r>
-              <a:rPr lang="en-US" dirty="0"/>
-              <a:t>Each feature vector is evaluated individually and independently based on its importance for predicting the target or class label.</a:t>
-            </a:r>
-          </a:p>
-          <a:p>
-            <a:r>
-              <a:rPr lang="en-US" dirty="0"/>
-              <a:t>We are testing</a:t>
-            </a:r>
-          </a:p>
-          <a:p>
-            <a:pPr lvl="1"/>
-            <a:r>
-              <a:rPr lang="en-US" dirty="0"/>
-              <a:t>H</a:t>
-            </a:r>
-            <a:r>
-              <a:rPr lang="en-US" baseline="-25000" dirty="0"/>
-              <a:t>0</a:t>
-            </a:r>
-            <a:r>
-              <a:rPr lang="en-US" dirty="0"/>
-              <a:t> = the Feature is not relevant and should not be added</a:t>
-            </a:r>
-          </a:p>
-          <a:p>
-            <a:r>
-              <a:rPr lang="en-US" dirty="0"/>
-              <a:t>against the following</a:t>
-            </a:r>
-          </a:p>
-          <a:p>
-            <a:pPr lvl="1"/>
-            <a:r>
-              <a:rPr lang="en-US" dirty="0"/>
-              <a:t>H</a:t>
-            </a:r>
-            <a:r>
-              <a:rPr lang="en-US" baseline="-25000" dirty="0"/>
-              <a:t>1</a:t>
-            </a:r>
-            <a:r>
-              <a:rPr lang="en-US" dirty="0"/>
-              <a:t> = the Feature is relevant and should be kept</a:t>
-            </a:r>
-          </a:p>
-          <a:p>
-            <a:r>
-              <a:rPr lang="en-US" dirty="0"/>
-              <a:t>Or in other words</a:t>
-            </a:r>
-          </a:p>
-          <a:p>
-            <a:pPr lvl="1"/>
-            <a:r>
-              <a:rPr lang="en-US" dirty="0"/>
-              <a:t>H</a:t>
-            </a:r>
-            <a:r>
-              <a:rPr lang="en-US" baseline="-25000" dirty="0"/>
-              <a:t>0</a:t>
-            </a:r>
-            <a:r>
-              <a:rPr lang="en-US" dirty="0"/>
-              <a:t> = Target and Feature are independent / the Feature has no influence on the target</a:t>
-            </a:r>
-          </a:p>
-          <a:p>
-            <a:pPr lvl="1"/>
-            <a:r>
-              <a:rPr lang="en-US" dirty="0"/>
-              <a:t>H</a:t>
-            </a:r>
-            <a:r>
-              <a:rPr lang="en-US" baseline="-25000" dirty="0"/>
-              <a:t>1</a:t>
-            </a:r>
-            <a:r>
-              <a:rPr lang="en-US" dirty="0"/>
-              <a:t> = Target and Feature are associated / dependent</a:t>
-            </a:r>
-          </a:p>
-        </p:txBody>
-      </p:sp>
-    </p:spTree>
-    <p:extLst>
-      <p:ext uri="{BB962C8B-B14F-4D97-AF65-F5344CB8AC3E}">
-        <p14:creationId xmlns:p14="http://schemas.microsoft.com/office/powerpoint/2010/main" val="3845737687"/>
-      </p:ext>
-    </p:extLst>
-  </p:cSld>
-  <p:clrMapOvr>
-    <a:masterClrMapping/>
-  </p:clrMapOvr>
-</p:sld>
-</file>
-
 <file path=ppt/slides/slide15.xml><?xml version="1.0" encoding="utf-8"?>
 <p:sld xmlns:a="http://schemas.openxmlformats.org/drawingml/2006/main" xmlns:r="http://schemas.openxmlformats.org/officeDocument/2006/relationships" xmlns:p="http://schemas.openxmlformats.org/presentationml/2006/main">
   <p:cSld>
@@ -5509,7 +5562,7 @@
         </p:nvSpPr>
         <p:spPr>
           <a:xfrm>
-            <a:off x="399570" y="348669"/>
+            <a:off x="69796" y="417826"/>
             <a:ext cx="10515600" cy="662782"/>
           </a:xfrm>
         </p:spPr>
@@ -5541,7 +5594,7 @@
                   <a:srgbClr val="0070C0"/>
                 </a:solidFill>
               </a:rPr>
-              <a:t>(p-value)</a:t>
+              <a:t>(null hypothesis)</a:t>
             </a:r>
           </a:p>
         </p:txBody>
@@ -5564,8 +5617,8 @@
         </p:nvSpPr>
         <p:spPr>
           <a:xfrm>
-            <a:off x="168088" y="1771836"/>
-            <a:ext cx="11918897" cy="4575176"/>
+            <a:off x="69796" y="1671944"/>
+            <a:ext cx="11855823" cy="3975821"/>
           </a:xfrm>
         </p:spPr>
         <p:txBody>
@@ -5576,108 +5629,85 @@
           <a:p>
             <a:r>
               <a:rPr lang="en-US" dirty="0"/>
-              <a:t>When you perform a hypothesis test in statistics, a </a:t>
-            </a:r>
-            <a:r>
-              <a:rPr lang="en-US" b="1" dirty="0"/>
-              <a:t>p</a:t>
-            </a:r>
-            <a:r>
-              <a:rPr lang="en-US" dirty="0"/>
-              <a:t>-</a:t>
-            </a:r>
-            <a:r>
-              <a:rPr lang="en-US" b="1" dirty="0"/>
-              <a:t>value</a:t>
-            </a:r>
-            <a:r>
-              <a:rPr lang="en-US" dirty="0"/>
-              <a:t> helps you determine the significance of your results. </a:t>
-            </a:r>
-          </a:p>
-          <a:p>
-            <a:r>
-              <a:rPr lang="en-US" dirty="0"/>
-              <a:t>The </a:t>
-            </a:r>
-            <a:r>
-              <a:rPr lang="en-US" b="1" dirty="0"/>
-              <a:t>p</a:t>
-            </a:r>
-            <a:r>
-              <a:rPr lang="en-US" dirty="0"/>
-              <a:t>-</a:t>
-            </a:r>
-            <a:r>
-              <a:rPr lang="en-US" b="1" dirty="0"/>
-              <a:t>value</a:t>
-            </a:r>
-            <a:r>
-              <a:rPr lang="en-US" dirty="0"/>
-              <a:t> is a number between 0 and 1 and interpreted in the following way: </a:t>
+              <a:t>Each feature vector is evaluated individually and independently based on its importance for predicting the target or class label.</a:t>
+            </a:r>
+          </a:p>
+          <a:p>
+            <a:r>
+              <a:rPr lang="en-US" dirty="0"/>
+              <a:t>We are testing</a:t>
             </a:r>
           </a:p>
           <a:p>
             <a:pPr lvl="1"/>
             <a:r>
               <a:rPr lang="en-US" dirty="0"/>
-              <a:t>A </a:t>
-            </a:r>
-            <a:r>
-              <a:rPr lang="en-US" b="1" dirty="0"/>
-              <a:t>small p</a:t>
-            </a:r>
-            <a:r>
-              <a:rPr lang="en-US" dirty="0"/>
-              <a:t>-</a:t>
-            </a:r>
-            <a:r>
-              <a:rPr lang="en-US" b="1" dirty="0"/>
-              <a:t>value</a:t>
-            </a:r>
-            <a:r>
-              <a:rPr lang="en-US" dirty="0"/>
-              <a:t> (typically ≤ 0.05) indicates strong evidence against the null hypothesis that the feature is not relevant and should not be added</a:t>
+              <a:t>H</a:t>
+            </a:r>
+            <a:r>
+              <a:rPr lang="en-US" baseline="-25000" dirty="0"/>
+              <a:t>0</a:t>
+            </a:r>
+            <a:r>
+              <a:rPr lang="en-US" dirty="0"/>
+              <a:t> = the Feature is not relevant and should not be added</a:t>
+            </a:r>
+          </a:p>
+          <a:p>
+            <a:r>
+              <a:rPr lang="en-US" dirty="0"/>
+              <a:t>against the following</a:t>
             </a:r>
           </a:p>
           <a:p>
             <a:pPr lvl="1"/>
             <a:r>
               <a:rPr lang="en-US" dirty="0"/>
-              <a:t>Meaning that, we reject the null hypothesis and the feature should be kept.</a:t>
+              <a:t>H</a:t>
+            </a:r>
+            <a:r>
+              <a:rPr lang="en-US" baseline="-25000" dirty="0"/>
+              <a:t>1</a:t>
+            </a:r>
+            <a:r>
+              <a:rPr lang="en-US" dirty="0"/>
+              <a:t> = the Feature is relevant and should be kept</a:t>
+            </a:r>
+          </a:p>
+          <a:p>
+            <a:r>
+              <a:rPr lang="en-US" dirty="0"/>
+              <a:t>Or in other words</a:t>
             </a:r>
           </a:p>
           <a:p>
             <a:pPr lvl="1"/>
             <a:r>
               <a:rPr lang="en-US" dirty="0"/>
-              <a:t>A </a:t>
-            </a:r>
-            <a:r>
-              <a:rPr lang="en-US" b="1" dirty="0"/>
-              <a:t>large p-value </a:t>
-            </a:r>
-            <a:r>
-              <a:rPr lang="en-US" dirty="0"/>
-              <a:t>(&gt;0.05) indicates weak evidence against the null hypothesis, so we fail to reject the null hypothesis.</a:t>
-            </a:r>
-          </a:p>
-          <a:p>
-            <a:r>
-              <a:rPr lang="en-US" dirty="0"/>
-              <a:t>Always report the </a:t>
-            </a:r>
-            <a:r>
-              <a:rPr lang="en-US" b="1" i="1" dirty="0"/>
-              <a:t>p</a:t>
-            </a:r>
-            <a:r>
-              <a:rPr lang="en-US" b="1" dirty="0"/>
-              <a:t>-value</a:t>
-            </a:r>
-            <a:r>
-              <a:rPr lang="en-US" dirty="0"/>
-              <a:t> so your readers can draw their own conclusions.</a:t>
+              <a:t>H</a:t>
+            </a:r>
+            <a:r>
+              <a:rPr lang="en-US" baseline="-25000" dirty="0"/>
+              <a:t>0</a:t>
+            </a:r>
+            <a:r>
+              <a:rPr lang="en-US" dirty="0"/>
+              <a:t> = Target and Feature are independent / the Feature has no influence on the target</a:t>
+            </a:r>
+          </a:p>
+          <a:p>
+            <a:pPr lvl="1"/>
+            <a:r>
+              <a:rPr lang="en-US" dirty="0"/>
+              <a:t>H</a:t>
+            </a:r>
+            <a:r>
+              <a:rPr lang="en-US" baseline="-25000" dirty="0"/>
+              <a:t>1</a:t>
+            </a:r>
+            <a:r>
+              <a:rPr lang="en-US" dirty="0"/>
+              <a:t> = Target and Feature are associated / dependent</a:t>
             </a:r>
           </a:p>
         </p:txBody>
@@ -5685,7 +5715,7 @@
     </p:spTree>
     <p:extLst>
       <p:ext uri="{BB962C8B-B14F-4D97-AF65-F5344CB8AC3E}">
-        <p14:creationId xmlns:p14="http://schemas.microsoft.com/office/powerpoint/2010/main" val="1032148696"/>
+        <p14:creationId xmlns:p14="http://schemas.microsoft.com/office/powerpoint/2010/main" val="3845737687"/>
       </p:ext>
     </p:extLst>
   </p:cSld>
@@ -5728,6 +5758,227 @@
             <p:ph type="title"/>
           </p:nvPr>
         </p:nvSpPr>
+        <p:spPr>
+          <a:xfrm>
+            <a:off x="399570" y="348669"/>
+            <a:ext cx="10515600" cy="662782"/>
+          </a:xfrm>
+        </p:spPr>
+        <p:txBody>
+          <a:bodyPr>
+            <a:noAutofit/>
+          </a:bodyPr>
+          <a:lstStyle/>
+          <a:p>
+            <a:r>
+              <a:rPr lang="en-US" b="1" dirty="0" err="1">
+                <a:solidFill>
+                  <a:srgbClr val="0070C0"/>
+                </a:solidFill>
+              </a:rPr>
+              <a:t>tsfresh</a:t>
+            </a:r>
+            <a:r>
+              <a:rPr lang="en-US" b="1" dirty="0">
+                <a:solidFill>
+                  <a:srgbClr val="0070C0"/>
+                </a:solidFill>
+              </a:rPr>
+              <a:t> – Feature selection </a:t>
+            </a:r>
+            <a:r>
+              <a:rPr lang="en-US" sz="4000" b="1" dirty="0">
+                <a:solidFill>
+                  <a:srgbClr val="0070C0"/>
+                </a:solidFill>
+              </a:rPr>
+              <a:t>(p-value)</a:t>
+            </a:r>
+          </a:p>
+        </p:txBody>
+      </p:sp>
+      <p:sp>
+        <p:nvSpPr>
+          <p:cNvPr id="3" name="Content Placeholder 2">
+            <a:extLst>
+              <a:ext uri="{FF2B5EF4-FFF2-40B4-BE49-F238E27FC236}">
+                <a16:creationId xmlns:a16="http://schemas.microsoft.com/office/drawing/2014/main" id="{F21F1551-71FB-9546-80F4-DFF7DA1697AE}"/>
+              </a:ext>
+            </a:extLst>
+          </p:cNvPr>
+          <p:cNvSpPr>
+            <a:spLocks noGrp="1"/>
+          </p:cNvSpPr>
+          <p:nvPr>
+            <p:ph idx="1"/>
+          </p:nvPr>
+        </p:nvSpPr>
+        <p:spPr>
+          <a:xfrm>
+            <a:off x="168088" y="1771836"/>
+            <a:ext cx="11918897" cy="4575176"/>
+          </a:xfrm>
+        </p:spPr>
+        <p:txBody>
+          <a:bodyPr>
+            <a:normAutofit/>
+          </a:bodyPr>
+          <a:lstStyle/>
+          <a:p>
+            <a:r>
+              <a:rPr lang="en-US" dirty="0"/>
+              <a:t>When you perform a hypothesis test in statistics, a </a:t>
+            </a:r>
+            <a:r>
+              <a:rPr lang="en-US" b="1" dirty="0"/>
+              <a:t>p</a:t>
+            </a:r>
+            <a:r>
+              <a:rPr lang="en-US" dirty="0"/>
+              <a:t>-</a:t>
+            </a:r>
+            <a:r>
+              <a:rPr lang="en-US" b="1" dirty="0"/>
+              <a:t>value</a:t>
+            </a:r>
+            <a:r>
+              <a:rPr lang="en-US" dirty="0"/>
+              <a:t> helps you determine the significance of your results. </a:t>
+            </a:r>
+          </a:p>
+          <a:p>
+            <a:r>
+              <a:rPr lang="en-US" dirty="0"/>
+              <a:t>The </a:t>
+            </a:r>
+            <a:r>
+              <a:rPr lang="en-US" b="1" dirty="0"/>
+              <a:t>p</a:t>
+            </a:r>
+            <a:r>
+              <a:rPr lang="en-US" dirty="0"/>
+              <a:t>-</a:t>
+            </a:r>
+            <a:r>
+              <a:rPr lang="en-US" b="1" dirty="0"/>
+              <a:t>value</a:t>
+            </a:r>
+            <a:r>
+              <a:rPr lang="en-US" dirty="0"/>
+              <a:t> is a number between 0 and 1 and interpreted in the following way: </a:t>
+            </a:r>
+          </a:p>
+          <a:p>
+            <a:pPr lvl="1"/>
+            <a:r>
+              <a:rPr lang="en-US" dirty="0"/>
+              <a:t>A </a:t>
+            </a:r>
+            <a:r>
+              <a:rPr lang="en-US" b="1" dirty="0"/>
+              <a:t>small p</a:t>
+            </a:r>
+            <a:r>
+              <a:rPr lang="en-US" dirty="0"/>
+              <a:t>-</a:t>
+            </a:r>
+            <a:r>
+              <a:rPr lang="en-US" b="1" dirty="0"/>
+              <a:t>value</a:t>
+            </a:r>
+            <a:r>
+              <a:rPr lang="en-US" dirty="0"/>
+              <a:t> (typically ≤ 0.05) indicates strong evidence against the null hypothesis that the feature is not relevant and should not be added</a:t>
+            </a:r>
+          </a:p>
+          <a:p>
+            <a:pPr lvl="1"/>
+            <a:r>
+              <a:rPr lang="en-US" dirty="0"/>
+              <a:t>Meaning that, we reject the null hypothesis and the feature should be kept.</a:t>
+            </a:r>
+          </a:p>
+          <a:p>
+            <a:pPr lvl="1"/>
+            <a:r>
+              <a:rPr lang="en-US" dirty="0"/>
+              <a:t>A </a:t>
+            </a:r>
+            <a:r>
+              <a:rPr lang="en-US" b="1" dirty="0"/>
+              <a:t>large p-value </a:t>
+            </a:r>
+            <a:r>
+              <a:rPr lang="en-US" dirty="0"/>
+              <a:t>(&gt;0.05) indicates weak evidence against the null hypothesis, so we fail to reject the null hypothesis.</a:t>
+            </a:r>
+          </a:p>
+          <a:p>
+            <a:r>
+              <a:rPr lang="en-US" dirty="0"/>
+              <a:t>Always report the </a:t>
+            </a:r>
+            <a:r>
+              <a:rPr lang="en-US" b="1" i="1" dirty="0"/>
+              <a:t>p</a:t>
+            </a:r>
+            <a:r>
+              <a:rPr lang="en-US" b="1" dirty="0"/>
+              <a:t>-value</a:t>
+            </a:r>
+            <a:r>
+              <a:rPr lang="en-US" dirty="0"/>
+              <a:t> so your readers can draw their own conclusions.</a:t>
+            </a:r>
+          </a:p>
+        </p:txBody>
+      </p:sp>
+    </p:spTree>
+    <p:extLst>
+      <p:ext uri="{BB962C8B-B14F-4D97-AF65-F5344CB8AC3E}">
+        <p14:creationId xmlns:p14="http://schemas.microsoft.com/office/powerpoint/2010/main" val="1032148696"/>
+      </p:ext>
+    </p:extLst>
+  </p:cSld>
+  <p:clrMapOvr>
+    <a:masterClrMapping/>
+  </p:clrMapOvr>
+</p:sld>
+</file>
+
+<file path=ppt/slides/slide17.xml><?xml version="1.0" encoding="utf-8"?>
+<p:sld xmlns:a="http://schemas.openxmlformats.org/drawingml/2006/main" xmlns:r="http://schemas.openxmlformats.org/officeDocument/2006/relationships" xmlns:p="http://schemas.openxmlformats.org/presentationml/2006/main">
+  <p:cSld>
+    <p:spTree>
+      <p:nvGrpSpPr>
+        <p:cNvPr id="1" name=""/>
+        <p:cNvGrpSpPr/>
+        <p:nvPr/>
+      </p:nvGrpSpPr>
+      <p:grpSpPr>
+        <a:xfrm>
+          <a:off x="0" y="0"/>
+          <a:ext cx="0" cy="0"/>
+          <a:chOff x="0" y="0"/>
+          <a:chExt cx="0" cy="0"/>
+        </a:xfrm>
+      </p:grpSpPr>
+      <p:sp>
+        <p:nvSpPr>
+          <p:cNvPr id="2" name="Title 1">
+            <a:extLst>
+              <a:ext uri="{FF2B5EF4-FFF2-40B4-BE49-F238E27FC236}">
+                <a16:creationId xmlns:a16="http://schemas.microsoft.com/office/drawing/2014/main" id="{01560502-1667-5140-AF58-5D0A5B061D91}"/>
+              </a:ext>
+            </a:extLst>
+          </p:cNvPr>
+          <p:cNvSpPr>
+            <a:spLocks noGrp="1"/>
+          </p:cNvSpPr>
+          <p:nvPr>
+            <p:ph type="title"/>
+          </p:nvPr>
+        </p:nvSpPr>
         <p:spPr/>
         <p:txBody>
           <a:bodyPr/>
@@ -5844,8 +6095,8 @@
         </p:blipFill>
         <p:spPr>
           <a:xfrm>
-            <a:off x="3162138" y="4874787"/>
-            <a:ext cx="5372592" cy="1437113"/>
+            <a:off x="3555999" y="4891793"/>
+            <a:ext cx="4586516" cy="1226846"/>
           </a:xfrm>
           <a:prstGeom prst="rect">
             <a:avLst/>
@@ -5865,7 +6116,7 @@
 </p:sld>
 </file>
 
-<file path=ppt/slides/slide17.xml><?xml version="1.0" encoding="utf-8"?>
+<file path=ppt/slides/slide18.xml><?xml version="1.0" encoding="utf-8"?>
 <p:sld xmlns:a="http://schemas.openxmlformats.org/drawingml/2006/main" xmlns:r="http://schemas.openxmlformats.org/officeDocument/2006/relationships" xmlns:p="http://schemas.openxmlformats.org/presentationml/2006/main">
   <p:cSld>
     <p:spTree>
@@ -5970,101 +6221,6 @@
 </p:sld>
 </file>
 
-<file path=ppt/slides/slide18.xml><?xml version="1.0" encoding="utf-8"?>
-<p:sld xmlns:a="http://schemas.openxmlformats.org/drawingml/2006/main" xmlns:r="http://schemas.openxmlformats.org/officeDocument/2006/relationships" xmlns:p="http://schemas.openxmlformats.org/presentationml/2006/main">
-  <p:cSld>
-    <p:spTree>
-      <p:nvGrpSpPr>
-        <p:cNvPr id="1" name=""/>
-        <p:cNvGrpSpPr/>
-        <p:nvPr/>
-      </p:nvGrpSpPr>
-      <p:grpSpPr>
-        <a:xfrm>
-          <a:off x="0" y="0"/>
-          <a:ext cx="0" cy="0"/>
-          <a:chOff x="0" y="0"/>
-          <a:chExt cx="0" cy="0"/>
-        </a:xfrm>
-      </p:grpSpPr>
-      <p:sp>
-        <p:nvSpPr>
-          <p:cNvPr id="2" name="Title 1">
-            <a:extLst>
-              <a:ext uri="{FF2B5EF4-FFF2-40B4-BE49-F238E27FC236}">
-                <a16:creationId xmlns:a16="http://schemas.microsoft.com/office/drawing/2014/main" id="{01560502-1667-5140-AF58-5D0A5B061D91}"/>
-              </a:ext>
-            </a:extLst>
-          </p:cNvPr>
-          <p:cNvSpPr>
-            <a:spLocks noGrp="1"/>
-          </p:cNvSpPr>
-          <p:nvPr>
-            <p:ph type="title"/>
-          </p:nvPr>
-        </p:nvSpPr>
-        <p:spPr/>
-        <p:txBody>
-          <a:bodyPr/>
-          <a:lstStyle/>
-          <a:p>
-            <a:r>
-              <a:rPr lang="en-US" b="1" dirty="0" err="1">
-                <a:solidFill>
-                  <a:srgbClr val="0070C0"/>
-                </a:solidFill>
-              </a:rPr>
-              <a:t>tsfresh</a:t>
-            </a:r>
-            <a:r>
-              <a:rPr lang="en-US" b="1" dirty="0">
-                <a:solidFill>
-                  <a:srgbClr val="0070C0"/>
-                </a:solidFill>
-              </a:rPr>
-              <a:t> – Data Formats</a:t>
-            </a:r>
-          </a:p>
-        </p:txBody>
-      </p:sp>
-      <p:sp>
-        <p:nvSpPr>
-          <p:cNvPr id="3" name="Content Placeholder 2">
-            <a:extLst>
-              <a:ext uri="{FF2B5EF4-FFF2-40B4-BE49-F238E27FC236}">
-                <a16:creationId xmlns:a16="http://schemas.microsoft.com/office/drawing/2014/main" id="{F21F1551-71FB-9546-80F4-DFF7DA1697AE}"/>
-              </a:ext>
-            </a:extLst>
-          </p:cNvPr>
-          <p:cNvSpPr>
-            <a:spLocks noGrp="1"/>
-          </p:cNvSpPr>
-          <p:nvPr>
-            <p:ph idx="1"/>
-          </p:nvPr>
-        </p:nvSpPr>
-        <p:spPr/>
-        <p:txBody>
-          <a:bodyPr/>
-          <a:lstStyle/>
-          <a:p>
-            <a:endParaRPr lang="en-US" dirty="0"/>
-          </a:p>
-        </p:txBody>
-      </p:sp>
-    </p:spTree>
-    <p:extLst>
-      <p:ext uri="{BB962C8B-B14F-4D97-AF65-F5344CB8AC3E}">
-        <p14:creationId xmlns:p14="http://schemas.microsoft.com/office/powerpoint/2010/main" val="396562324"/>
-      </p:ext>
-    </p:extLst>
-  </p:cSld>
-  <p:clrMapOvr>
-    <a:masterClrMapping/>
-  </p:clrMapOvr>
-</p:sld>
-</file>
-
 <file path=ppt/slides/slide19.xml><?xml version="1.0" encoding="utf-8"?>
 <p:sld xmlns:a="http://schemas.openxmlformats.org/drawingml/2006/main" xmlns:r="http://schemas.openxmlformats.org/officeDocument/2006/relationships" xmlns:p="http://schemas.openxmlformats.org/presentationml/2006/main">
   <p:cSld>
@@ -6117,23 +6273,7 @@
                   <a:srgbClr val="0070C0"/>
                 </a:solidFill>
               </a:rPr>
-              <a:t> – </a:t>
-            </a:r>
-            <a:r>
-              <a:rPr lang="en-US" b="1" dirty="0" err="1">
-                <a:solidFill>
-                  <a:srgbClr val="0070C0"/>
-                </a:solidFill>
-              </a:rPr>
-              <a:t>scikit</a:t>
-            </a:r>
-            <a:r>
-              <a:rPr lang="en-US" b="1" dirty="0">
-                <a:solidFill>
-                  <a:srgbClr val="0070C0"/>
-                </a:solidFill>
-              </a:rPr>
-              <a:t>-learn Transformers</a:t>
+              <a:t> – Data Formats</a:t>
             </a:r>
           </a:p>
         </p:txBody>
@@ -6166,7 +6306,7 @@
     </p:spTree>
     <p:extLst>
       <p:ext uri="{BB962C8B-B14F-4D97-AF65-F5344CB8AC3E}">
-        <p14:creationId xmlns:p14="http://schemas.microsoft.com/office/powerpoint/2010/main" val="636674178"/>
+        <p14:creationId xmlns:p14="http://schemas.microsoft.com/office/powerpoint/2010/main" val="396562324"/>
       </p:ext>
     </p:extLst>
   </p:cSld>
@@ -6379,7 +6519,23 @@
                   <a:srgbClr val="0070C0"/>
                 </a:solidFill>
               </a:rPr>
-              <a:t> – Feature extraction settings</a:t>
+              <a:t> – </a:t>
+            </a:r>
+            <a:r>
+              <a:rPr lang="en-US" b="1" dirty="0" err="1">
+                <a:solidFill>
+                  <a:srgbClr val="0070C0"/>
+                </a:solidFill>
+              </a:rPr>
+              <a:t>scikit</a:t>
+            </a:r>
+            <a:r>
+              <a:rPr lang="en-US" b="1" dirty="0">
+                <a:solidFill>
+                  <a:srgbClr val="0070C0"/>
+                </a:solidFill>
+              </a:rPr>
+              <a:t>-learn Transformers</a:t>
             </a:r>
           </a:p>
         </p:txBody>
@@ -6405,143 +6561,14 @@
           <a:bodyPr/>
           <a:lstStyle/>
           <a:p>
-            <a:r>
-              <a:rPr lang="en-US" dirty="0" err="1"/>
-              <a:t>MinimalFCParameters</a:t>
-            </a:r>
             <a:endParaRPr lang="en-US" dirty="0"/>
           </a:p>
-          <a:p>
-            <a:endParaRPr lang="en-US" dirty="0"/>
-          </a:p>
-          <a:p>
-            <a:pPr marL="0" indent="0">
-              <a:buNone/>
-            </a:pPr>
-            <a:endParaRPr lang="en-US" dirty="0"/>
-          </a:p>
-          <a:p>
-            <a:r>
-              <a:rPr lang="en-US" dirty="0" err="1"/>
-              <a:t>EfficientFCParameters</a:t>
-            </a:r>
-            <a:endParaRPr lang="en-US" dirty="0"/>
-          </a:p>
-          <a:p>
-            <a:endParaRPr lang="en-US" dirty="0"/>
-          </a:p>
-          <a:p>
-            <a:endParaRPr lang="en-US" dirty="0"/>
-          </a:p>
-          <a:p>
-            <a:r>
-              <a:rPr lang="en-US" dirty="0" err="1"/>
-              <a:t>ComprehensiveFCParameters</a:t>
-            </a:r>
-            <a:endParaRPr lang="en-US" dirty="0"/>
-          </a:p>
-          <a:p>
-            <a:endParaRPr lang="en-US" dirty="0"/>
-          </a:p>
-          <a:p>
-            <a:endParaRPr lang="en-US" dirty="0"/>
-          </a:p>
-        </p:txBody>
-      </p:sp>
-      <p:pic>
-        <p:nvPicPr>
-          <p:cNvPr id="13" name="Picture 12">
-            <a:extLst>
-              <a:ext uri="{FF2B5EF4-FFF2-40B4-BE49-F238E27FC236}">
-                <a16:creationId xmlns:a16="http://schemas.microsoft.com/office/drawing/2014/main" id="{C682ECAD-A1D7-9A4A-8B08-3F79369FD8A1}"/>
-              </a:ext>
-            </a:extLst>
-          </p:cNvPr>
-          <p:cNvPicPr>
-            <a:picLocks noChangeAspect="1"/>
-          </p:cNvPicPr>
-          <p:nvPr/>
-        </p:nvPicPr>
-        <p:blipFill>
-          <a:blip r:embed="rId2"/>
-          <a:stretch>
-            <a:fillRect/>
-          </a:stretch>
-        </p:blipFill>
-        <p:spPr>
-          <a:xfrm>
-            <a:off x="1725226" y="2393844"/>
-            <a:ext cx="8572500" cy="825500"/>
-          </a:xfrm>
-          <a:prstGeom prst="rect">
-            <a:avLst/>
-          </a:prstGeom>
-        </p:spPr>
-      </p:pic>
-      <p:pic>
-        <p:nvPicPr>
-          <p:cNvPr id="15" name="Picture 14">
-            <a:extLst>
-              <a:ext uri="{FF2B5EF4-FFF2-40B4-BE49-F238E27FC236}">
-                <a16:creationId xmlns:a16="http://schemas.microsoft.com/office/drawing/2014/main" id="{79048863-719E-7240-AAC6-5708C5F14816}"/>
-              </a:ext>
-            </a:extLst>
-          </p:cNvPr>
-          <p:cNvPicPr>
-            <a:picLocks noChangeAspect="1"/>
-          </p:cNvPicPr>
-          <p:nvPr/>
-        </p:nvPicPr>
-        <p:blipFill>
-          <a:blip r:embed="rId3"/>
-          <a:stretch>
-            <a:fillRect/>
-          </a:stretch>
-        </p:blipFill>
-        <p:spPr>
-          <a:xfrm>
-            <a:off x="1687126" y="3898053"/>
-            <a:ext cx="8648700" cy="800100"/>
-          </a:xfrm>
-          <a:prstGeom prst="rect">
-            <a:avLst/>
-          </a:prstGeom>
-        </p:spPr>
-      </p:pic>
-      <p:pic>
-        <p:nvPicPr>
-          <p:cNvPr id="17" name="Picture 16">
-            <a:extLst>
-              <a:ext uri="{FF2B5EF4-FFF2-40B4-BE49-F238E27FC236}">
-                <a16:creationId xmlns:a16="http://schemas.microsoft.com/office/drawing/2014/main" id="{1B5C8D7D-1629-8D4F-A28A-F14EF4D6A0D1}"/>
-              </a:ext>
-            </a:extLst>
-          </p:cNvPr>
-          <p:cNvPicPr>
-            <a:picLocks noChangeAspect="1"/>
-          </p:cNvPicPr>
-          <p:nvPr/>
-        </p:nvPicPr>
-        <p:blipFill>
-          <a:blip r:embed="rId4"/>
-          <a:stretch>
-            <a:fillRect/>
-          </a:stretch>
-        </p:blipFill>
-        <p:spPr>
-          <a:xfrm>
-            <a:off x="1687126" y="5473700"/>
-            <a:ext cx="8597900" cy="838200"/>
-          </a:xfrm>
-          <a:prstGeom prst="rect">
-            <a:avLst/>
-          </a:prstGeom>
-        </p:spPr>
-      </p:pic>
+        </p:txBody>
+      </p:sp>
     </p:spTree>
     <p:extLst>
       <p:ext uri="{BB962C8B-B14F-4D97-AF65-F5344CB8AC3E}">
-        <p14:creationId xmlns:p14="http://schemas.microsoft.com/office/powerpoint/2010/main" val="582790990"/>
+        <p14:creationId xmlns:p14="http://schemas.microsoft.com/office/powerpoint/2010/main" val="636674178"/>
       </p:ext>
     </p:extLst>
   </p:cSld>
@@ -6603,109 +6630,6 @@
                   <a:srgbClr val="0070C0"/>
                 </a:solidFill>
               </a:rPr>
-              <a:t> – Feature selection </a:t>
-            </a:r>
-            <a:r>
-              <a:rPr lang="en-US" sz="2800" b="1" dirty="0">
-                <a:solidFill>
-                  <a:srgbClr val="0070C0"/>
-                </a:solidFill>
-              </a:rPr>
-              <a:t>(Feature significance testing)</a:t>
-            </a:r>
-          </a:p>
-        </p:txBody>
-      </p:sp>
-      <p:sp>
-        <p:nvSpPr>
-          <p:cNvPr id="3" name="Content Placeholder 2">
-            <a:extLst>
-              <a:ext uri="{FF2B5EF4-FFF2-40B4-BE49-F238E27FC236}">
-                <a16:creationId xmlns:a16="http://schemas.microsoft.com/office/drawing/2014/main" id="{F21F1551-71FB-9546-80F4-DFF7DA1697AE}"/>
-              </a:ext>
-            </a:extLst>
-          </p:cNvPr>
-          <p:cNvSpPr>
-            <a:spLocks noGrp="1"/>
-          </p:cNvSpPr>
-          <p:nvPr>
-            <p:ph idx="1"/>
-          </p:nvPr>
-        </p:nvSpPr>
-        <p:spPr/>
-        <p:txBody>
-          <a:bodyPr/>
-          <a:lstStyle/>
-          <a:p>
-            <a:endParaRPr lang="en-US" dirty="0"/>
-          </a:p>
-        </p:txBody>
-      </p:sp>
-    </p:spTree>
-    <p:extLst>
-      <p:ext uri="{BB962C8B-B14F-4D97-AF65-F5344CB8AC3E}">
-        <p14:creationId xmlns:p14="http://schemas.microsoft.com/office/powerpoint/2010/main" val="1908171576"/>
-      </p:ext>
-    </p:extLst>
-  </p:cSld>
-  <p:clrMapOvr>
-    <a:masterClrMapping/>
-  </p:clrMapOvr>
-</p:sld>
-</file>
-
-<file path=ppt/slides/slide22.xml><?xml version="1.0" encoding="utf-8"?>
-<p:sld xmlns:a="http://schemas.openxmlformats.org/drawingml/2006/main" xmlns:r="http://schemas.openxmlformats.org/officeDocument/2006/relationships" xmlns:p="http://schemas.openxmlformats.org/presentationml/2006/main">
-  <p:cSld>
-    <p:spTree>
-      <p:nvGrpSpPr>
-        <p:cNvPr id="1" name=""/>
-        <p:cNvGrpSpPr/>
-        <p:nvPr/>
-      </p:nvGrpSpPr>
-      <p:grpSpPr>
-        <a:xfrm>
-          <a:off x="0" y="0"/>
-          <a:ext cx="0" cy="0"/>
-          <a:chOff x="0" y="0"/>
-          <a:chExt cx="0" cy="0"/>
-        </a:xfrm>
-      </p:grpSpPr>
-      <p:sp>
-        <p:nvSpPr>
-          <p:cNvPr id="2" name="Title 1">
-            <a:extLst>
-              <a:ext uri="{FF2B5EF4-FFF2-40B4-BE49-F238E27FC236}">
-                <a16:creationId xmlns:a16="http://schemas.microsoft.com/office/drawing/2014/main" id="{01560502-1667-5140-AF58-5D0A5B061D91}"/>
-              </a:ext>
-            </a:extLst>
-          </p:cNvPr>
-          <p:cNvSpPr>
-            <a:spLocks noGrp="1"/>
-          </p:cNvSpPr>
-          <p:nvPr>
-            <p:ph type="title"/>
-          </p:nvPr>
-        </p:nvSpPr>
-        <p:spPr/>
-        <p:txBody>
-          <a:bodyPr/>
-          <a:lstStyle/>
-          <a:p>
-            <a:r>
-              <a:rPr lang="en-US" b="1" dirty="0" err="1">
-                <a:solidFill>
-                  <a:srgbClr val="0070C0"/>
-                </a:solidFill>
-              </a:rPr>
-              <a:t>tsfresh</a:t>
-            </a:r>
-            <a:r>
-              <a:rPr lang="en-US" b="1" dirty="0">
-                <a:solidFill>
-                  <a:srgbClr val="0070C0"/>
-                </a:solidFill>
-              </a:rPr>
               <a:t> – Parallelization</a:t>
             </a:r>
           </a:p>
@@ -6749,102 +6673,7 @@
 </p:sld>
 </file>
 
-<file path=ppt/slides/slide23.xml><?xml version="1.0" encoding="utf-8"?>
-<p:sld xmlns:a="http://schemas.openxmlformats.org/drawingml/2006/main" xmlns:r="http://schemas.openxmlformats.org/officeDocument/2006/relationships" xmlns:p="http://schemas.openxmlformats.org/presentationml/2006/main">
-  <p:cSld>
-    <p:spTree>
-      <p:nvGrpSpPr>
-        <p:cNvPr id="1" name=""/>
-        <p:cNvGrpSpPr/>
-        <p:nvPr/>
-      </p:nvGrpSpPr>
-      <p:grpSpPr>
-        <a:xfrm>
-          <a:off x="0" y="0"/>
-          <a:ext cx="0" cy="0"/>
-          <a:chOff x="0" y="0"/>
-          <a:chExt cx="0" cy="0"/>
-        </a:xfrm>
-      </p:grpSpPr>
-      <p:sp>
-        <p:nvSpPr>
-          <p:cNvPr id="2" name="Title 1">
-            <a:extLst>
-              <a:ext uri="{FF2B5EF4-FFF2-40B4-BE49-F238E27FC236}">
-                <a16:creationId xmlns:a16="http://schemas.microsoft.com/office/drawing/2014/main" id="{01560502-1667-5140-AF58-5D0A5B061D91}"/>
-              </a:ext>
-            </a:extLst>
-          </p:cNvPr>
-          <p:cNvSpPr>
-            <a:spLocks noGrp="1"/>
-          </p:cNvSpPr>
-          <p:nvPr>
-            <p:ph type="title"/>
-          </p:nvPr>
-        </p:nvSpPr>
-        <p:spPr/>
-        <p:txBody>
-          <a:bodyPr/>
-          <a:lstStyle/>
-          <a:p>
-            <a:r>
-              <a:rPr lang="en-US" b="1" dirty="0" err="1">
-                <a:solidFill>
-                  <a:srgbClr val="0070C0"/>
-                </a:solidFill>
-              </a:rPr>
-              <a:t>tsfresh</a:t>
-            </a:r>
-            <a:r>
-              <a:rPr lang="en-US" b="1" dirty="0">
-                <a:solidFill>
-                  <a:srgbClr val="0070C0"/>
-                </a:solidFill>
-              </a:rPr>
-              <a:t> – Basics of time-series forecasting</a:t>
-            </a:r>
-          </a:p>
-        </p:txBody>
-      </p:sp>
-      <p:sp>
-        <p:nvSpPr>
-          <p:cNvPr id="3" name="Content Placeholder 2">
-            <a:extLst>
-              <a:ext uri="{FF2B5EF4-FFF2-40B4-BE49-F238E27FC236}">
-                <a16:creationId xmlns:a16="http://schemas.microsoft.com/office/drawing/2014/main" id="{F21F1551-71FB-9546-80F4-DFF7DA1697AE}"/>
-              </a:ext>
-            </a:extLst>
-          </p:cNvPr>
-          <p:cNvSpPr>
-            <a:spLocks noGrp="1"/>
-          </p:cNvSpPr>
-          <p:nvPr>
-            <p:ph idx="1"/>
-          </p:nvPr>
-        </p:nvSpPr>
-        <p:spPr/>
-        <p:txBody>
-          <a:bodyPr/>
-          <a:lstStyle/>
-          <a:p>
-            <a:endParaRPr lang="en-US" dirty="0"/>
-          </a:p>
-        </p:txBody>
-      </p:sp>
-    </p:spTree>
-    <p:extLst>
-      <p:ext uri="{BB962C8B-B14F-4D97-AF65-F5344CB8AC3E}">
-        <p14:creationId xmlns:p14="http://schemas.microsoft.com/office/powerpoint/2010/main" val="3972214536"/>
-      </p:ext>
-    </p:extLst>
-  </p:cSld>
-  <p:clrMapOvr>
-    <a:masterClrMapping/>
-  </p:clrMapOvr>
-</p:sld>
-</file>
-
-<file path=ppt/slides/slide24.xml><?xml version="1.0" encoding="utf-8"?>
+<file path=ppt/slides/slide22.xml><?xml version="1.0" encoding="utf-8"?>
 <p:sld xmlns:a="http://schemas.openxmlformats.org/drawingml/2006/main" xmlns:r="http://schemas.openxmlformats.org/officeDocument/2006/relationships" xmlns:p="http://schemas.openxmlformats.org/presentationml/2006/main">
   <p:cSld>
     <p:spTree>
@@ -6974,6 +6803,250 @@
 </p:sld>
 </file>
 
+<file path=ppt/slides/slide23.xml><?xml version="1.0" encoding="utf-8"?>
+<p:sld xmlns:a="http://schemas.openxmlformats.org/drawingml/2006/main" xmlns:r="http://schemas.openxmlformats.org/officeDocument/2006/relationships" xmlns:p="http://schemas.openxmlformats.org/presentationml/2006/main">
+  <p:cSld>
+    <p:spTree>
+      <p:nvGrpSpPr>
+        <p:cNvPr id="1" name=""/>
+        <p:cNvGrpSpPr/>
+        <p:nvPr/>
+      </p:nvGrpSpPr>
+      <p:grpSpPr>
+        <a:xfrm>
+          <a:off x="0" y="0"/>
+          <a:ext cx="0" cy="0"/>
+          <a:chOff x="0" y="0"/>
+          <a:chExt cx="0" cy="0"/>
+        </a:xfrm>
+      </p:grpSpPr>
+      <p:sp>
+        <p:nvSpPr>
+          <p:cNvPr id="2" name="Title 1">
+            <a:extLst>
+              <a:ext uri="{FF2B5EF4-FFF2-40B4-BE49-F238E27FC236}">
+                <a16:creationId xmlns:a16="http://schemas.microsoft.com/office/drawing/2014/main" id="{01560502-1667-5140-AF58-5D0A5B061D91}"/>
+              </a:ext>
+            </a:extLst>
+          </p:cNvPr>
+          <p:cNvSpPr>
+            <a:spLocks noGrp="1"/>
+          </p:cNvSpPr>
+          <p:nvPr>
+            <p:ph type="title"/>
+          </p:nvPr>
+        </p:nvSpPr>
+        <p:spPr/>
+        <p:txBody>
+          <a:bodyPr/>
+          <a:lstStyle/>
+          <a:p>
+            <a:r>
+              <a:rPr lang="en-US" b="1" dirty="0" err="1">
+                <a:solidFill>
+                  <a:srgbClr val="0070C0"/>
+                </a:solidFill>
+              </a:rPr>
+              <a:t>tsfresh</a:t>
+            </a:r>
+            <a:r>
+              <a:rPr lang="en-US" b="1" dirty="0">
+                <a:solidFill>
+                  <a:srgbClr val="0070C0"/>
+                </a:solidFill>
+              </a:rPr>
+              <a:t> – Summary of time-series forecasting</a:t>
+            </a:r>
+          </a:p>
+        </p:txBody>
+      </p:sp>
+      <p:sp>
+        <p:nvSpPr>
+          <p:cNvPr id="3" name="Content Placeholder 2">
+            <a:extLst>
+              <a:ext uri="{FF2B5EF4-FFF2-40B4-BE49-F238E27FC236}">
+                <a16:creationId xmlns:a16="http://schemas.microsoft.com/office/drawing/2014/main" id="{F21F1551-71FB-9546-80F4-DFF7DA1697AE}"/>
+              </a:ext>
+            </a:extLst>
+          </p:cNvPr>
+          <p:cNvSpPr>
+            <a:spLocks noGrp="1"/>
+          </p:cNvSpPr>
+          <p:nvPr>
+            <p:ph idx="1"/>
+          </p:nvPr>
+        </p:nvSpPr>
+        <p:spPr/>
+        <p:txBody>
+          <a:bodyPr/>
+          <a:lstStyle/>
+          <a:p>
+            <a:endParaRPr lang="en-US" dirty="0"/>
+          </a:p>
+        </p:txBody>
+      </p:sp>
+    </p:spTree>
+    <p:extLst>
+      <p:ext uri="{BB962C8B-B14F-4D97-AF65-F5344CB8AC3E}">
+        <p14:creationId xmlns:p14="http://schemas.microsoft.com/office/powerpoint/2010/main" val="3972214536"/>
+      </p:ext>
+    </p:extLst>
+  </p:cSld>
+  <p:clrMapOvr>
+    <a:masterClrMapping/>
+  </p:clrMapOvr>
+</p:sld>
+</file>
+
+<file path=ppt/slides/slide24.xml><?xml version="1.0" encoding="utf-8"?>
+<p:sld xmlns:a="http://schemas.openxmlformats.org/drawingml/2006/main" xmlns:r="http://schemas.openxmlformats.org/officeDocument/2006/relationships" xmlns:p="http://schemas.openxmlformats.org/presentationml/2006/main">
+  <p:cSld>
+    <p:spTree>
+      <p:nvGrpSpPr>
+        <p:cNvPr id="1" name=""/>
+        <p:cNvGrpSpPr/>
+        <p:nvPr/>
+      </p:nvGrpSpPr>
+      <p:grpSpPr>
+        <a:xfrm>
+          <a:off x="0" y="0"/>
+          <a:ext cx="0" cy="0"/>
+          <a:chOff x="0" y="0"/>
+          <a:chExt cx="0" cy="0"/>
+        </a:xfrm>
+      </p:grpSpPr>
+      <p:sp>
+        <p:nvSpPr>
+          <p:cNvPr id="2" name="Title 1">
+            <a:extLst>
+              <a:ext uri="{FF2B5EF4-FFF2-40B4-BE49-F238E27FC236}">
+                <a16:creationId xmlns:a16="http://schemas.microsoft.com/office/drawing/2014/main" id="{01560502-1667-5140-AF58-5D0A5B061D91}"/>
+              </a:ext>
+            </a:extLst>
+          </p:cNvPr>
+          <p:cNvSpPr>
+            <a:spLocks noGrp="1"/>
+          </p:cNvSpPr>
+          <p:nvPr>
+            <p:ph type="title"/>
+          </p:nvPr>
+        </p:nvSpPr>
+        <p:spPr/>
+        <p:txBody>
+          <a:bodyPr/>
+          <a:lstStyle/>
+          <a:p>
+            <a:r>
+              <a:rPr lang="en-US" b="1" dirty="0">
+                <a:solidFill>
+                  <a:srgbClr val="0070C0"/>
+                </a:solidFill>
+              </a:rPr>
+              <a:t>Conclusions – Things to remember</a:t>
+            </a:r>
+          </a:p>
+        </p:txBody>
+      </p:sp>
+      <p:sp>
+        <p:nvSpPr>
+          <p:cNvPr id="3" name="Content Placeholder 2">
+            <a:extLst>
+              <a:ext uri="{FF2B5EF4-FFF2-40B4-BE49-F238E27FC236}">
+                <a16:creationId xmlns:a16="http://schemas.microsoft.com/office/drawing/2014/main" id="{F21F1551-71FB-9546-80F4-DFF7DA1697AE}"/>
+              </a:ext>
+            </a:extLst>
+          </p:cNvPr>
+          <p:cNvSpPr>
+            <a:spLocks noGrp="1"/>
+          </p:cNvSpPr>
+          <p:nvPr>
+            <p:ph idx="1"/>
+          </p:nvPr>
+        </p:nvSpPr>
+        <p:spPr/>
+        <p:txBody>
+          <a:bodyPr>
+            <a:normAutofit/>
+          </a:bodyPr>
+          <a:lstStyle/>
+          <a:p>
+            <a:r>
+              <a:rPr lang="en-US" dirty="0"/>
+              <a:t>Feature scaling is done to Normalize data so that priority is not given to a particular feature. </a:t>
+            </a:r>
+          </a:p>
+          <a:p>
+            <a:pPr lvl="1"/>
+            <a:r>
+              <a:rPr lang="en-US" dirty="0">
+                <a:hlinkClick r:id="rId2"/>
+              </a:rPr>
+              <a:t>https://scikit-learn.org/stable/modules/preprocessing.html</a:t>
+            </a:r>
+            <a:r>
+              <a:rPr lang="en-US" dirty="0"/>
+              <a:t> </a:t>
+            </a:r>
+          </a:p>
+          <a:p>
+            <a:r>
+              <a:rPr lang="en-US" dirty="0"/>
+              <a:t>Role of scaling is mostly important in algorithms that are distance based (</a:t>
+            </a:r>
+            <a:r>
+              <a:rPr lang="en-US" dirty="0" err="1"/>
+              <a:t>e.g</a:t>
+            </a:r>
+            <a:r>
+              <a:rPr lang="en-US" dirty="0"/>
+              <a:t>, Euclidean metric).</a:t>
+            </a:r>
+          </a:p>
+          <a:p>
+            <a:pPr lvl="1"/>
+            <a:r>
+              <a:rPr lang="en-US" dirty="0"/>
+              <a:t>E.g., k-means clustering, Support Vector Machines, etc.</a:t>
+            </a:r>
+          </a:p>
+          <a:p>
+            <a:r>
+              <a:rPr lang="en-US" dirty="0"/>
+              <a:t>ASIDE -- Random Forest (RF) is a tree-based model and hence </a:t>
+            </a:r>
+            <a:r>
+              <a:rPr lang="en-US" b="1" dirty="0"/>
+              <a:t>does not require</a:t>
+            </a:r>
+            <a:r>
+              <a:rPr lang="en-US" dirty="0"/>
+              <a:t> feature scaling.</a:t>
+            </a:r>
+          </a:p>
+          <a:p>
+            <a:r>
+              <a:rPr lang="en-US" dirty="0"/>
+              <a:t>RF algorithm is based on partitioning, even if you apply Normalization then also the result would be the same.</a:t>
+            </a:r>
+          </a:p>
+          <a:p>
+            <a:endParaRPr lang="en-US" dirty="0"/>
+          </a:p>
+        </p:txBody>
+      </p:sp>
+    </p:spTree>
+    <p:extLst>
+      <p:ext uri="{BB962C8B-B14F-4D97-AF65-F5344CB8AC3E}">
+        <p14:creationId xmlns:p14="http://schemas.microsoft.com/office/powerpoint/2010/main" val="4235018102"/>
+      </p:ext>
+    </p:extLst>
+  </p:cSld>
+  <p:clrMapOvr>
+    <a:masterClrMapping/>
+  </p:clrMapOvr>
+</p:sld>
+</file>
+
 <file path=ppt/slides/slide25.xml><?xml version="1.0" encoding="utf-8"?>
 <p:sld xmlns:a="http://schemas.openxmlformats.org/drawingml/2006/main" xmlns:r="http://schemas.openxmlformats.org/officeDocument/2006/relationships" xmlns:p="http://schemas.openxmlformats.org/presentationml/2006/main">
   <p:cSld>
@@ -7007,9 +7080,16 @@
             <p:ph type="title"/>
           </p:nvPr>
         </p:nvSpPr>
-        <p:spPr/>
-        <p:txBody>
-          <a:bodyPr/>
+        <p:spPr>
+          <a:xfrm>
+            <a:off x="0" y="0"/>
+            <a:ext cx="10515600" cy="681037"/>
+          </a:xfrm>
+        </p:spPr>
+        <p:txBody>
+          <a:bodyPr>
+            <a:normAutofit fontScale="90000"/>
+          </a:bodyPr>
           <a:lstStyle/>
           <a:p>
             <a:r>
@@ -7039,42 +7119,215 @@
             <p:ph idx="1"/>
           </p:nvPr>
         </p:nvSpPr>
-        <p:spPr/>
-        <p:txBody>
-          <a:bodyPr/>
-          <a:lstStyle/>
-          <a:p>
-            <a:r>
-              <a:rPr lang="en-US" dirty="0">
+        <p:spPr>
+          <a:xfrm>
+            <a:off x="0" y="802368"/>
+            <a:ext cx="12097657" cy="6055632"/>
+          </a:xfrm>
+        </p:spPr>
+        <p:txBody>
+          <a:bodyPr>
+            <a:normAutofit/>
+          </a:bodyPr>
+          <a:lstStyle/>
+          <a:p>
+            <a:r>
+              <a:rPr lang="en-US" sz="1800" dirty="0">
                 <a:hlinkClick r:id="rId2"/>
               </a:rPr>
               <a:t>https://github.com/benfulcher/hctsa</a:t>
             </a:r>
-            <a:endParaRPr lang="en-US" dirty="0"/>
-          </a:p>
-          <a:p>
-            <a:r>
-              <a:rPr lang="en-US" dirty="0">
+            <a:endParaRPr lang="en-US" sz="1800" dirty="0"/>
+          </a:p>
+          <a:p>
+            <a:r>
+              <a:rPr lang="en-US" sz="1800" dirty="0">
                 <a:hlinkClick r:id="rId3"/>
               </a:rPr>
               <a:t>https://tsfresh.readthedocs.io/en/latest/</a:t>
             </a:r>
             <a:r>
-              <a:rPr lang="en-US" dirty="0"/>
+              <a:rPr lang="en-US" sz="1800" dirty="0"/>
               <a:t> </a:t>
             </a:r>
           </a:p>
           <a:p>
             <a:r>
-              <a:rPr lang="en-US" dirty="0">
+              <a:rPr lang="en-US" sz="1800" dirty="0">
                 <a:hlinkClick r:id="rId4"/>
               </a:rPr>
               <a:t>https://github.com/blue-yonder/tsfresh</a:t>
             </a:r>
             <a:r>
-              <a:rPr lang="en-US" dirty="0"/>
+              <a:rPr lang="en-US" sz="1800" dirty="0"/>
               <a:t> </a:t>
             </a:r>
+          </a:p>
+          <a:p>
+            <a:r>
+              <a:rPr lang="en-US" sz="1800" dirty="0">
+                <a:hlinkClick r:id="rId5"/>
+              </a:rPr>
+              <a:t>https://towardsdatascience.com/how-not-to-use-machine-learning-for-time-series-forecasting-avoiding-the-pitfalls-19f9d7adf424</a:t>
+            </a:r>
+            <a:r>
+              <a:rPr lang="en-US" sz="1800" dirty="0"/>
+              <a:t> </a:t>
+            </a:r>
+          </a:p>
+          <a:p>
+            <a:r>
+              <a:rPr lang="en-US" sz="1800" dirty="0">
+                <a:hlinkClick r:id="rId6"/>
+              </a:rPr>
+              <a:t>https://towardsdatascience.com/how-to-use-machine-learning-for-anomaly-detection-and-condition-monitoring-6742f82900d7</a:t>
+            </a:r>
+            <a:r>
+              <a:rPr lang="en-US" sz="1800" dirty="0"/>
+              <a:t> </a:t>
+            </a:r>
+          </a:p>
+          <a:p>
+            <a:r>
+              <a:rPr lang="en-US" sz="1800" dirty="0">
+                <a:hlinkClick r:id="rId7"/>
+              </a:rPr>
+              <a:t>https://towardsdatascience.com/understanding-feature-engineering-part-1-continuous-numeric-data-da4e47099a7b</a:t>
+            </a:r>
+            <a:r>
+              <a:rPr lang="en-US" sz="1800" dirty="0"/>
+              <a:t> </a:t>
+            </a:r>
+          </a:p>
+          <a:p>
+            <a:r>
+              <a:rPr lang="en-US" sz="1800" dirty="0">
+                <a:hlinkClick r:id="rId8"/>
+              </a:rPr>
+              <a:t>https://towardsdatascience.com/feature-engineering-what-powers-machine-learning-93ab191bcc2d</a:t>
+            </a:r>
+            <a:r>
+              <a:rPr lang="en-US" sz="1800" dirty="0"/>
+              <a:t> </a:t>
+            </a:r>
+          </a:p>
+          <a:p>
+            <a:r>
+              <a:rPr lang="en-US" sz="1800" dirty="0">
+                <a:hlinkClick r:id="rId9"/>
+              </a:rPr>
+              <a:t>https://machinelearningmastery.com/discover-feature-engineering-how-to-engineer-features-and-how-to-get-good-at-it/</a:t>
+            </a:r>
+            <a:r>
+              <a:rPr lang="en-US" sz="1800" dirty="0"/>
+              <a:t> </a:t>
+            </a:r>
+          </a:p>
+          <a:p>
+            <a:r>
+              <a:rPr lang="en-US" sz="1800" dirty="0">
+                <a:hlinkClick r:id="rId10"/>
+              </a:rPr>
+              <a:t>https://developers.google.com/machine-learning/crash-course/representation/feature-engineering</a:t>
+            </a:r>
+            <a:r>
+              <a:rPr lang="en-US" sz="1800" dirty="0"/>
+              <a:t> </a:t>
+            </a:r>
+          </a:p>
+          <a:p>
+            <a:r>
+              <a:rPr lang="en-US" sz="1800" dirty="0"/>
+              <a:t>Feature Engineering for Machine Learning: Principles and Techniques for Data Scientists – Alice Zheng &amp; Amanda </a:t>
+            </a:r>
+            <a:r>
+              <a:rPr lang="en-US" sz="1800" dirty="0" err="1"/>
+              <a:t>Casari</a:t>
+            </a:r>
+            <a:r>
+              <a:rPr lang="en-US" sz="1800" dirty="0"/>
+              <a:t>, O’Reilly, 2018.</a:t>
+            </a:r>
+          </a:p>
+          <a:p>
+            <a:r>
+              <a:rPr lang="en-US" sz="1800" dirty="0"/>
+              <a:t>Feature Engineering Made Easy, Sinan </a:t>
+            </a:r>
+            <a:r>
+              <a:rPr lang="en-US" sz="1800" dirty="0" err="1"/>
+              <a:t>Ozdemir</a:t>
+            </a:r>
+            <a:r>
+              <a:rPr lang="en-US" sz="1800" dirty="0"/>
+              <a:t>, </a:t>
+            </a:r>
+            <a:r>
+              <a:rPr lang="en-US" sz="1800" dirty="0" err="1"/>
+              <a:t>Divya</a:t>
+            </a:r>
+            <a:r>
+              <a:rPr lang="en-US" sz="1800" dirty="0"/>
+              <a:t> </a:t>
+            </a:r>
+            <a:r>
+              <a:rPr lang="en-US" sz="1800" dirty="0" err="1"/>
+              <a:t>Susarla</a:t>
+            </a:r>
+            <a:r>
+              <a:rPr lang="en-US" sz="1800" dirty="0"/>
+              <a:t>, </a:t>
+            </a:r>
+            <a:r>
+              <a:rPr lang="en-US" sz="1800" dirty="0" err="1"/>
+              <a:t>Packt</a:t>
+            </a:r>
+            <a:r>
+              <a:rPr lang="en-US" sz="1800" dirty="0"/>
+              <a:t>, 2018.</a:t>
+            </a:r>
+          </a:p>
+          <a:p>
+            <a:r>
+              <a:rPr lang="en-US" sz="1800" dirty="0"/>
+              <a:t>Feature Extraction: Foundations and Applications, by Isabelle Guyon, Steve Gunn, Masoud </a:t>
+            </a:r>
+            <a:r>
+              <a:rPr lang="en-US" sz="1800" dirty="0" err="1"/>
+              <a:t>Nikravesh</a:t>
+            </a:r>
+            <a:r>
+              <a:rPr lang="en-US" sz="1800" dirty="0"/>
+              <a:t>, </a:t>
+            </a:r>
+            <a:r>
+              <a:rPr lang="en-US" sz="1800" dirty="0" err="1"/>
+              <a:t>Lofti</a:t>
+            </a:r>
+            <a:r>
+              <a:rPr lang="en-US" sz="1800" dirty="0"/>
+              <a:t> A. Zadeh, Springer 2006.</a:t>
+            </a:r>
+          </a:p>
+          <a:p>
+            <a:r>
+              <a:rPr lang="en-US" sz="1800" dirty="0"/>
+              <a:t>Feature Extraction, Construction and Selection: A Data Mining Perspective, Huan Liu, Hiroshi </a:t>
+            </a:r>
+            <a:r>
+              <a:rPr lang="en-US" sz="1800" dirty="0" err="1"/>
+              <a:t>Motoda</a:t>
+            </a:r>
+            <a:r>
+              <a:rPr lang="en-US" sz="1800" dirty="0"/>
+              <a:t>, Springer, 1998.</a:t>
+            </a:r>
+          </a:p>
+          <a:p>
+            <a:endParaRPr lang="en-US" sz="1800" dirty="0"/>
+          </a:p>
+          <a:p>
+            <a:endParaRPr lang="en-US" b="1" dirty="0"/>
           </a:p>
           <a:p>
             <a:endParaRPr lang="en-US" dirty="0"/>
@@ -7129,7 +7382,7 @@
         </p:nvSpPr>
         <p:spPr>
           <a:xfrm>
-            <a:off x="838200" y="2510448"/>
+            <a:off x="889000" y="2510448"/>
             <a:ext cx="10515600" cy="1325563"/>
           </a:xfrm>
         </p:spPr>
@@ -7184,23 +7437,7 @@
                   <a:srgbClr val="0070C0"/>
                 </a:solidFill>
               </a:rPr>
-              <a:t>Lets go to the </a:t>
-            </a:r>
-            <a:r>
-              <a:rPr lang="en-US" sz="8000" dirty="0" err="1">
-                <a:solidFill>
-                  <a:srgbClr val="0070C0"/>
-                </a:solidFill>
-              </a:rPr>
-              <a:t>ipython</a:t>
-            </a:r>
-            <a:r>
-              <a:rPr lang="en-US" sz="8000" dirty="0">
-                <a:solidFill>
-                  <a:srgbClr val="0070C0"/>
-                </a:solidFill>
-              </a:rPr>
-              <a:t> notebook</a:t>
+              <a:t>Lets look at the code</a:t>
             </a:r>
           </a:p>
         </p:txBody>
@@ -7209,242 +7446,6 @@
     <p:extLst>
       <p:ext uri="{BB962C8B-B14F-4D97-AF65-F5344CB8AC3E}">
         <p14:creationId xmlns:p14="http://schemas.microsoft.com/office/powerpoint/2010/main" val="2476179661"/>
-      </p:ext>
-    </p:extLst>
-  </p:cSld>
-  <p:clrMapOvr>
-    <a:masterClrMapping/>
-  </p:clrMapOvr>
-</p:sld>
-</file>
-
-<file path=ppt/slides/slide27.xml><?xml version="1.0" encoding="utf-8"?>
-<p:sld xmlns:a="http://schemas.openxmlformats.org/drawingml/2006/main" xmlns:r="http://schemas.openxmlformats.org/officeDocument/2006/relationships" xmlns:p="http://schemas.openxmlformats.org/presentationml/2006/main">
-  <p:cSld>
-    <p:spTree>
-      <p:nvGrpSpPr>
-        <p:cNvPr id="1" name=""/>
-        <p:cNvGrpSpPr/>
-        <p:nvPr/>
-      </p:nvGrpSpPr>
-      <p:grpSpPr>
-        <a:xfrm>
-          <a:off x="0" y="0"/>
-          <a:ext cx="0" cy="0"/>
-          <a:chOff x="0" y="0"/>
-          <a:chExt cx="0" cy="0"/>
-        </a:xfrm>
-      </p:grpSpPr>
-      <p:sp>
-        <p:nvSpPr>
-          <p:cNvPr id="2" name="Title 1">
-            <a:extLst>
-              <a:ext uri="{FF2B5EF4-FFF2-40B4-BE49-F238E27FC236}">
-                <a16:creationId xmlns:a16="http://schemas.microsoft.com/office/drawing/2014/main" id="{D39A7480-940B-064B-A2DB-97503F2BB48E}"/>
-              </a:ext>
-            </a:extLst>
-          </p:cNvPr>
-          <p:cNvSpPr>
-            <a:spLocks noGrp="1"/>
-          </p:cNvSpPr>
-          <p:nvPr>
-            <p:ph type="title"/>
-          </p:nvPr>
-        </p:nvSpPr>
-        <p:spPr/>
-        <p:txBody>
-          <a:bodyPr/>
-          <a:lstStyle/>
-          <a:p>
-            <a:r>
-              <a:rPr lang="en-US" dirty="0"/>
-              <a:t>Preprocessing</a:t>
-            </a:r>
-          </a:p>
-        </p:txBody>
-      </p:sp>
-      <p:sp>
-        <p:nvSpPr>
-          <p:cNvPr id="3" name="Content Placeholder 2">
-            <a:extLst>
-              <a:ext uri="{FF2B5EF4-FFF2-40B4-BE49-F238E27FC236}">
-                <a16:creationId xmlns:a16="http://schemas.microsoft.com/office/drawing/2014/main" id="{73B8E83A-482C-0444-AFFE-AE4364CF8940}"/>
-              </a:ext>
-            </a:extLst>
-          </p:cNvPr>
-          <p:cNvSpPr>
-            <a:spLocks noGrp="1"/>
-          </p:cNvSpPr>
-          <p:nvPr>
-            <p:ph idx="1"/>
-          </p:nvPr>
-        </p:nvSpPr>
-        <p:spPr/>
-        <p:txBody>
-          <a:bodyPr/>
-          <a:lstStyle/>
-          <a:p>
-            <a:r>
-              <a:rPr lang="en-US" dirty="0"/>
-              <a:t>Scaling is done to Normalize data so that priority is not given to a particular feature. </a:t>
-            </a:r>
-          </a:p>
-          <a:p>
-            <a:r>
-              <a:rPr lang="en-US" dirty="0"/>
-              <a:t>Role of Scaling is mostly important in algorithms that are distance based and require Euclidean Distance.</a:t>
-            </a:r>
-          </a:p>
-          <a:p>
-            <a:r>
-              <a:rPr lang="en-US" dirty="0"/>
-              <a:t>Random Forest is a tree-based model and hence </a:t>
-            </a:r>
-            <a:r>
-              <a:rPr lang="en-US" b="1" dirty="0"/>
-              <a:t>does not require</a:t>
-            </a:r>
-            <a:r>
-              <a:rPr lang="en-US" dirty="0"/>
-              <a:t> feature scaling.</a:t>
-            </a:r>
-          </a:p>
-          <a:p>
-            <a:r>
-              <a:rPr lang="en-US" b="1" dirty="0"/>
-              <a:t>This algorithm requires partitioning, even if you apply Normalization then also&gt; the result would be the same.</a:t>
-            </a:r>
-            <a:endParaRPr lang="en-US" dirty="0"/>
-          </a:p>
-        </p:txBody>
-      </p:sp>
-    </p:spTree>
-    <p:extLst>
-      <p:ext uri="{BB962C8B-B14F-4D97-AF65-F5344CB8AC3E}">
-        <p14:creationId xmlns:p14="http://schemas.microsoft.com/office/powerpoint/2010/main" val="3221661355"/>
-      </p:ext>
-    </p:extLst>
-  </p:cSld>
-  <p:clrMapOvr>
-    <a:masterClrMapping/>
-  </p:clrMapOvr>
-</p:sld>
-</file>
-
-<file path=ppt/slides/slide28.xml><?xml version="1.0" encoding="utf-8"?>
-<p:sld xmlns:a="http://schemas.openxmlformats.org/drawingml/2006/main" xmlns:r="http://schemas.openxmlformats.org/officeDocument/2006/relationships" xmlns:p="http://schemas.openxmlformats.org/presentationml/2006/main">
-  <p:cSld>
-    <p:spTree>
-      <p:nvGrpSpPr>
-        <p:cNvPr id="1" name=""/>
-        <p:cNvGrpSpPr/>
-        <p:nvPr/>
-      </p:nvGrpSpPr>
-      <p:grpSpPr>
-        <a:xfrm>
-          <a:off x="0" y="0"/>
-          <a:ext cx="0" cy="0"/>
-          <a:chOff x="0" y="0"/>
-          <a:chExt cx="0" cy="0"/>
-        </a:xfrm>
-      </p:grpSpPr>
-      <p:sp>
-        <p:nvSpPr>
-          <p:cNvPr id="2" name="Title 1">
-            <a:extLst>
-              <a:ext uri="{FF2B5EF4-FFF2-40B4-BE49-F238E27FC236}">
-                <a16:creationId xmlns:a16="http://schemas.microsoft.com/office/drawing/2014/main" id="{22B96E73-9DBE-3F4B-8CDF-4B60880F081F}"/>
-              </a:ext>
-            </a:extLst>
-          </p:cNvPr>
-          <p:cNvSpPr>
-            <a:spLocks noGrp="1"/>
-          </p:cNvSpPr>
-          <p:nvPr>
-            <p:ph type="title"/>
-          </p:nvPr>
-        </p:nvSpPr>
-        <p:spPr/>
-        <p:txBody>
-          <a:bodyPr/>
-          <a:lstStyle/>
-          <a:p>
-            <a:endParaRPr lang="en-US"/>
-          </a:p>
-        </p:txBody>
-      </p:sp>
-      <p:sp>
-        <p:nvSpPr>
-          <p:cNvPr id="3" name="Content Placeholder 2">
-            <a:extLst>
-              <a:ext uri="{FF2B5EF4-FFF2-40B4-BE49-F238E27FC236}">
-                <a16:creationId xmlns:a16="http://schemas.microsoft.com/office/drawing/2014/main" id="{E2A0D56A-DF44-2148-A057-73B1835F96F0}"/>
-              </a:ext>
-            </a:extLst>
-          </p:cNvPr>
-          <p:cNvSpPr>
-            <a:spLocks noGrp="1"/>
-          </p:cNvSpPr>
-          <p:nvPr>
-            <p:ph idx="1"/>
-          </p:nvPr>
-        </p:nvSpPr>
-        <p:spPr/>
-        <p:txBody>
-          <a:bodyPr/>
-          <a:lstStyle/>
-          <a:p>
-            <a:r>
-              <a:rPr lang="en-US" dirty="0"/>
-              <a:t>To get the main idea</a:t>
-            </a:r>
-          </a:p>
-          <a:p>
-            <a:r>
-              <a:rPr lang="en-US" dirty="0"/>
-              <a:t>High-level details</a:t>
-            </a:r>
-          </a:p>
-          <a:p>
-            <a:r>
-              <a:rPr lang="en-US" dirty="0"/>
-              <a:t>References at end</a:t>
-            </a:r>
-          </a:p>
-          <a:p>
-            <a:r>
-              <a:rPr lang="en-US" dirty="0"/>
-              <a:t>Couple of slides on feature engineering of discrete data – </a:t>
-            </a:r>
-            <a:r>
-              <a:rPr lang="en-US" dirty="0" err="1"/>
-              <a:t>Eg.</a:t>
-            </a:r>
-            <a:r>
-              <a:rPr lang="en-US" dirty="0"/>
-              <a:t> Catalog data</a:t>
-            </a:r>
-          </a:p>
-          <a:p>
-            <a:r>
-              <a:rPr lang="en-US" dirty="0"/>
-              <a:t>Feature selection – </a:t>
-            </a:r>
-            <a:r>
-              <a:rPr lang="en-US" dirty="0" err="1"/>
-              <a:t>sklearn</a:t>
-            </a:r>
-            <a:r>
-              <a:rPr lang="en-US" dirty="0"/>
-              <a:t>, hypothesis testing</a:t>
-            </a:r>
-          </a:p>
-        </p:txBody>
-      </p:sp>
-    </p:spTree>
-    <p:extLst>
-      <p:ext uri="{BB962C8B-B14F-4D97-AF65-F5344CB8AC3E}">
-        <p14:creationId xmlns:p14="http://schemas.microsoft.com/office/powerpoint/2010/main" val="3792644620"/>
       </p:ext>
     </p:extLst>
   </p:cSld>

</xml_diff>

<commit_message>
Ftrs engg presentation update
</commit_message>
<xml_diff>
--- a/presentations/Feature_Engineering_ML_SSA19.pptx
+++ b/presentations/Feature_Engineering_ML_SSA19.pptx
@@ -5,7 +5,7 @@
     <p:sldMasterId id="2147483648" r:id="rId1"/>
   </p:sldMasterIdLst>
   <p:notesMasterIdLst>
-    <p:notesMasterId r:id="rId28"/>
+    <p:notesMasterId r:id="rId29"/>
   </p:notesMasterIdLst>
   <p:sldIdLst>
     <p:sldId id="256" r:id="rId2"/>
@@ -27,13 +27,14 @@
     <p:sldId id="282" r:id="rId18"/>
     <p:sldId id="276" r:id="rId19"/>
     <p:sldId id="266" r:id="rId20"/>
-    <p:sldId id="267" r:id="rId21"/>
-    <p:sldId id="271" r:id="rId22"/>
-    <p:sldId id="277" r:id="rId23"/>
-    <p:sldId id="272" r:id="rId24"/>
-    <p:sldId id="285" r:id="rId25"/>
-    <p:sldId id="273" r:id="rId26"/>
-    <p:sldId id="281" r:id="rId27"/>
+    <p:sldId id="286" r:id="rId21"/>
+    <p:sldId id="267" r:id="rId22"/>
+    <p:sldId id="271" r:id="rId23"/>
+    <p:sldId id="277" r:id="rId24"/>
+    <p:sldId id="272" r:id="rId25"/>
+    <p:sldId id="285" r:id="rId26"/>
+    <p:sldId id="273" r:id="rId27"/>
+    <p:sldId id="281" r:id="rId28"/>
   </p:sldIdLst>
   <p:sldSz cx="12192000" cy="6858000"/>
   <p:notesSz cx="6858000" cy="9144000"/>
@@ -222,7 +223,7 @@
           <a:p>
             <a:fld id="{FEB909F9-03D2-0440-B8E0-F1611228BF6C}" type="datetimeFigureOut">
               <a:rPr lang="en-US" smtClean="0"/>
-              <a:t>4/19/19</a:t>
+              <a:t>4/20/19</a:t>
             </a:fld>
             <a:endParaRPr lang="en-US"/>
           </a:p>
@@ -854,7 +855,7 @@
           <a:p>
             <a:fld id="{C33EC7A1-935E-D748-85B9-D6F830ED6136}" type="datetimeFigureOut">
               <a:rPr lang="en-US" smtClean="0"/>
-              <a:t>4/19/19</a:t>
+              <a:t>4/20/19</a:t>
             </a:fld>
             <a:endParaRPr lang="en-US"/>
           </a:p>
@@ -1052,7 +1053,7 @@
           <a:p>
             <a:fld id="{C33EC7A1-935E-D748-85B9-D6F830ED6136}" type="datetimeFigureOut">
               <a:rPr lang="en-US" smtClean="0"/>
-              <a:t>4/19/19</a:t>
+              <a:t>4/20/19</a:t>
             </a:fld>
             <a:endParaRPr lang="en-US"/>
           </a:p>
@@ -1260,7 +1261,7 @@
           <a:p>
             <a:fld id="{C33EC7A1-935E-D748-85B9-D6F830ED6136}" type="datetimeFigureOut">
               <a:rPr lang="en-US" smtClean="0"/>
-              <a:t>4/19/19</a:t>
+              <a:t>4/20/19</a:t>
             </a:fld>
             <a:endParaRPr lang="en-US"/>
           </a:p>
@@ -1458,7 +1459,7 @@
           <a:p>
             <a:fld id="{C33EC7A1-935E-D748-85B9-D6F830ED6136}" type="datetimeFigureOut">
               <a:rPr lang="en-US" smtClean="0"/>
-              <a:t>4/19/19</a:t>
+              <a:t>4/20/19</a:t>
             </a:fld>
             <a:endParaRPr lang="en-US"/>
           </a:p>
@@ -1733,7 +1734,7 @@
           <a:p>
             <a:fld id="{C33EC7A1-935E-D748-85B9-D6F830ED6136}" type="datetimeFigureOut">
               <a:rPr lang="en-US" smtClean="0"/>
-              <a:t>4/19/19</a:t>
+              <a:t>4/20/19</a:t>
             </a:fld>
             <a:endParaRPr lang="en-US"/>
           </a:p>
@@ -1998,7 +1999,7 @@
           <a:p>
             <a:fld id="{C33EC7A1-935E-D748-85B9-D6F830ED6136}" type="datetimeFigureOut">
               <a:rPr lang="en-US" smtClean="0"/>
-              <a:t>4/19/19</a:t>
+              <a:t>4/20/19</a:t>
             </a:fld>
             <a:endParaRPr lang="en-US"/>
           </a:p>
@@ -2410,7 +2411,7 @@
           <a:p>
             <a:fld id="{C33EC7A1-935E-D748-85B9-D6F830ED6136}" type="datetimeFigureOut">
               <a:rPr lang="en-US" smtClean="0"/>
-              <a:t>4/19/19</a:t>
+              <a:t>4/20/19</a:t>
             </a:fld>
             <a:endParaRPr lang="en-US"/>
           </a:p>
@@ -2551,7 +2552,7 @@
           <a:p>
             <a:fld id="{C33EC7A1-935E-D748-85B9-D6F830ED6136}" type="datetimeFigureOut">
               <a:rPr lang="en-US" smtClean="0"/>
-              <a:t>4/19/19</a:t>
+              <a:t>4/20/19</a:t>
             </a:fld>
             <a:endParaRPr lang="en-US"/>
           </a:p>
@@ -2664,7 +2665,7 @@
           <a:p>
             <a:fld id="{C33EC7A1-935E-D748-85B9-D6F830ED6136}" type="datetimeFigureOut">
               <a:rPr lang="en-US" smtClean="0"/>
-              <a:t>4/19/19</a:t>
+              <a:t>4/20/19</a:t>
             </a:fld>
             <a:endParaRPr lang="en-US"/>
           </a:p>
@@ -2975,7 +2976,7 @@
           <a:p>
             <a:fld id="{C33EC7A1-935E-D748-85B9-D6F830ED6136}" type="datetimeFigureOut">
               <a:rPr lang="en-US" smtClean="0"/>
-              <a:t>4/19/19</a:t>
+              <a:t>4/20/19</a:t>
             </a:fld>
             <a:endParaRPr lang="en-US"/>
           </a:p>
@@ -3263,7 +3264,7 @@
           <a:p>
             <a:fld id="{C33EC7A1-935E-D748-85B9-D6F830ED6136}" type="datetimeFigureOut">
               <a:rPr lang="en-US" smtClean="0"/>
-              <a:t>4/19/19</a:t>
+              <a:t>4/20/19</a:t>
             </a:fld>
             <a:endParaRPr lang="en-US"/>
           </a:p>
@@ -3504,7 +3505,7 @@
           <a:p>
             <a:fld id="{C33EC7A1-935E-D748-85B9-D6F830ED6136}" type="datetimeFigureOut">
               <a:rPr lang="en-US" smtClean="0"/>
-              <a:t>4/19/19</a:t>
+              <a:t>4/20/19</a:t>
             </a:fld>
             <a:endParaRPr lang="en-US"/>
           </a:p>
@@ -6254,7 +6255,12 @@
             <p:ph type="title"/>
           </p:nvPr>
         </p:nvSpPr>
-        <p:spPr/>
+        <p:spPr>
+          <a:xfrm>
+            <a:off x="70247" y="211137"/>
+            <a:ext cx="12051506" cy="817564"/>
+          </a:xfrm>
+        </p:spPr>
         <p:txBody>
           <a:bodyPr/>
           <a:lstStyle/>
@@ -6294,12 +6300,89 @@
             <p:ph idx="1"/>
           </p:nvPr>
         </p:nvSpPr>
-        <p:spPr/>
-        <p:txBody>
-          <a:bodyPr/>
-          <a:lstStyle/>
-          <a:p>
-            <a:endParaRPr lang="en-US" dirty="0"/>
+        <p:spPr>
+          <a:xfrm>
+            <a:off x="70247" y="1657350"/>
+            <a:ext cx="12051506" cy="4286250"/>
+          </a:xfrm>
+        </p:spPr>
+        <p:txBody>
+          <a:bodyPr>
+            <a:normAutofit/>
+          </a:bodyPr>
+          <a:lstStyle/>
+          <a:p>
+            <a:r>
+              <a:rPr lang="en-US" sz="3200" dirty="0"/>
+              <a:t>Input format – </a:t>
+            </a:r>
+            <a:r>
+              <a:rPr lang="en-US" sz="3200" dirty="0" err="1"/>
+              <a:t>pandas.DataFrame</a:t>
+            </a:r>
+            <a:endParaRPr lang="en-US" sz="3200" dirty="0"/>
+          </a:p>
+          <a:p>
+            <a:pPr lvl="1"/>
+            <a:r>
+              <a:rPr lang="en-US" sz="3200" dirty="0">
+                <a:hlinkClick r:id="rId2"/>
+              </a:rPr>
+              <a:t>http://pandas.pydata.org/pandas-docs/stable/reference/api/pandas.DataFrame.html#pandas.DataFrame</a:t>
+            </a:r>
+            <a:endParaRPr lang="en-US" sz="3200" dirty="0"/>
+          </a:p>
+          <a:p>
+            <a:pPr lvl="1"/>
+            <a:r>
+              <a:rPr lang="en-US" sz="3200" dirty="0"/>
+              <a:t>flat </a:t>
+            </a:r>
+            <a:r>
+              <a:rPr lang="en-US" sz="3200" dirty="0" err="1"/>
+              <a:t>DataFrame</a:t>
+            </a:r>
+            <a:r>
+              <a:rPr lang="en-US" sz="3200" dirty="0"/>
+              <a:t> </a:t>
+            </a:r>
+          </a:p>
+          <a:p>
+            <a:pPr lvl="1"/>
+            <a:r>
+              <a:rPr lang="en-US" sz="3200" dirty="0"/>
+              <a:t>Stacked </a:t>
+            </a:r>
+            <a:r>
+              <a:rPr lang="en-US" sz="3200" dirty="0" err="1"/>
+              <a:t>DataFrame</a:t>
+            </a:r>
+            <a:endParaRPr lang="en-US" sz="3200" dirty="0"/>
+          </a:p>
+          <a:p>
+            <a:pPr lvl="1"/>
+            <a:r>
+              <a:rPr lang="en-US" sz="3200" dirty="0"/>
+              <a:t>Dictionary of flat </a:t>
+            </a:r>
+            <a:r>
+              <a:rPr lang="en-US" sz="3200" dirty="0" err="1"/>
+              <a:t>DataFrames</a:t>
+            </a:r>
+            <a:endParaRPr lang="en-US" sz="3200" dirty="0"/>
+          </a:p>
+          <a:p>
+            <a:pPr lvl="1"/>
+            <a:r>
+              <a:rPr lang="en-US" sz="3200" dirty="0">
+                <a:hlinkClick r:id="rId3"/>
+              </a:rPr>
+              <a:t>https://tsfresh.readthedocs.io/en/latest/text/data_formats.html</a:t>
+            </a:r>
+            <a:r>
+              <a:rPr lang="en-US" sz="3200" dirty="0"/>
+              <a:t> </a:t>
+            </a:r>
           </a:p>
         </p:txBody>
       </p:sp>
@@ -6500,7 +6583,12 @@
             <p:ph type="title"/>
           </p:nvPr>
         </p:nvSpPr>
-        <p:spPr/>
+        <p:spPr>
+          <a:xfrm>
+            <a:off x="0" y="18256"/>
+            <a:ext cx="12051506" cy="817564"/>
+          </a:xfrm>
+        </p:spPr>
         <p:txBody>
           <a:bodyPr/>
           <a:lstStyle/>
@@ -6519,7 +6607,7 @@
                   <a:srgbClr val="0070C0"/>
                 </a:solidFill>
               </a:rPr>
-              <a:t> – </a:t>
+              <a:t> – Data Formats (Flat </a:t>
             </a:r>
             <a:r>
               <a:rPr lang="en-US" b="1" dirty="0" err="1">
@@ -6527,7 +6615,7 @@
                   <a:srgbClr val="0070C0"/>
                 </a:solidFill>
               </a:rPr>
-              <a:t>scikit</a:t>
+              <a:t>DataFrame</a:t>
             </a:r>
             <a:r>
               <a:rPr lang="en-US" b="1" dirty="0">
@@ -6535,7 +6623,7 @@
                   <a:srgbClr val="0070C0"/>
                 </a:solidFill>
               </a:rPr>
-              <a:t>-learn Transformers</a:t>
+              <a:t> Example)</a:t>
             </a:r>
           </a:p>
         </p:txBody>
@@ -6556,19 +6644,221 @@
             <p:ph idx="1"/>
           </p:nvPr>
         </p:nvSpPr>
-        <p:spPr/>
-        <p:txBody>
-          <a:bodyPr/>
-          <a:lstStyle/>
-          <a:p>
-            <a:endParaRPr lang="en-US" dirty="0"/>
-          </a:p>
-        </p:txBody>
-      </p:sp>
+        <p:spPr>
+          <a:xfrm>
+            <a:off x="70247" y="732630"/>
+            <a:ext cx="12051506" cy="6025358"/>
+          </a:xfrm>
+        </p:spPr>
+        <p:txBody>
+          <a:bodyPr>
+            <a:normAutofit/>
+          </a:bodyPr>
+          <a:lstStyle/>
+          <a:p>
+            <a:r>
+              <a:rPr lang="en-US" dirty="0"/>
+              <a:t>Input Data Format:</a:t>
+            </a:r>
+          </a:p>
+          <a:p>
+            <a:pPr lvl="1"/>
+            <a:r>
+              <a:rPr lang="en-US" dirty="0"/>
+              <a:t>Imagine you record the values of time-series x and y for different objects A and B for three different times t1, t2 and t3. </a:t>
+            </a:r>
+          </a:p>
+          <a:p>
+            <a:pPr lvl="1"/>
+            <a:r>
+              <a:rPr lang="en-US" dirty="0"/>
+              <a:t>Now you want to calculate some feature with </a:t>
+            </a:r>
+            <a:r>
+              <a:rPr lang="en-US" dirty="0" err="1"/>
+              <a:t>tsfresh</a:t>
+            </a:r>
+            <a:r>
+              <a:rPr lang="en-US" dirty="0"/>
+              <a:t>. </a:t>
+            </a:r>
+          </a:p>
+          <a:p>
+            <a:pPr lvl="1"/>
+            <a:r>
+              <a:rPr lang="en-US" dirty="0"/>
+              <a:t>Your resulting </a:t>
+            </a:r>
+            <a:r>
+              <a:rPr lang="en-US" dirty="0" err="1"/>
+              <a:t>DataFrame</a:t>
+            </a:r>
+            <a:r>
+              <a:rPr lang="en-US" dirty="0"/>
+              <a:t> may look like this</a:t>
+            </a:r>
+          </a:p>
+          <a:p>
+            <a:pPr lvl="1"/>
+            <a:r>
+              <a:rPr lang="en-US" dirty="0"/>
+              <a:t>You would pass </a:t>
+            </a:r>
+          </a:p>
+          <a:p>
+            <a:pPr lvl="1"/>
+            <a:r>
+              <a:rPr lang="en-US" sz="1800" dirty="0" err="1"/>
+              <a:t>column_id</a:t>
+            </a:r>
+            <a:r>
+              <a:rPr lang="en-US" sz="1800" dirty="0"/>
+              <a:t>="id", </a:t>
+            </a:r>
+            <a:r>
+              <a:rPr lang="en-US" sz="1800" dirty="0" err="1"/>
+              <a:t>column_sort</a:t>
+            </a:r>
+            <a:r>
+              <a:rPr lang="en-US" sz="1800" dirty="0"/>
+              <a:t>="time", </a:t>
+            </a:r>
+            <a:r>
+              <a:rPr lang="en-US" sz="1800" dirty="0" err="1"/>
+              <a:t>column_kind</a:t>
+            </a:r>
+            <a:r>
+              <a:rPr lang="en-US" sz="1800" dirty="0"/>
+              <a:t>=None, </a:t>
+            </a:r>
+            <a:r>
+              <a:rPr lang="en-US" sz="1800" dirty="0" err="1"/>
+              <a:t>column_value</a:t>
+            </a:r>
+            <a:r>
+              <a:rPr lang="en-US" sz="1800" dirty="0"/>
+              <a:t>=None</a:t>
+            </a:r>
+          </a:p>
+          <a:p>
+            <a:pPr lvl="1"/>
+            <a:r>
+              <a:rPr lang="en-US" sz="1800" dirty="0"/>
+              <a:t>to extract functions, to extract features separately for all ids and </a:t>
+            </a:r>
+          </a:p>
+          <a:p>
+            <a:pPr lvl="1"/>
+            <a:r>
+              <a:rPr lang="en-US" sz="1800"/>
+              <a:t>separately for the x and y values.</a:t>
+            </a:r>
+            <a:endParaRPr lang="en-US" sz="1800" dirty="0"/>
+          </a:p>
+          <a:p>
+            <a:r>
+              <a:rPr lang="en-US" dirty="0"/>
+              <a:t>Output Format of Features:</a:t>
+            </a:r>
+          </a:p>
+          <a:p>
+            <a:pPr lvl="1"/>
+            <a:r>
+              <a:rPr lang="en-US" dirty="0"/>
+              <a:t>The resulting feature matrix for all three input </a:t>
+            </a:r>
+            <a:r>
+              <a:rPr lang="en-US" dirty="0" err="1"/>
+              <a:t>DataFrame</a:t>
+            </a:r>
+            <a:r>
+              <a:rPr lang="en-US" dirty="0"/>
+              <a:t> options will be the same. </a:t>
+            </a:r>
+          </a:p>
+          <a:p>
+            <a:pPr lvl="1"/>
+            <a:r>
+              <a:rPr lang="en-US" dirty="0"/>
+              <a:t>It will always be a </a:t>
+            </a:r>
+            <a:r>
+              <a:rPr lang="en-US" dirty="0">
+                <a:hlinkClick r:id="rId2" tooltip="(in pandas v0.24.2)"/>
+              </a:rPr>
+              <a:t>pandas.DataFrame</a:t>
+            </a:r>
+            <a:r>
+              <a:rPr lang="en-US" dirty="0"/>
+              <a:t> with the following layout</a:t>
+            </a:r>
+          </a:p>
+        </p:txBody>
+      </p:sp>
+      <p:pic>
+        <p:nvPicPr>
+          <p:cNvPr id="5" name="Picture 4">
+            <a:extLst>
+              <a:ext uri="{FF2B5EF4-FFF2-40B4-BE49-F238E27FC236}">
+                <a16:creationId xmlns:a16="http://schemas.microsoft.com/office/drawing/2014/main" id="{9F0030AB-B764-1740-9A36-193602B7571A}"/>
+              </a:ext>
+            </a:extLst>
+          </p:cNvPr>
+          <p:cNvPicPr>
+            <a:picLocks noChangeAspect="1"/>
+          </p:cNvPicPr>
+          <p:nvPr/>
+        </p:nvPicPr>
+        <p:blipFill>
+          <a:blip r:embed="rId3"/>
+          <a:stretch>
+            <a:fillRect/>
+          </a:stretch>
+        </p:blipFill>
+        <p:spPr>
+          <a:xfrm>
+            <a:off x="1299368" y="5395120"/>
+            <a:ext cx="8978900" cy="1460500"/>
+          </a:xfrm>
+          <a:prstGeom prst="rect">
+            <a:avLst/>
+          </a:prstGeom>
+        </p:spPr>
+      </p:pic>
+      <p:pic>
+        <p:nvPicPr>
+          <p:cNvPr id="7" name="Picture 6">
+            <a:extLst>
+              <a:ext uri="{FF2B5EF4-FFF2-40B4-BE49-F238E27FC236}">
+                <a16:creationId xmlns:a16="http://schemas.microsoft.com/office/drawing/2014/main" id="{007ADE25-D209-5B4C-9364-DC353D10D490}"/>
+              </a:ext>
+            </a:extLst>
+          </p:cNvPr>
+          <p:cNvPicPr>
+            <a:picLocks noChangeAspect="1"/>
+          </p:cNvPicPr>
+          <p:nvPr/>
+        </p:nvPicPr>
+        <p:blipFill>
+          <a:blip r:embed="rId4"/>
+          <a:stretch>
+            <a:fillRect/>
+          </a:stretch>
+        </p:blipFill>
+        <p:spPr>
+          <a:xfrm>
+            <a:off x="8422802" y="1550194"/>
+            <a:ext cx="3698951" cy="2678906"/>
+          </a:xfrm>
+          <a:prstGeom prst="rect">
+            <a:avLst/>
+          </a:prstGeom>
+        </p:spPr>
+      </p:pic>
     </p:spTree>
     <p:extLst>
       <p:ext uri="{BB962C8B-B14F-4D97-AF65-F5344CB8AC3E}">
-        <p14:creationId xmlns:p14="http://schemas.microsoft.com/office/powerpoint/2010/main" val="636674178"/>
+        <p14:creationId xmlns:p14="http://schemas.microsoft.com/office/powerpoint/2010/main" val="2518507445"/>
       </p:ext>
     </p:extLst>
   </p:cSld>
@@ -6630,6 +6920,117 @@
                   <a:srgbClr val="0070C0"/>
                 </a:solidFill>
               </a:rPr>
+              <a:t> – </a:t>
+            </a:r>
+            <a:r>
+              <a:rPr lang="en-US" b="1" dirty="0" err="1">
+                <a:solidFill>
+                  <a:srgbClr val="0070C0"/>
+                </a:solidFill>
+              </a:rPr>
+              <a:t>scikit</a:t>
+            </a:r>
+            <a:r>
+              <a:rPr lang="en-US" b="1" dirty="0">
+                <a:solidFill>
+                  <a:srgbClr val="0070C0"/>
+                </a:solidFill>
+              </a:rPr>
+              <a:t>-learn Transformers</a:t>
+            </a:r>
+          </a:p>
+        </p:txBody>
+      </p:sp>
+      <p:sp>
+        <p:nvSpPr>
+          <p:cNvPr id="3" name="Content Placeholder 2">
+            <a:extLst>
+              <a:ext uri="{FF2B5EF4-FFF2-40B4-BE49-F238E27FC236}">
+                <a16:creationId xmlns:a16="http://schemas.microsoft.com/office/drawing/2014/main" id="{F21F1551-71FB-9546-80F4-DFF7DA1697AE}"/>
+              </a:ext>
+            </a:extLst>
+          </p:cNvPr>
+          <p:cNvSpPr>
+            <a:spLocks noGrp="1"/>
+          </p:cNvSpPr>
+          <p:nvPr>
+            <p:ph idx="1"/>
+          </p:nvPr>
+        </p:nvSpPr>
+        <p:spPr/>
+        <p:txBody>
+          <a:bodyPr/>
+          <a:lstStyle/>
+          <a:p>
+            <a:endParaRPr lang="en-US" dirty="0"/>
+          </a:p>
+        </p:txBody>
+      </p:sp>
+    </p:spTree>
+    <p:extLst>
+      <p:ext uri="{BB962C8B-B14F-4D97-AF65-F5344CB8AC3E}">
+        <p14:creationId xmlns:p14="http://schemas.microsoft.com/office/powerpoint/2010/main" val="636674178"/>
+      </p:ext>
+    </p:extLst>
+  </p:cSld>
+  <p:clrMapOvr>
+    <a:masterClrMapping/>
+  </p:clrMapOvr>
+</p:sld>
+</file>
+
+<file path=ppt/slides/slide22.xml><?xml version="1.0" encoding="utf-8"?>
+<p:sld xmlns:a="http://schemas.openxmlformats.org/drawingml/2006/main" xmlns:r="http://schemas.openxmlformats.org/officeDocument/2006/relationships" xmlns:p="http://schemas.openxmlformats.org/presentationml/2006/main">
+  <p:cSld>
+    <p:spTree>
+      <p:nvGrpSpPr>
+        <p:cNvPr id="1" name=""/>
+        <p:cNvGrpSpPr/>
+        <p:nvPr/>
+      </p:nvGrpSpPr>
+      <p:grpSpPr>
+        <a:xfrm>
+          <a:off x="0" y="0"/>
+          <a:ext cx="0" cy="0"/>
+          <a:chOff x="0" y="0"/>
+          <a:chExt cx="0" cy="0"/>
+        </a:xfrm>
+      </p:grpSpPr>
+      <p:sp>
+        <p:nvSpPr>
+          <p:cNvPr id="2" name="Title 1">
+            <a:extLst>
+              <a:ext uri="{FF2B5EF4-FFF2-40B4-BE49-F238E27FC236}">
+                <a16:creationId xmlns:a16="http://schemas.microsoft.com/office/drawing/2014/main" id="{01560502-1667-5140-AF58-5D0A5B061D91}"/>
+              </a:ext>
+            </a:extLst>
+          </p:cNvPr>
+          <p:cNvSpPr>
+            <a:spLocks noGrp="1"/>
+          </p:cNvSpPr>
+          <p:nvPr>
+            <p:ph type="title"/>
+          </p:nvPr>
+        </p:nvSpPr>
+        <p:spPr/>
+        <p:txBody>
+          <a:bodyPr/>
+          <a:lstStyle/>
+          <a:p>
+            <a:r>
+              <a:rPr lang="en-US" b="1" dirty="0" err="1">
+                <a:solidFill>
+                  <a:srgbClr val="0070C0"/>
+                </a:solidFill>
+              </a:rPr>
+              <a:t>tsfresh</a:t>
+            </a:r>
+            <a:r>
+              <a:rPr lang="en-US" b="1" dirty="0">
+                <a:solidFill>
+                  <a:srgbClr val="0070C0"/>
+                </a:solidFill>
+              </a:rPr>
               <a:t> – Parallelization</a:t>
             </a:r>
           </a:p>
@@ -6673,7 +7074,7 @@
 </p:sld>
 </file>
 
-<file path=ppt/slides/slide22.xml><?xml version="1.0" encoding="utf-8"?>
+<file path=ppt/slides/slide23.xml><?xml version="1.0" encoding="utf-8"?>
 <p:sld xmlns:a="http://schemas.openxmlformats.org/drawingml/2006/main" xmlns:r="http://schemas.openxmlformats.org/officeDocument/2006/relationships" xmlns:p="http://schemas.openxmlformats.org/presentationml/2006/main">
   <p:cSld>
     <p:spTree>
@@ -6803,101 +7204,6 @@
 </p:sld>
 </file>
 
-<file path=ppt/slides/slide23.xml><?xml version="1.0" encoding="utf-8"?>
-<p:sld xmlns:a="http://schemas.openxmlformats.org/drawingml/2006/main" xmlns:r="http://schemas.openxmlformats.org/officeDocument/2006/relationships" xmlns:p="http://schemas.openxmlformats.org/presentationml/2006/main">
-  <p:cSld>
-    <p:spTree>
-      <p:nvGrpSpPr>
-        <p:cNvPr id="1" name=""/>
-        <p:cNvGrpSpPr/>
-        <p:nvPr/>
-      </p:nvGrpSpPr>
-      <p:grpSpPr>
-        <a:xfrm>
-          <a:off x="0" y="0"/>
-          <a:ext cx="0" cy="0"/>
-          <a:chOff x="0" y="0"/>
-          <a:chExt cx="0" cy="0"/>
-        </a:xfrm>
-      </p:grpSpPr>
-      <p:sp>
-        <p:nvSpPr>
-          <p:cNvPr id="2" name="Title 1">
-            <a:extLst>
-              <a:ext uri="{FF2B5EF4-FFF2-40B4-BE49-F238E27FC236}">
-                <a16:creationId xmlns:a16="http://schemas.microsoft.com/office/drawing/2014/main" id="{01560502-1667-5140-AF58-5D0A5B061D91}"/>
-              </a:ext>
-            </a:extLst>
-          </p:cNvPr>
-          <p:cNvSpPr>
-            <a:spLocks noGrp="1"/>
-          </p:cNvSpPr>
-          <p:nvPr>
-            <p:ph type="title"/>
-          </p:nvPr>
-        </p:nvSpPr>
-        <p:spPr/>
-        <p:txBody>
-          <a:bodyPr/>
-          <a:lstStyle/>
-          <a:p>
-            <a:r>
-              <a:rPr lang="en-US" b="1" dirty="0" err="1">
-                <a:solidFill>
-                  <a:srgbClr val="0070C0"/>
-                </a:solidFill>
-              </a:rPr>
-              <a:t>tsfresh</a:t>
-            </a:r>
-            <a:r>
-              <a:rPr lang="en-US" b="1" dirty="0">
-                <a:solidFill>
-                  <a:srgbClr val="0070C0"/>
-                </a:solidFill>
-              </a:rPr>
-              <a:t> – Summary of time-series forecasting</a:t>
-            </a:r>
-          </a:p>
-        </p:txBody>
-      </p:sp>
-      <p:sp>
-        <p:nvSpPr>
-          <p:cNvPr id="3" name="Content Placeholder 2">
-            <a:extLst>
-              <a:ext uri="{FF2B5EF4-FFF2-40B4-BE49-F238E27FC236}">
-                <a16:creationId xmlns:a16="http://schemas.microsoft.com/office/drawing/2014/main" id="{F21F1551-71FB-9546-80F4-DFF7DA1697AE}"/>
-              </a:ext>
-            </a:extLst>
-          </p:cNvPr>
-          <p:cNvSpPr>
-            <a:spLocks noGrp="1"/>
-          </p:cNvSpPr>
-          <p:nvPr>
-            <p:ph idx="1"/>
-          </p:nvPr>
-        </p:nvSpPr>
-        <p:spPr/>
-        <p:txBody>
-          <a:bodyPr/>
-          <a:lstStyle/>
-          <a:p>
-            <a:endParaRPr lang="en-US" dirty="0"/>
-          </a:p>
-        </p:txBody>
-      </p:sp>
-    </p:spTree>
-    <p:extLst>
-      <p:ext uri="{BB962C8B-B14F-4D97-AF65-F5344CB8AC3E}">
-        <p14:creationId xmlns:p14="http://schemas.microsoft.com/office/powerpoint/2010/main" val="3972214536"/>
-      </p:ext>
-    </p:extLst>
-  </p:cSld>
-  <p:clrMapOvr>
-    <a:masterClrMapping/>
-  </p:clrMapOvr>
-</p:sld>
-</file>
-
 <file path=ppt/slides/slide24.xml><?xml version="1.0" encoding="utf-8"?>
 <p:sld xmlns:a="http://schemas.openxmlformats.org/drawingml/2006/main" xmlns:r="http://schemas.openxmlformats.org/officeDocument/2006/relationships" xmlns:p="http://schemas.openxmlformats.org/presentationml/2006/main">
   <p:cSld>
@@ -6937,12 +7243,20 @@
           <a:lstStyle/>
           <a:p>
             <a:r>
+              <a:rPr lang="en-US" b="1" dirty="0" err="1">
+                <a:solidFill>
+                  <a:srgbClr val="0070C0"/>
+                </a:solidFill>
+              </a:rPr>
+              <a:t>tsfresh</a:t>
+            </a:r>
+            <a:r>
               <a:rPr lang="en-US" b="1" dirty="0">
                 <a:solidFill>
                   <a:srgbClr val="0070C0"/>
                 </a:solidFill>
               </a:rPr>
-              <a:t>Conclusions – Things to remember</a:t>
+              <a:t> – Summary of time-series forecasting</a:t>
             </a:r>
           </a:p>
         </p:txBody>
@@ -6965,70 +7279,8 @@
         </p:nvSpPr>
         <p:spPr/>
         <p:txBody>
-          <a:bodyPr>
-            <a:normAutofit/>
-          </a:bodyPr>
-          <a:lstStyle/>
-          <a:p>
-            <a:r>
-              <a:rPr lang="en-US" dirty="0"/>
-              <a:t>Feature scaling is done to Normalize data so that priority is not given to a particular feature. </a:t>
-            </a:r>
-          </a:p>
-          <a:p>
-            <a:pPr lvl="1"/>
-            <a:r>
-              <a:rPr lang="en-US" dirty="0">
-                <a:hlinkClick r:id="rId2"/>
-              </a:rPr>
-              <a:t>https://scikit-learn.org/stable/modules/preprocessing.html</a:t>
-            </a:r>
-            <a:r>
-              <a:rPr lang="en-US" dirty="0"/>
-              <a:t> </a:t>
-            </a:r>
-          </a:p>
-          <a:p>
-            <a:r>
-              <a:rPr lang="en-US" dirty="0"/>
-              <a:t>Role of scaling is mostly important in algorithms that are distance based (</a:t>
-            </a:r>
-            <a:r>
-              <a:rPr lang="en-US" dirty="0" err="1"/>
-              <a:t>e.g</a:t>
-            </a:r>
-            <a:r>
-              <a:rPr lang="en-US" dirty="0"/>
-              <a:t>, Euclidean metric).</a:t>
-            </a:r>
-          </a:p>
-          <a:p>
-            <a:pPr lvl="1"/>
-            <a:r>
-              <a:rPr lang="en-US" dirty="0"/>
-              <a:t>E.g., k-means clustering, Support Vector Machines, etc.</a:t>
-            </a:r>
-          </a:p>
-          <a:p>
-            <a:r>
-              <a:rPr lang="en-US" dirty="0"/>
-              <a:t>ASIDE -- Random Forest (RF) is a tree-based model and hence </a:t>
-            </a:r>
-            <a:r>
-              <a:rPr lang="en-US" b="1" dirty="0"/>
-              <a:t>does not require</a:t>
-            </a:r>
-            <a:r>
-              <a:rPr lang="en-US" dirty="0"/>
-              <a:t> feature scaling.</a:t>
-            </a:r>
-          </a:p>
-          <a:p>
-            <a:r>
-              <a:rPr lang="en-US" dirty="0"/>
-              <a:t>RF algorithm is based on partitioning, even if you apply Normalization then also the result would be the same.</a:t>
-            </a:r>
-          </a:p>
+          <a:bodyPr/>
+          <a:lstStyle/>
           <a:p>
             <a:endParaRPr lang="en-US" dirty="0"/>
           </a:p>
@@ -7037,7 +7289,7 @@
     </p:spTree>
     <p:extLst>
       <p:ext uri="{BB962C8B-B14F-4D97-AF65-F5344CB8AC3E}">
-        <p14:creationId xmlns:p14="http://schemas.microsoft.com/office/powerpoint/2010/main" val="4235018102"/>
+        <p14:creationId xmlns:p14="http://schemas.microsoft.com/office/powerpoint/2010/main" val="3972214536"/>
       </p:ext>
     </p:extLst>
   </p:cSld>
@@ -7080,16 +7332,9 @@
             <p:ph type="title"/>
           </p:nvPr>
         </p:nvSpPr>
-        <p:spPr>
-          <a:xfrm>
-            <a:off x="0" y="0"/>
-            <a:ext cx="10515600" cy="681037"/>
-          </a:xfrm>
-        </p:spPr>
-        <p:txBody>
-          <a:bodyPr>
-            <a:normAutofit fontScale="90000"/>
-          </a:bodyPr>
+        <p:spPr/>
+        <p:txBody>
+          <a:bodyPr/>
           <a:lstStyle/>
           <a:p>
             <a:r>
@@ -7098,7 +7343,7 @@
                   <a:srgbClr val="0070C0"/>
                 </a:solidFill>
               </a:rPr>
-              <a:t>References &amp; Useful Resources</a:t>
+              <a:t>Conclusions – Things to remember</a:t>
             </a:r>
           </a:p>
         </p:txBody>
@@ -7119,12 +7364,7 @@
             <p:ph idx="1"/>
           </p:nvPr>
         </p:nvSpPr>
-        <p:spPr>
-          <a:xfrm>
-            <a:off x="0" y="802368"/>
-            <a:ext cx="12097657" cy="6055632"/>
-          </a:xfrm>
-        </p:spPr>
+        <p:spPr/>
         <p:txBody>
           <a:bodyPr>
             <a:normAutofit/>
@@ -7132,202 +7372,63 @@
           <a:lstStyle/>
           <a:p>
             <a:r>
-              <a:rPr lang="en-US" sz="1800" dirty="0">
+              <a:rPr lang="en-US" dirty="0"/>
+              <a:t>Feature scaling is done to Normalize data so that priority is not given to a particular feature. </a:t>
+            </a:r>
+          </a:p>
+          <a:p>
+            <a:pPr lvl="1"/>
+            <a:r>
+              <a:rPr lang="en-US" dirty="0">
                 <a:hlinkClick r:id="rId2"/>
               </a:rPr>
-              <a:t>https://github.com/benfulcher/hctsa</a:t>
-            </a:r>
-            <a:endParaRPr lang="en-US" sz="1800" dirty="0"/>
-          </a:p>
-          <a:p>
-            <a:r>
-              <a:rPr lang="en-US" sz="1800" dirty="0">
-                <a:hlinkClick r:id="rId3"/>
-              </a:rPr>
-              <a:t>https://tsfresh.readthedocs.io/en/latest/</a:t>
-            </a:r>
-            <a:r>
-              <a:rPr lang="en-US" sz="1800" dirty="0"/>
+              <a:t>https://scikit-learn.org/stable/modules/preprocessing.html</a:t>
+            </a:r>
+            <a:r>
+              <a:rPr lang="en-US" dirty="0"/>
               <a:t> </a:t>
             </a:r>
           </a:p>
           <a:p>
             <a:r>
-              <a:rPr lang="en-US" sz="1800" dirty="0">
-                <a:hlinkClick r:id="rId4"/>
-              </a:rPr>
-              <a:t>https://github.com/blue-yonder/tsfresh</a:t>
-            </a:r>
-            <a:r>
-              <a:rPr lang="en-US" sz="1800" dirty="0"/>
-              <a:t> </a:t>
-            </a:r>
-          </a:p>
-          <a:p>
-            <a:r>
-              <a:rPr lang="en-US" sz="1800" dirty="0">
-                <a:hlinkClick r:id="rId5"/>
-              </a:rPr>
-              <a:t>https://towardsdatascience.com/how-not-to-use-machine-learning-for-time-series-forecasting-avoiding-the-pitfalls-19f9d7adf424</a:t>
-            </a:r>
-            <a:r>
-              <a:rPr lang="en-US" sz="1800" dirty="0"/>
-              <a:t> </a:t>
-            </a:r>
-          </a:p>
-          <a:p>
-            <a:r>
-              <a:rPr lang="en-US" sz="1800" dirty="0">
-                <a:hlinkClick r:id="rId6"/>
-              </a:rPr>
-              <a:t>https://towardsdatascience.com/how-to-use-machine-learning-for-anomaly-detection-and-condition-monitoring-6742f82900d7</a:t>
-            </a:r>
-            <a:r>
-              <a:rPr lang="en-US" sz="1800" dirty="0"/>
-              <a:t> </a:t>
-            </a:r>
-          </a:p>
-          <a:p>
-            <a:r>
-              <a:rPr lang="en-US" sz="1800" dirty="0">
-                <a:hlinkClick r:id="rId7"/>
-              </a:rPr>
-              <a:t>https://towardsdatascience.com/understanding-feature-engineering-part-1-continuous-numeric-data-da4e47099a7b</a:t>
-            </a:r>
-            <a:r>
-              <a:rPr lang="en-US" sz="1800" dirty="0"/>
-              <a:t> </a:t>
-            </a:r>
-          </a:p>
-          <a:p>
-            <a:r>
-              <a:rPr lang="en-US" sz="1800" dirty="0">
-                <a:hlinkClick r:id="rId8"/>
-              </a:rPr>
-              <a:t>https://towardsdatascience.com/feature-engineering-what-powers-machine-learning-93ab191bcc2d</a:t>
-            </a:r>
-            <a:r>
-              <a:rPr lang="en-US" sz="1800" dirty="0"/>
-              <a:t> </a:t>
-            </a:r>
-          </a:p>
-          <a:p>
-            <a:r>
-              <a:rPr lang="en-US" sz="1800" dirty="0">
-                <a:hlinkClick r:id="rId9"/>
-              </a:rPr>
-              <a:t>https://machinelearningmastery.com/discover-feature-engineering-how-to-engineer-features-and-how-to-get-good-at-it/</a:t>
-            </a:r>
-            <a:r>
-              <a:rPr lang="en-US" sz="1800" dirty="0"/>
-              <a:t> </a:t>
-            </a:r>
-          </a:p>
-          <a:p>
-            <a:r>
-              <a:rPr lang="en-US" sz="1800" dirty="0">
-                <a:hlinkClick r:id="rId10"/>
-              </a:rPr>
-              <a:t>https://developers.google.com/machine-learning/crash-course/representation/feature-engineering</a:t>
-            </a:r>
-            <a:r>
-              <a:rPr lang="en-US" sz="1800" dirty="0"/>
-              <a:t> </a:t>
-            </a:r>
-          </a:p>
-          <a:p>
-            <a:r>
-              <a:rPr lang="en-US" sz="1800" dirty="0"/>
-              <a:t>Feature Engineering for Machine Learning: Principles and Techniques for Data Scientists – Alice Zheng &amp; Amanda </a:t>
-            </a:r>
-            <a:r>
-              <a:rPr lang="en-US" sz="1800" dirty="0" err="1"/>
-              <a:t>Casari</a:t>
-            </a:r>
-            <a:r>
-              <a:rPr lang="en-US" sz="1800" dirty="0"/>
-              <a:t>, O’Reilly, 2018.</a:t>
-            </a:r>
-          </a:p>
-          <a:p>
-            <a:r>
-              <a:rPr lang="en-US" sz="1800" dirty="0"/>
-              <a:t>Feature Engineering Made Easy, Sinan </a:t>
-            </a:r>
-            <a:r>
-              <a:rPr lang="en-US" sz="1800" dirty="0" err="1"/>
-              <a:t>Ozdemir</a:t>
-            </a:r>
-            <a:r>
-              <a:rPr lang="en-US" sz="1800" dirty="0"/>
-              <a:t>, </a:t>
-            </a:r>
-            <a:r>
-              <a:rPr lang="en-US" sz="1800" dirty="0" err="1"/>
-              <a:t>Divya</a:t>
-            </a:r>
-            <a:r>
-              <a:rPr lang="en-US" sz="1800" dirty="0"/>
-              <a:t> </a:t>
-            </a:r>
-            <a:r>
-              <a:rPr lang="en-US" sz="1800" dirty="0" err="1"/>
-              <a:t>Susarla</a:t>
-            </a:r>
-            <a:r>
-              <a:rPr lang="en-US" sz="1800" dirty="0"/>
-              <a:t>, </a:t>
-            </a:r>
-            <a:r>
-              <a:rPr lang="en-US" sz="1800" dirty="0" err="1"/>
-              <a:t>Packt</a:t>
-            </a:r>
-            <a:r>
-              <a:rPr lang="en-US" sz="1800" dirty="0"/>
-              <a:t>, 2018.</a:t>
-            </a:r>
-          </a:p>
-          <a:p>
-            <a:r>
-              <a:rPr lang="en-US" sz="1800" dirty="0"/>
-              <a:t>Feature Extraction: Foundations and Applications, by Isabelle Guyon, Steve Gunn, Masoud </a:t>
-            </a:r>
-            <a:r>
-              <a:rPr lang="en-US" sz="1800" dirty="0" err="1"/>
-              <a:t>Nikravesh</a:t>
-            </a:r>
-            <a:r>
-              <a:rPr lang="en-US" sz="1800" dirty="0"/>
-              <a:t>, </a:t>
-            </a:r>
-            <a:r>
-              <a:rPr lang="en-US" sz="1800" dirty="0" err="1"/>
-              <a:t>Lofti</a:t>
-            </a:r>
-            <a:r>
-              <a:rPr lang="en-US" sz="1800" dirty="0"/>
-              <a:t> A. Zadeh, Springer 2006.</a:t>
-            </a:r>
-          </a:p>
-          <a:p>
-            <a:r>
-              <a:rPr lang="en-US" sz="1800" dirty="0"/>
-              <a:t>Feature Extraction, Construction and Selection: A Data Mining Perspective, Huan Liu, Hiroshi </a:t>
-            </a:r>
-            <a:r>
-              <a:rPr lang="en-US" sz="1800" dirty="0" err="1"/>
-              <a:t>Motoda</a:t>
-            </a:r>
-            <a:r>
-              <a:rPr lang="en-US" sz="1800" dirty="0"/>
-              <a:t>, Springer, 1998.</a:t>
-            </a:r>
-          </a:p>
-          <a:p>
-            <a:endParaRPr lang="en-US" sz="1800" dirty="0"/>
-          </a:p>
-          <a:p>
-            <a:endParaRPr lang="en-US" b="1" dirty="0"/>
+              <a:rPr lang="en-US" dirty="0"/>
+              <a:t>Role of scaling is mostly important in algorithms that are distance based (</a:t>
+            </a:r>
+            <a:r>
+              <a:rPr lang="en-US" dirty="0" err="1"/>
+              <a:t>e.g</a:t>
+            </a:r>
+            <a:r>
+              <a:rPr lang="en-US" dirty="0"/>
+              <a:t>, Euclidean metric).</a:t>
+            </a:r>
+          </a:p>
+          <a:p>
+            <a:pPr lvl="1"/>
+            <a:r>
+              <a:rPr lang="en-US" dirty="0"/>
+              <a:t>E.g., k-means clustering, Support Vector Machines, etc.</a:t>
+            </a:r>
+          </a:p>
+          <a:p>
+            <a:r>
+              <a:rPr lang="en-US" dirty="0"/>
+              <a:t>ASIDE -- Random Forest (RF) is a tree-based model and hence </a:t>
+            </a:r>
+            <a:r>
+              <a:rPr lang="en-US" b="1" dirty="0"/>
+              <a:t>does not require</a:t>
+            </a:r>
+            <a:r>
+              <a:rPr lang="en-US" dirty="0"/>
+              <a:t> feature scaling.</a:t>
+            </a:r>
+          </a:p>
+          <a:p>
+            <a:r>
+              <a:rPr lang="en-US" dirty="0"/>
+              <a:t>RF algorithm is based on partitioning, even if you apply Normalization then also the result would be the same.</a:t>
+            </a:r>
           </a:p>
           <a:p>
             <a:endParaRPr lang="en-US" dirty="0"/>
@@ -7337,7 +7438,7 @@
     </p:spTree>
     <p:extLst>
       <p:ext uri="{BB962C8B-B14F-4D97-AF65-F5344CB8AC3E}">
-        <p14:creationId xmlns:p14="http://schemas.microsoft.com/office/powerpoint/2010/main" val="533690633"/>
+        <p14:creationId xmlns:p14="http://schemas.microsoft.com/office/powerpoint/2010/main" val="4235018102"/>
       </p:ext>
     </p:extLst>
   </p:cSld>
@@ -7369,6 +7470,306 @@
           <p:cNvPr id="2" name="Title 1">
             <a:extLst>
               <a:ext uri="{FF2B5EF4-FFF2-40B4-BE49-F238E27FC236}">
+                <a16:creationId xmlns:a16="http://schemas.microsoft.com/office/drawing/2014/main" id="{01560502-1667-5140-AF58-5D0A5B061D91}"/>
+              </a:ext>
+            </a:extLst>
+          </p:cNvPr>
+          <p:cNvSpPr>
+            <a:spLocks noGrp="1"/>
+          </p:cNvSpPr>
+          <p:nvPr>
+            <p:ph type="title"/>
+          </p:nvPr>
+        </p:nvSpPr>
+        <p:spPr>
+          <a:xfrm>
+            <a:off x="0" y="0"/>
+            <a:ext cx="10515600" cy="681037"/>
+          </a:xfrm>
+        </p:spPr>
+        <p:txBody>
+          <a:bodyPr>
+            <a:normAutofit fontScale="90000"/>
+          </a:bodyPr>
+          <a:lstStyle/>
+          <a:p>
+            <a:r>
+              <a:rPr lang="en-US" b="1" dirty="0">
+                <a:solidFill>
+                  <a:srgbClr val="0070C0"/>
+                </a:solidFill>
+              </a:rPr>
+              <a:t>References &amp; Useful Resources</a:t>
+            </a:r>
+          </a:p>
+        </p:txBody>
+      </p:sp>
+      <p:sp>
+        <p:nvSpPr>
+          <p:cNvPr id="3" name="Content Placeholder 2">
+            <a:extLst>
+              <a:ext uri="{FF2B5EF4-FFF2-40B4-BE49-F238E27FC236}">
+                <a16:creationId xmlns:a16="http://schemas.microsoft.com/office/drawing/2014/main" id="{F21F1551-71FB-9546-80F4-DFF7DA1697AE}"/>
+              </a:ext>
+            </a:extLst>
+          </p:cNvPr>
+          <p:cNvSpPr>
+            <a:spLocks noGrp="1"/>
+          </p:cNvSpPr>
+          <p:nvPr>
+            <p:ph idx="1"/>
+          </p:nvPr>
+        </p:nvSpPr>
+        <p:spPr>
+          <a:xfrm>
+            <a:off x="0" y="802368"/>
+            <a:ext cx="12097657" cy="6055632"/>
+          </a:xfrm>
+        </p:spPr>
+        <p:txBody>
+          <a:bodyPr>
+            <a:normAutofit/>
+          </a:bodyPr>
+          <a:lstStyle/>
+          <a:p>
+            <a:r>
+              <a:rPr lang="en-US" sz="1800" dirty="0">
+                <a:hlinkClick r:id="rId2"/>
+              </a:rPr>
+              <a:t>https://github.com/benfulcher/hctsa</a:t>
+            </a:r>
+            <a:endParaRPr lang="en-US" sz="1800" dirty="0"/>
+          </a:p>
+          <a:p>
+            <a:r>
+              <a:rPr lang="en-US" sz="1800" dirty="0">
+                <a:hlinkClick r:id="rId3"/>
+              </a:rPr>
+              <a:t>https://tsfresh.readthedocs.io/en/latest/</a:t>
+            </a:r>
+            <a:r>
+              <a:rPr lang="en-US" sz="1800" dirty="0"/>
+              <a:t> </a:t>
+            </a:r>
+          </a:p>
+          <a:p>
+            <a:r>
+              <a:rPr lang="en-US" sz="1800" dirty="0">
+                <a:hlinkClick r:id="rId4"/>
+              </a:rPr>
+              <a:t>https://github.com/blue-yonder/tsfresh</a:t>
+            </a:r>
+            <a:r>
+              <a:rPr lang="en-US" sz="1800" dirty="0"/>
+              <a:t> </a:t>
+            </a:r>
+          </a:p>
+          <a:p>
+            <a:r>
+              <a:rPr lang="en-US" sz="1800" dirty="0">
+                <a:hlinkClick r:id="rId5"/>
+              </a:rPr>
+              <a:t>https://towardsdatascience.com/how-not-to-use-machine-learning-for-time-series-forecasting-avoiding-the-pitfalls-19f9d7adf424</a:t>
+            </a:r>
+            <a:r>
+              <a:rPr lang="en-US" sz="1800" dirty="0"/>
+              <a:t> </a:t>
+            </a:r>
+          </a:p>
+          <a:p>
+            <a:r>
+              <a:rPr lang="en-US" sz="1800" dirty="0">
+                <a:hlinkClick r:id="rId6"/>
+              </a:rPr>
+              <a:t>https://towardsdatascience.com/how-to-use-machine-learning-for-anomaly-detection-and-condition-monitoring-6742f82900d7</a:t>
+            </a:r>
+            <a:r>
+              <a:rPr lang="en-US" sz="1800" dirty="0"/>
+              <a:t> </a:t>
+            </a:r>
+          </a:p>
+          <a:p>
+            <a:r>
+              <a:rPr lang="en-US" sz="1800" dirty="0">
+                <a:hlinkClick r:id="rId7"/>
+              </a:rPr>
+              <a:t>https://towardsdatascience.com/understanding-feature-engineering-part-1-continuous-numeric-data-da4e47099a7b</a:t>
+            </a:r>
+            <a:r>
+              <a:rPr lang="en-US" sz="1800" dirty="0"/>
+              <a:t> </a:t>
+            </a:r>
+          </a:p>
+          <a:p>
+            <a:r>
+              <a:rPr lang="en-US" sz="1800" dirty="0">
+                <a:hlinkClick r:id="rId8"/>
+              </a:rPr>
+              <a:t>https://towardsdatascience.com/feature-engineering-what-powers-machine-learning-93ab191bcc2d</a:t>
+            </a:r>
+            <a:r>
+              <a:rPr lang="en-US" sz="1800" dirty="0"/>
+              <a:t> </a:t>
+            </a:r>
+          </a:p>
+          <a:p>
+            <a:r>
+              <a:rPr lang="en-US" sz="1800" dirty="0">
+                <a:hlinkClick r:id="rId9"/>
+              </a:rPr>
+              <a:t>https://machinelearningmastery.com/discover-feature-engineering-how-to-engineer-features-and-how-to-get-good-at-it/</a:t>
+            </a:r>
+            <a:r>
+              <a:rPr lang="en-US" sz="1800" dirty="0"/>
+              <a:t> </a:t>
+            </a:r>
+          </a:p>
+          <a:p>
+            <a:r>
+              <a:rPr lang="en-US" sz="1800" dirty="0">
+                <a:hlinkClick r:id="rId10"/>
+              </a:rPr>
+              <a:t>https://developers.google.com/machine-learning/crash-course/representation/feature-engineering</a:t>
+            </a:r>
+            <a:r>
+              <a:rPr lang="en-US" sz="1800" dirty="0"/>
+              <a:t> </a:t>
+            </a:r>
+          </a:p>
+          <a:p>
+            <a:r>
+              <a:rPr lang="en-US" sz="1800" dirty="0"/>
+              <a:t>Feature Engineering for Machine Learning: Principles and Techniques for Data Scientists – Alice Zheng &amp; Amanda </a:t>
+            </a:r>
+            <a:r>
+              <a:rPr lang="en-US" sz="1800" dirty="0" err="1"/>
+              <a:t>Casari</a:t>
+            </a:r>
+            <a:r>
+              <a:rPr lang="en-US" sz="1800" dirty="0"/>
+              <a:t>, O’Reilly, 2018.</a:t>
+            </a:r>
+          </a:p>
+          <a:p>
+            <a:r>
+              <a:rPr lang="en-US" sz="1800" dirty="0"/>
+              <a:t>Feature Engineering Made Easy, Sinan </a:t>
+            </a:r>
+            <a:r>
+              <a:rPr lang="en-US" sz="1800" dirty="0" err="1"/>
+              <a:t>Ozdemir</a:t>
+            </a:r>
+            <a:r>
+              <a:rPr lang="en-US" sz="1800" dirty="0"/>
+              <a:t>, </a:t>
+            </a:r>
+            <a:r>
+              <a:rPr lang="en-US" sz="1800" dirty="0" err="1"/>
+              <a:t>Divya</a:t>
+            </a:r>
+            <a:r>
+              <a:rPr lang="en-US" sz="1800" dirty="0"/>
+              <a:t> </a:t>
+            </a:r>
+            <a:r>
+              <a:rPr lang="en-US" sz="1800" dirty="0" err="1"/>
+              <a:t>Susarla</a:t>
+            </a:r>
+            <a:r>
+              <a:rPr lang="en-US" sz="1800" dirty="0"/>
+              <a:t>, </a:t>
+            </a:r>
+            <a:r>
+              <a:rPr lang="en-US" sz="1800" dirty="0" err="1"/>
+              <a:t>Packt</a:t>
+            </a:r>
+            <a:r>
+              <a:rPr lang="en-US" sz="1800" dirty="0"/>
+              <a:t>, 2018.</a:t>
+            </a:r>
+          </a:p>
+          <a:p>
+            <a:r>
+              <a:rPr lang="en-US" sz="1800" dirty="0"/>
+              <a:t>Feature Extraction: Foundations and Applications, by Isabelle Guyon, Steve Gunn, Masoud </a:t>
+            </a:r>
+            <a:r>
+              <a:rPr lang="en-US" sz="1800" dirty="0" err="1"/>
+              <a:t>Nikravesh</a:t>
+            </a:r>
+            <a:r>
+              <a:rPr lang="en-US" sz="1800" dirty="0"/>
+              <a:t>, </a:t>
+            </a:r>
+            <a:r>
+              <a:rPr lang="en-US" sz="1800" dirty="0" err="1"/>
+              <a:t>Lofti</a:t>
+            </a:r>
+            <a:r>
+              <a:rPr lang="en-US" sz="1800" dirty="0"/>
+              <a:t> A. Zadeh, Springer 2006.</a:t>
+            </a:r>
+          </a:p>
+          <a:p>
+            <a:r>
+              <a:rPr lang="en-US" sz="1800" dirty="0"/>
+              <a:t>Feature Extraction, Construction and Selection: A Data Mining Perspective, Huan Liu, Hiroshi </a:t>
+            </a:r>
+            <a:r>
+              <a:rPr lang="en-US" sz="1800" dirty="0" err="1"/>
+              <a:t>Motoda</a:t>
+            </a:r>
+            <a:r>
+              <a:rPr lang="en-US" sz="1800" dirty="0"/>
+              <a:t>, Springer, 1998.</a:t>
+            </a:r>
+          </a:p>
+          <a:p>
+            <a:endParaRPr lang="en-US" sz="1800" dirty="0"/>
+          </a:p>
+          <a:p>
+            <a:endParaRPr lang="en-US" b="1" dirty="0"/>
+          </a:p>
+          <a:p>
+            <a:endParaRPr lang="en-US" dirty="0"/>
+          </a:p>
+        </p:txBody>
+      </p:sp>
+    </p:spTree>
+    <p:extLst>
+      <p:ext uri="{BB962C8B-B14F-4D97-AF65-F5344CB8AC3E}">
+        <p14:creationId xmlns:p14="http://schemas.microsoft.com/office/powerpoint/2010/main" val="533690633"/>
+      </p:ext>
+    </p:extLst>
+  </p:cSld>
+  <p:clrMapOvr>
+    <a:masterClrMapping/>
+  </p:clrMapOvr>
+</p:sld>
+</file>
+
+<file path=ppt/slides/slide27.xml><?xml version="1.0" encoding="utf-8"?>
+<p:sld xmlns:a="http://schemas.openxmlformats.org/drawingml/2006/main" xmlns:r="http://schemas.openxmlformats.org/officeDocument/2006/relationships" xmlns:p="http://schemas.openxmlformats.org/presentationml/2006/main">
+  <p:cSld>
+    <p:spTree>
+      <p:nvGrpSpPr>
+        <p:cNvPr id="1" name=""/>
+        <p:cNvGrpSpPr/>
+        <p:nvPr/>
+      </p:nvGrpSpPr>
+      <p:grpSpPr>
+        <a:xfrm>
+          <a:off x="0" y="0"/>
+          <a:ext cx="0" cy="0"/>
+          <a:chOff x="0" y="0"/>
+          <a:chExt cx="0" cy="0"/>
+        </a:xfrm>
+      </p:grpSpPr>
+      <p:sp>
+        <p:nvSpPr>
+          <p:cNvPr id="2" name="Title 1">
+            <a:extLst>
+              <a:ext uri="{FF2B5EF4-FFF2-40B4-BE49-F238E27FC236}">
                 <a16:creationId xmlns:a16="http://schemas.microsoft.com/office/drawing/2014/main" id="{24BCF473-821F-E846-841E-C625AFF0FFD5}"/>
               </a:ext>
             </a:extLst>
@@ -7388,7 +7789,7 @@
         </p:spPr>
         <p:txBody>
           <a:bodyPr>
-            <a:normAutofit fontScale="90000"/>
+            <a:normAutofit/>
           </a:bodyPr>
           <a:lstStyle/>
           <a:p>
@@ -7402,7 +7803,7 @@
               <a:t> </a:t>
             </a:r>
             <a:r>
-              <a:rPr lang="en-US" sz="8000" b="1" dirty="0">
+              <a:rPr lang="en-US" sz="8000" b="1">
                 <a:solidFill>
                   <a:srgbClr val="0070C0"/>
                 </a:solidFill>
@@ -7410,35 +7811,18 @@
               <a:t>Questions</a:t>
             </a:r>
             <a:r>
-              <a:rPr lang="en-US" sz="8000" dirty="0">
+              <a:rPr lang="en-US" sz="8000">
                 <a:solidFill>
                   <a:srgbClr val="0070C0"/>
                 </a:solidFill>
               </a:rPr>
               <a:t>?</a:t>
             </a:r>
-            <a:br>
-              <a:rPr lang="en-US" sz="8000" dirty="0">
-                <a:solidFill>
-                  <a:srgbClr val="0070C0"/>
-                </a:solidFill>
-              </a:rPr>
-            </a:br>
-            <a:br>
-              <a:rPr lang="en-US" sz="8000" dirty="0">
-                <a:solidFill>
-                  <a:srgbClr val="0070C0"/>
-                </a:solidFill>
-              </a:rPr>
-            </a:br>
-            <a:r>
-              <a:rPr lang="en-US" sz="8000" dirty="0">
-                <a:solidFill>
-                  <a:srgbClr val="0070C0"/>
-                </a:solidFill>
-              </a:rPr>
-              <a:t>Lets look at the code</a:t>
-            </a:r>
+            <a:endParaRPr lang="en-US" sz="8000" dirty="0">
+              <a:solidFill>
+                <a:srgbClr val="0070C0"/>
+              </a:solidFill>
+            </a:endParaRPr>
           </a:p>
         </p:txBody>
       </p:sp>

</xml_diff>

<commit_message>
Feature engineering presentation complete and datasets related to coding example added
</commit_message>
<xml_diff>
--- a/presentations/Feature_Engineering_ML_SSA19.pptx
+++ b/presentations/Feature_Engineering_ML_SSA19.pptx
@@ -5,7 +5,7 @@
     <p:sldMasterId id="2147483648" r:id="rId1"/>
   </p:sldMasterIdLst>
   <p:notesMasterIdLst>
-    <p:notesMasterId r:id="rId29"/>
+    <p:notesMasterId r:id="rId28"/>
   </p:notesMasterIdLst>
   <p:sldIdLst>
     <p:sldId id="256" r:id="rId2"/>
@@ -28,13 +28,12 @@
     <p:sldId id="276" r:id="rId19"/>
     <p:sldId id="266" r:id="rId20"/>
     <p:sldId id="286" r:id="rId21"/>
-    <p:sldId id="267" r:id="rId22"/>
-    <p:sldId id="271" r:id="rId23"/>
-    <p:sldId id="277" r:id="rId24"/>
-    <p:sldId id="272" r:id="rId25"/>
-    <p:sldId id="285" r:id="rId26"/>
-    <p:sldId id="273" r:id="rId27"/>
-    <p:sldId id="281" r:id="rId28"/>
+    <p:sldId id="271" r:id="rId22"/>
+    <p:sldId id="277" r:id="rId23"/>
+    <p:sldId id="272" r:id="rId24"/>
+    <p:sldId id="285" r:id="rId25"/>
+    <p:sldId id="273" r:id="rId26"/>
+    <p:sldId id="281" r:id="rId27"/>
   </p:sldIdLst>
   <p:sldSz cx="12192000" cy="6858000"/>
   <p:notesSz cx="6858000" cy="9144000"/>
@@ -223,7 +222,7 @@
           <a:p>
             <a:fld id="{FEB909F9-03D2-0440-B8E0-F1611228BF6C}" type="datetimeFigureOut">
               <a:rPr lang="en-US" smtClean="0"/>
-              <a:t>4/20/19</a:t>
+              <a:t>4/21/19</a:t>
             </a:fld>
             <a:endParaRPr lang="en-US"/>
           </a:p>
@@ -855,7 +854,7 @@
           <a:p>
             <a:fld id="{C33EC7A1-935E-D748-85B9-D6F830ED6136}" type="datetimeFigureOut">
               <a:rPr lang="en-US" smtClean="0"/>
-              <a:t>4/20/19</a:t>
+              <a:t>4/21/19</a:t>
             </a:fld>
             <a:endParaRPr lang="en-US"/>
           </a:p>
@@ -1053,7 +1052,7 @@
           <a:p>
             <a:fld id="{C33EC7A1-935E-D748-85B9-D6F830ED6136}" type="datetimeFigureOut">
               <a:rPr lang="en-US" smtClean="0"/>
-              <a:t>4/20/19</a:t>
+              <a:t>4/21/19</a:t>
             </a:fld>
             <a:endParaRPr lang="en-US"/>
           </a:p>
@@ -1261,7 +1260,7 @@
           <a:p>
             <a:fld id="{C33EC7A1-935E-D748-85B9-D6F830ED6136}" type="datetimeFigureOut">
               <a:rPr lang="en-US" smtClean="0"/>
-              <a:t>4/20/19</a:t>
+              <a:t>4/21/19</a:t>
             </a:fld>
             <a:endParaRPr lang="en-US"/>
           </a:p>
@@ -1459,7 +1458,7 @@
           <a:p>
             <a:fld id="{C33EC7A1-935E-D748-85B9-D6F830ED6136}" type="datetimeFigureOut">
               <a:rPr lang="en-US" smtClean="0"/>
-              <a:t>4/20/19</a:t>
+              <a:t>4/21/19</a:t>
             </a:fld>
             <a:endParaRPr lang="en-US"/>
           </a:p>
@@ -1734,7 +1733,7 @@
           <a:p>
             <a:fld id="{C33EC7A1-935E-D748-85B9-D6F830ED6136}" type="datetimeFigureOut">
               <a:rPr lang="en-US" smtClean="0"/>
-              <a:t>4/20/19</a:t>
+              <a:t>4/21/19</a:t>
             </a:fld>
             <a:endParaRPr lang="en-US"/>
           </a:p>
@@ -1999,7 +1998,7 @@
           <a:p>
             <a:fld id="{C33EC7A1-935E-D748-85B9-D6F830ED6136}" type="datetimeFigureOut">
               <a:rPr lang="en-US" smtClean="0"/>
-              <a:t>4/20/19</a:t>
+              <a:t>4/21/19</a:t>
             </a:fld>
             <a:endParaRPr lang="en-US"/>
           </a:p>
@@ -2411,7 +2410,7 @@
           <a:p>
             <a:fld id="{C33EC7A1-935E-D748-85B9-D6F830ED6136}" type="datetimeFigureOut">
               <a:rPr lang="en-US" smtClean="0"/>
-              <a:t>4/20/19</a:t>
+              <a:t>4/21/19</a:t>
             </a:fld>
             <a:endParaRPr lang="en-US"/>
           </a:p>
@@ -2552,7 +2551,7 @@
           <a:p>
             <a:fld id="{C33EC7A1-935E-D748-85B9-D6F830ED6136}" type="datetimeFigureOut">
               <a:rPr lang="en-US" smtClean="0"/>
-              <a:t>4/20/19</a:t>
+              <a:t>4/21/19</a:t>
             </a:fld>
             <a:endParaRPr lang="en-US"/>
           </a:p>
@@ -2665,7 +2664,7 @@
           <a:p>
             <a:fld id="{C33EC7A1-935E-D748-85B9-D6F830ED6136}" type="datetimeFigureOut">
               <a:rPr lang="en-US" smtClean="0"/>
-              <a:t>4/20/19</a:t>
+              <a:t>4/21/19</a:t>
             </a:fld>
             <a:endParaRPr lang="en-US"/>
           </a:p>
@@ -2976,7 +2975,7 @@
           <a:p>
             <a:fld id="{C33EC7A1-935E-D748-85B9-D6F830ED6136}" type="datetimeFigureOut">
               <a:rPr lang="en-US" smtClean="0"/>
-              <a:t>4/20/19</a:t>
+              <a:t>4/21/19</a:t>
             </a:fld>
             <a:endParaRPr lang="en-US"/>
           </a:p>
@@ -3264,7 +3263,7 @@
           <a:p>
             <a:fld id="{C33EC7A1-935E-D748-85B9-D6F830ED6136}" type="datetimeFigureOut">
               <a:rPr lang="en-US" smtClean="0"/>
-              <a:t>4/20/19</a:t>
+              <a:t>4/21/19</a:t>
             </a:fld>
             <a:endParaRPr lang="en-US"/>
           </a:p>
@@ -3505,7 +3504,7 @@
           <a:p>
             <a:fld id="{C33EC7A1-935E-D748-85B9-D6F830ED6136}" type="datetimeFigureOut">
               <a:rPr lang="en-US" smtClean="0"/>
-              <a:t>4/20/19</a:t>
+              <a:t>4/21/19</a:t>
             </a:fld>
             <a:endParaRPr lang="en-US"/>
           </a:p>
@@ -4102,7 +4101,7 @@
           <a:effectLst/>
           <a:extLst>
             <a:ext uri="{909E8E84-426E-40dd-AFC4-6F175D3DCCD1}">
-              <a14:hiddenFill xmlns="" xmlns:a14="http://schemas.microsoft.com/office/drawing/2010/main">
+              <a14:hiddenFill xmlns:a14="http://schemas.microsoft.com/office/drawing/2010/main" xmlns="">
                 <a:solidFill>
                   <a:srgbClr val="FFFFFF"/>
                 </a:solidFill>
@@ -6466,69 +6465,57 @@
         </p:nvSpPr>
         <p:spPr/>
         <p:txBody>
-          <a:bodyPr/>
-          <a:lstStyle/>
-          <a:p>
-            <a:r>
-              <a:rPr lang="en-US" dirty="0"/>
+          <a:bodyPr>
+            <a:normAutofit lnSpcReduction="10000"/>
+          </a:bodyPr>
+          <a:lstStyle/>
+          <a:p>
+            <a:r>
+              <a:rPr lang="en-US" sz="3600" dirty="0"/>
               <a:t>Feature engineering</a:t>
             </a:r>
           </a:p>
           <a:p>
             <a:r>
-              <a:rPr lang="en-US" dirty="0"/>
+              <a:rPr lang="en-US" sz="3600" dirty="0"/>
               <a:t>Feature extraction</a:t>
             </a:r>
           </a:p>
           <a:p>
             <a:r>
-              <a:rPr lang="en-US" dirty="0"/>
+              <a:rPr lang="en-US" sz="3600" dirty="0"/>
               <a:t>Feature selection</a:t>
             </a:r>
           </a:p>
           <a:p>
             <a:pPr lvl="1"/>
             <a:r>
-              <a:rPr lang="en-US" dirty="0"/>
+              <a:rPr lang="en-US" sz="2800" dirty="0"/>
               <a:t>Feature significance testing</a:t>
             </a:r>
           </a:p>
           <a:p>
             <a:pPr lvl="1"/>
             <a:r>
-              <a:rPr lang="en-US" dirty="0"/>
+              <a:rPr lang="en-US" sz="2800" dirty="0"/>
               <a:t>Multiple test procedure</a:t>
             </a:r>
           </a:p>
           <a:p>
             <a:r>
-              <a:rPr lang="en-US" dirty="0"/>
+              <a:rPr lang="en-US" sz="3600" dirty="0"/>
               <a:t>Data formats</a:t>
             </a:r>
           </a:p>
           <a:p>
             <a:r>
-              <a:rPr lang="en-US" dirty="0"/>
-              <a:t>Data transformation – </a:t>
-            </a:r>
-            <a:r>
-              <a:rPr lang="en-US" dirty="0" err="1"/>
-              <a:t>scikit</a:t>
-            </a:r>
-            <a:r>
-              <a:rPr lang="en-US" dirty="0"/>
-              <a:t>-learn Transformers</a:t>
-            </a:r>
-          </a:p>
-          <a:p>
-            <a:r>
-              <a:rPr lang="en-US" dirty="0"/>
+              <a:rPr lang="en-US" sz="3600" dirty="0"/>
               <a:t>Parallelization</a:t>
             </a:r>
           </a:p>
           <a:p>
             <a:r>
-              <a:rPr lang="en-US" dirty="0"/>
+              <a:rPr lang="en-US" sz="3600" dirty="0"/>
               <a:t>Basics of time-series forecasting</a:t>
             </a:r>
           </a:p>
@@ -6901,7 +6888,12 @@
             <p:ph type="title"/>
           </p:nvPr>
         </p:nvSpPr>
-        <p:spPr/>
+        <p:spPr>
+          <a:xfrm>
+            <a:off x="0" y="18256"/>
+            <a:ext cx="10515600" cy="823574"/>
+          </a:xfrm>
+        </p:spPr>
         <p:txBody>
           <a:bodyPr/>
           <a:lstStyle/>
@@ -6920,23 +6912,7 @@
                   <a:srgbClr val="0070C0"/>
                 </a:solidFill>
               </a:rPr>
-              <a:t> – </a:t>
-            </a:r>
-            <a:r>
-              <a:rPr lang="en-US" b="1" dirty="0" err="1">
-                <a:solidFill>
-                  <a:srgbClr val="0070C0"/>
-                </a:solidFill>
-              </a:rPr>
-              <a:t>scikit</a:t>
-            </a:r>
-            <a:r>
-              <a:rPr lang="en-US" b="1" dirty="0">
-                <a:solidFill>
-                  <a:srgbClr val="0070C0"/>
-                </a:solidFill>
-              </a:rPr>
-              <a:t>-learn Transformers</a:t>
+              <a:t> – Parallelization</a:t>
             </a:r>
           </a:p>
         </p:txBody>
@@ -6957,19 +6933,193 @@
             <p:ph idx="1"/>
           </p:nvPr>
         </p:nvSpPr>
-        <p:spPr/>
-        <p:txBody>
-          <a:bodyPr/>
-          <a:lstStyle/>
-          <a:p>
+        <p:spPr>
+          <a:xfrm>
+            <a:off x="170542" y="841829"/>
+            <a:ext cx="12021458" cy="5878285"/>
+          </a:xfrm>
+        </p:spPr>
+        <p:txBody>
+          <a:bodyPr>
+            <a:normAutofit lnSpcReduction="10000"/>
+          </a:bodyPr>
+          <a:lstStyle/>
+          <a:p>
+            <a:r>
+              <a:rPr lang="en-US" dirty="0"/>
+              <a:t>Parallelization is based on </a:t>
+            </a:r>
+            <a:r>
+              <a:rPr lang="en-US" dirty="0" err="1"/>
+              <a:t>multiprocessing.Pool</a:t>
+            </a:r>
             <a:endParaRPr lang="en-US" dirty="0"/>
+          </a:p>
+          <a:p>
+            <a:r>
+              <a:rPr lang="en-US" dirty="0"/>
+              <a:t>For the </a:t>
+            </a:r>
+            <a:r>
+              <a:rPr lang="en-US" b="1" dirty="0"/>
+              <a:t>feature extraction</a:t>
+            </a:r>
+            <a:r>
+              <a:rPr lang="en-US" dirty="0"/>
+              <a:t> and </a:t>
+            </a:r>
+            <a:r>
+              <a:rPr lang="en-US" b="1" i="1" dirty="0"/>
+              <a:t>feature selection</a:t>
+            </a:r>
+            <a:r>
+              <a:rPr lang="en-US" dirty="0"/>
+              <a:t> parallelization parameters include</a:t>
+            </a:r>
+          </a:p>
+          <a:p>
+            <a:pPr lvl="1"/>
+            <a:r>
+              <a:rPr lang="en-US" i="1" dirty="0" err="1"/>
+              <a:t>n_jobs</a:t>
+            </a:r>
+            <a:r>
+              <a:rPr lang="en-US" dirty="0"/>
+              <a:t> and </a:t>
+            </a:r>
+            <a:r>
+              <a:rPr lang="en-US" i="1" dirty="0" err="1"/>
+              <a:t>chunksize</a:t>
+            </a:r>
+            <a:r>
+              <a:rPr lang="en-US" i="1" dirty="0"/>
+              <a:t> </a:t>
+            </a:r>
+            <a:r>
+              <a:rPr lang="en-US" dirty="0"/>
+              <a:t>in</a:t>
+            </a:r>
+            <a:r>
+              <a:rPr lang="en-US" i="1" dirty="0"/>
+              <a:t> </a:t>
+            </a:r>
+            <a:r>
+              <a:rPr lang="en-US" i="1" dirty="0" err="1"/>
+              <a:t>extract_features</a:t>
+            </a:r>
+            <a:r>
+              <a:rPr lang="en-US" i="1" dirty="0"/>
+              <a:t> </a:t>
+            </a:r>
+            <a:r>
+              <a:rPr lang="en-US" dirty="0"/>
+              <a:t>and </a:t>
+            </a:r>
+            <a:r>
+              <a:rPr lang="en-US" i="1" dirty="0" err="1"/>
+              <a:t>select_features</a:t>
+            </a:r>
+            <a:endParaRPr lang="en-US" i="1" dirty="0"/>
+          </a:p>
+          <a:p>
+            <a:pPr lvl="1"/>
+            <a:r>
+              <a:rPr lang="en-US" i="1" dirty="0" err="1"/>
+              <a:t>n_jobs</a:t>
+            </a:r>
+            <a:r>
+              <a:rPr lang="en-US" i="1" dirty="0"/>
+              <a:t> </a:t>
+            </a:r>
+            <a:r>
+              <a:rPr lang="en-US" dirty="0"/>
+              <a:t>corresponds to number of processors on the current system</a:t>
+            </a:r>
+            <a:endParaRPr lang="en-US" i="1" dirty="0"/>
+          </a:p>
+          <a:p>
+            <a:r>
+              <a:rPr lang="en-US" dirty="0"/>
+              <a:t>On instantiation we set the Pool’s number of worker processes to </a:t>
+            </a:r>
+            <a:r>
+              <a:rPr lang="en-US" i="1" dirty="0" err="1"/>
+              <a:t>n_jobs</a:t>
+            </a:r>
+            <a:endParaRPr lang="en-US" i="1" dirty="0"/>
+          </a:p>
+          <a:p>
+            <a:r>
+              <a:rPr lang="en-US" dirty="0"/>
+              <a:t>Recommend setting it to the maximum number of available (and otherwise idle) processors</a:t>
+            </a:r>
+          </a:p>
+          <a:p>
+            <a:r>
+              <a:rPr lang="en-US" i="1" dirty="0" err="1"/>
+              <a:t>chunksize</a:t>
+            </a:r>
+            <a:r>
+              <a:rPr lang="en-US" dirty="0"/>
+              <a:t> is the number of chunks that are submitted as one task to one worker process</a:t>
+            </a:r>
+          </a:p>
+          <a:p>
+            <a:r>
+              <a:rPr lang="en-US" dirty="0" err="1"/>
+              <a:t>E.g</a:t>
+            </a:r>
+            <a:r>
+              <a:rPr lang="en-US" dirty="0"/>
+              <a:t>, if you set the </a:t>
+            </a:r>
+            <a:r>
+              <a:rPr lang="en-US" dirty="0" err="1"/>
+              <a:t>chunksize</a:t>
+            </a:r>
+            <a:r>
+              <a:rPr lang="en-US" dirty="0"/>
+              <a:t> to 10, then it means that one worker task corresponds to calculate all features for 10 id/kind time series combinations</a:t>
+            </a:r>
+          </a:p>
+          <a:p>
+            <a:r>
+              <a:rPr lang="en-US" dirty="0"/>
+              <a:t>To do performance studies and profiling, turn off parallelization. </a:t>
+            </a:r>
+          </a:p>
+          <a:p>
+            <a:r>
+              <a:rPr lang="en-US" dirty="0"/>
+              <a:t>This can be setting the parameter </a:t>
+            </a:r>
+            <a:r>
+              <a:rPr lang="en-US" i="1" dirty="0" err="1"/>
+              <a:t>n_jobs</a:t>
+            </a:r>
+            <a:r>
+              <a:rPr lang="en-US" dirty="0"/>
+              <a:t> to 0 and </a:t>
+            </a:r>
+            <a:r>
+              <a:rPr lang="en-US" i="1" dirty="0" err="1"/>
+              <a:t>chunksize</a:t>
+            </a:r>
+            <a:r>
+              <a:rPr lang="en-US" i="1" dirty="0"/>
+              <a:t> = None</a:t>
+            </a:r>
+            <a:r>
+              <a:rPr lang="en-US" dirty="0"/>
+              <a:t>.</a:t>
+            </a:r>
           </a:p>
         </p:txBody>
       </p:sp>
     </p:spTree>
     <p:extLst>
       <p:ext uri="{BB962C8B-B14F-4D97-AF65-F5344CB8AC3E}">
-        <p14:creationId xmlns:p14="http://schemas.microsoft.com/office/powerpoint/2010/main" val="636674178"/>
+        <p14:creationId xmlns:p14="http://schemas.microsoft.com/office/powerpoint/2010/main" val="1004027388"/>
       </p:ext>
     </p:extLst>
   </p:cSld>
@@ -7031,40 +7181,75 @@
                   <a:srgbClr val="0070C0"/>
                 </a:solidFill>
               </a:rPr>
-              <a:t> – Parallelization</a:t>
-            </a:r>
-          </a:p>
-        </p:txBody>
-      </p:sp>
-      <p:sp>
-        <p:nvSpPr>
-          <p:cNvPr id="3" name="Content Placeholder 2">
-            <a:extLst>
-              <a:ext uri="{FF2B5EF4-FFF2-40B4-BE49-F238E27FC236}">
-                <a16:creationId xmlns:a16="http://schemas.microsoft.com/office/drawing/2014/main" id="{F21F1551-71FB-9546-80F4-DFF7DA1697AE}"/>
-              </a:ext>
-            </a:extLst>
-          </p:cNvPr>
-          <p:cNvSpPr>
-            <a:spLocks noGrp="1"/>
-          </p:cNvSpPr>
-          <p:nvPr>
-            <p:ph idx="1"/>
-          </p:nvPr>
-        </p:nvSpPr>
-        <p:spPr/>
-        <p:txBody>
-          <a:bodyPr/>
-          <a:lstStyle/>
-          <a:p>
-            <a:endParaRPr lang="en-US" dirty="0"/>
-          </a:p>
-        </p:txBody>
-      </p:sp>
+              <a:t> – Basics of time-series forecasting</a:t>
+            </a:r>
+          </a:p>
+        </p:txBody>
+      </p:sp>
+      <p:pic>
+        <p:nvPicPr>
+          <p:cNvPr id="5" name="Picture 4">
+            <a:extLst>
+              <a:ext uri="{FF2B5EF4-FFF2-40B4-BE49-F238E27FC236}">
+                <a16:creationId xmlns:a16="http://schemas.microsoft.com/office/drawing/2014/main" id="{9BA78188-4485-E646-BC43-AA77CC77C682}"/>
+              </a:ext>
+            </a:extLst>
+          </p:cNvPr>
+          <p:cNvPicPr>
+            <a:picLocks noChangeAspect="1"/>
+          </p:cNvPicPr>
+          <p:nvPr/>
+        </p:nvPicPr>
+        <p:blipFill>
+          <a:blip r:embed="rId2"/>
+          <a:stretch>
+            <a:fillRect/>
+          </a:stretch>
+        </p:blipFill>
+        <p:spPr>
+          <a:xfrm>
+            <a:off x="151130" y="1588135"/>
+            <a:ext cx="4753610" cy="4219246"/>
+          </a:xfrm>
+          <a:prstGeom prst="rect">
+            <a:avLst/>
+          </a:prstGeom>
+        </p:spPr>
+      </p:pic>
+      <p:pic>
+        <p:nvPicPr>
+          <p:cNvPr id="7" name="Picture 6">
+            <a:extLst>
+              <a:ext uri="{FF2B5EF4-FFF2-40B4-BE49-F238E27FC236}">
+                <a16:creationId xmlns:a16="http://schemas.microsoft.com/office/drawing/2014/main" id="{FBEAE5E4-59B5-9742-95AD-154B2319BA8B}"/>
+              </a:ext>
+            </a:extLst>
+          </p:cNvPr>
+          <p:cNvPicPr>
+            <a:picLocks noChangeAspect="1"/>
+          </p:cNvPicPr>
+          <p:nvPr/>
+        </p:nvPicPr>
+        <p:blipFill>
+          <a:blip r:embed="rId3"/>
+          <a:stretch>
+            <a:fillRect/>
+          </a:stretch>
+        </p:blipFill>
+        <p:spPr>
+          <a:xfrm>
+            <a:off x="5390346" y="1588135"/>
+            <a:ext cx="6650524" cy="3700145"/>
+          </a:xfrm>
+          <a:prstGeom prst="rect">
+            <a:avLst/>
+          </a:prstGeom>
+        </p:spPr>
+      </p:pic>
     </p:spTree>
     <p:extLst>
       <p:ext uri="{BB962C8B-B14F-4D97-AF65-F5344CB8AC3E}">
-        <p14:creationId xmlns:p14="http://schemas.microsoft.com/office/powerpoint/2010/main" val="1004027388"/>
+        <p14:creationId xmlns:p14="http://schemas.microsoft.com/office/powerpoint/2010/main" val="1253139236"/>
       </p:ext>
     </p:extLst>
   </p:cSld>
@@ -7107,7 +7292,12 @@
             <p:ph type="title"/>
           </p:nvPr>
         </p:nvSpPr>
-        <p:spPr/>
+        <p:spPr>
+          <a:xfrm>
+            <a:off x="254000" y="555285"/>
+            <a:ext cx="10515600" cy="714716"/>
+          </a:xfrm>
+        </p:spPr>
         <p:txBody>
           <a:bodyPr/>
           <a:lstStyle/>
@@ -7126,75 +7316,130 @@
                   <a:srgbClr val="0070C0"/>
                 </a:solidFill>
               </a:rPr>
-              <a:t> – Basics of time-series forecasting</a:t>
-            </a:r>
-          </a:p>
-        </p:txBody>
-      </p:sp>
-      <p:pic>
-        <p:nvPicPr>
-          <p:cNvPr id="5" name="Picture 4">
-            <a:extLst>
-              <a:ext uri="{FF2B5EF4-FFF2-40B4-BE49-F238E27FC236}">
-                <a16:creationId xmlns:a16="http://schemas.microsoft.com/office/drawing/2014/main" id="{9BA78188-4485-E646-BC43-AA77CC77C682}"/>
-              </a:ext>
-            </a:extLst>
-          </p:cNvPr>
-          <p:cNvPicPr>
-            <a:picLocks noChangeAspect="1"/>
-          </p:cNvPicPr>
-          <p:nvPr/>
-        </p:nvPicPr>
-        <p:blipFill>
-          <a:blip r:embed="rId2"/>
-          <a:stretch>
-            <a:fillRect/>
-          </a:stretch>
-        </p:blipFill>
+              <a:t> – Summary of time-series forecasting</a:t>
+            </a:r>
+          </a:p>
+        </p:txBody>
+      </p:sp>
+      <p:sp>
+        <p:nvSpPr>
+          <p:cNvPr id="3" name="Content Placeholder 2">
+            <a:extLst>
+              <a:ext uri="{FF2B5EF4-FFF2-40B4-BE49-F238E27FC236}">
+                <a16:creationId xmlns:a16="http://schemas.microsoft.com/office/drawing/2014/main" id="{F21F1551-71FB-9546-80F4-DFF7DA1697AE}"/>
+              </a:ext>
+            </a:extLst>
+          </p:cNvPr>
+          <p:cNvSpPr>
+            <a:spLocks noGrp="1"/>
+          </p:cNvSpPr>
+          <p:nvPr>
+            <p:ph idx="1"/>
+          </p:nvPr>
+        </p:nvSpPr>
         <p:spPr>
           <a:xfrm>
-            <a:off x="151130" y="1588135"/>
-            <a:ext cx="4753610" cy="4219246"/>
-          </a:xfrm>
-          <a:prstGeom prst="rect">
-            <a:avLst/>
-          </a:prstGeom>
+            <a:off x="114299" y="1618342"/>
+            <a:ext cx="11963401" cy="4245429"/>
+          </a:xfrm>
         </p:spPr>
-      </p:pic>
-      <p:pic>
-        <p:nvPicPr>
-          <p:cNvPr id="7" name="Picture 6">
-            <a:extLst>
-              <a:ext uri="{FF2B5EF4-FFF2-40B4-BE49-F238E27FC236}">
-                <a16:creationId xmlns:a16="http://schemas.microsoft.com/office/drawing/2014/main" id="{FBEAE5E4-59B5-9742-95AD-154B2319BA8B}"/>
-              </a:ext>
-            </a:extLst>
-          </p:cNvPr>
-          <p:cNvPicPr>
-            <a:picLocks noChangeAspect="1"/>
-          </p:cNvPicPr>
-          <p:nvPr/>
-        </p:nvPicPr>
-        <p:blipFill>
-          <a:blip r:embed="rId3"/>
-          <a:stretch>
-            <a:fillRect/>
-          </a:stretch>
-        </p:blipFill>
-        <p:spPr>
-          <a:xfrm>
-            <a:off x="5390346" y="1588135"/>
-            <a:ext cx="6650524" cy="3700145"/>
-          </a:xfrm>
-          <a:prstGeom prst="rect">
-            <a:avLst/>
-          </a:prstGeom>
-        </p:spPr>
-      </p:pic>
+        <p:txBody>
+          <a:bodyPr/>
+          <a:lstStyle/>
+          <a:p>
+            <a:r>
+              <a:rPr lang="en-US" dirty="0"/>
+              <a:t>Features are calculated by </a:t>
+            </a:r>
+            <a:r>
+              <a:rPr lang="en-US" i="1" dirty="0"/>
+              <a:t>rolling</a:t>
+            </a:r>
+            <a:r>
+              <a:rPr lang="en-US" dirty="0"/>
+              <a:t> over the data</a:t>
+            </a:r>
+          </a:p>
+          <a:p>
+            <a:r>
+              <a:rPr lang="en-US" dirty="0"/>
+              <a:t>A rolling mechanism will give you the sub time series to construct the features.</a:t>
+            </a:r>
+          </a:p>
+          <a:p>
+            <a:r>
+              <a:rPr lang="en-US" dirty="0"/>
+              <a:t>So, we move the time-series window that extract the features and then predict the next time step (which was not used to extract features) forward</a:t>
+            </a:r>
+          </a:p>
+          <a:p>
+            <a:r>
+              <a:rPr lang="en-US" dirty="0"/>
+              <a:t>Both </a:t>
+            </a:r>
+            <a:r>
+              <a:rPr lang="en-US" dirty="0" err="1"/>
+              <a:t>tsfresh</a:t>
+            </a:r>
+            <a:r>
+              <a:rPr lang="en-US" dirty="0"/>
+              <a:t> and pandas provide methods for rolling mechanisms</a:t>
+            </a:r>
+          </a:p>
+          <a:p>
+            <a:pPr lvl="1"/>
+            <a:r>
+              <a:rPr lang="en-US" dirty="0" err="1"/>
+              <a:t>tsfresh.utilities.dataframe_functions.roll_time_series</a:t>
+            </a:r>
+            <a:endParaRPr lang="en-US" dirty="0">
+              <a:hlinkClick r:id="rId2"/>
+            </a:endParaRPr>
+          </a:p>
+          <a:p>
+            <a:pPr lvl="2"/>
+            <a:r>
+              <a:rPr lang="en-US" dirty="0">
+                <a:hlinkClick r:id="rId2"/>
+              </a:rPr>
+              <a:t>https://tsfresh.readthedocs.io/en/latest/api/tsfresh.utilities.html#tsfresh.utilities.dataframe_functions.roll_time_series</a:t>
+            </a:r>
+            <a:r>
+              <a:rPr lang="en-US" dirty="0"/>
+              <a:t> </a:t>
+            </a:r>
+          </a:p>
+          <a:p>
+            <a:pPr lvl="1"/>
+            <a:r>
+              <a:rPr lang="en-US" dirty="0" err="1"/>
+              <a:t>DataFrame.rolling</a:t>
+            </a:r>
+            <a:endParaRPr lang="en-US" dirty="0"/>
+          </a:p>
+          <a:p>
+            <a:pPr lvl="2"/>
+            <a:r>
+              <a:rPr lang="en-US" dirty="0">
+                <a:hlinkClick r:id="rId3"/>
+              </a:rPr>
+              <a:t>https://pandas.pydata.org/pandas-docs/stable/reference/api/pandas.DataFrame.rolling.html</a:t>
+            </a:r>
+            <a:r>
+              <a:rPr lang="en-US" dirty="0"/>
+              <a:t> </a:t>
+            </a:r>
+          </a:p>
+          <a:p>
+            <a:pPr lvl="1"/>
+            <a:endParaRPr lang="en-US" dirty="0"/>
+          </a:p>
+        </p:txBody>
+      </p:sp>
     </p:spTree>
     <p:extLst>
       <p:ext uri="{BB962C8B-B14F-4D97-AF65-F5344CB8AC3E}">
-        <p14:creationId xmlns:p14="http://schemas.microsoft.com/office/powerpoint/2010/main" val="1253139236"/>
+        <p14:creationId xmlns:p14="http://schemas.microsoft.com/office/powerpoint/2010/main" val="3972214536"/>
       </p:ext>
     </p:extLst>
   </p:cSld>
@@ -7243,20 +7488,12 @@
           <a:lstStyle/>
           <a:p>
             <a:r>
-              <a:rPr lang="en-US" b="1" dirty="0" err="1">
-                <a:solidFill>
-                  <a:srgbClr val="0070C0"/>
-                </a:solidFill>
-              </a:rPr>
-              <a:t>tsfresh</a:t>
-            </a:r>
-            <a:r>
               <a:rPr lang="en-US" b="1" dirty="0">
                 <a:solidFill>
                   <a:srgbClr val="0070C0"/>
                 </a:solidFill>
               </a:rPr>
-              <a:t> – Summary of time-series forecasting</a:t>
+              <a:t>Conclusions – Things to remember</a:t>
             </a:r>
           </a:p>
         </p:txBody>
@@ -7279,8 +7516,70 @@
         </p:nvSpPr>
         <p:spPr/>
         <p:txBody>
-          <a:bodyPr/>
-          <a:lstStyle/>
+          <a:bodyPr>
+            <a:normAutofit/>
+          </a:bodyPr>
+          <a:lstStyle/>
+          <a:p>
+            <a:r>
+              <a:rPr lang="en-US" dirty="0"/>
+              <a:t>Feature scaling is done to Normalize data so that priority is not given to a particular feature. </a:t>
+            </a:r>
+          </a:p>
+          <a:p>
+            <a:pPr lvl="1"/>
+            <a:r>
+              <a:rPr lang="en-US" dirty="0">
+                <a:hlinkClick r:id="rId2"/>
+              </a:rPr>
+              <a:t>https://scikit-learn.org/stable/modules/preprocessing.html</a:t>
+            </a:r>
+            <a:r>
+              <a:rPr lang="en-US" dirty="0"/>
+              <a:t> </a:t>
+            </a:r>
+          </a:p>
+          <a:p>
+            <a:r>
+              <a:rPr lang="en-US" dirty="0"/>
+              <a:t>Role of scaling is mostly important in algorithms that are distance based (</a:t>
+            </a:r>
+            <a:r>
+              <a:rPr lang="en-US" dirty="0" err="1"/>
+              <a:t>e.g</a:t>
+            </a:r>
+            <a:r>
+              <a:rPr lang="en-US" dirty="0"/>
+              <a:t>, Euclidean metric).</a:t>
+            </a:r>
+          </a:p>
+          <a:p>
+            <a:pPr lvl="1"/>
+            <a:r>
+              <a:rPr lang="en-US" dirty="0"/>
+              <a:t>E.g., k-means clustering, Support Vector Machines, etc.</a:t>
+            </a:r>
+          </a:p>
+          <a:p>
+            <a:r>
+              <a:rPr lang="en-US" dirty="0"/>
+              <a:t>ASIDE -- Random Forest (RF) is a tree-based model and hence </a:t>
+            </a:r>
+            <a:r>
+              <a:rPr lang="en-US" b="1" dirty="0"/>
+              <a:t>does not require</a:t>
+            </a:r>
+            <a:r>
+              <a:rPr lang="en-US" dirty="0"/>
+              <a:t> feature scaling.</a:t>
+            </a:r>
+          </a:p>
+          <a:p>
+            <a:r>
+              <a:rPr lang="en-US" dirty="0"/>
+              <a:t>RF algorithm is based on partitioning, even if you apply Normalization then also the result would be the same.</a:t>
+            </a:r>
+          </a:p>
           <a:p>
             <a:endParaRPr lang="en-US" dirty="0"/>
           </a:p>
@@ -7289,7 +7588,7 @@
     </p:spTree>
     <p:extLst>
       <p:ext uri="{BB962C8B-B14F-4D97-AF65-F5344CB8AC3E}">
-        <p14:creationId xmlns:p14="http://schemas.microsoft.com/office/powerpoint/2010/main" val="3972214536"/>
+        <p14:creationId xmlns:p14="http://schemas.microsoft.com/office/powerpoint/2010/main" val="4235018102"/>
       </p:ext>
     </p:extLst>
   </p:cSld>
@@ -7332,155 +7631,6 @@
             <p:ph type="title"/>
           </p:nvPr>
         </p:nvSpPr>
-        <p:spPr/>
-        <p:txBody>
-          <a:bodyPr/>
-          <a:lstStyle/>
-          <a:p>
-            <a:r>
-              <a:rPr lang="en-US" b="1" dirty="0">
-                <a:solidFill>
-                  <a:srgbClr val="0070C0"/>
-                </a:solidFill>
-              </a:rPr>
-              <a:t>Conclusions – Things to remember</a:t>
-            </a:r>
-          </a:p>
-        </p:txBody>
-      </p:sp>
-      <p:sp>
-        <p:nvSpPr>
-          <p:cNvPr id="3" name="Content Placeholder 2">
-            <a:extLst>
-              <a:ext uri="{FF2B5EF4-FFF2-40B4-BE49-F238E27FC236}">
-                <a16:creationId xmlns:a16="http://schemas.microsoft.com/office/drawing/2014/main" id="{F21F1551-71FB-9546-80F4-DFF7DA1697AE}"/>
-              </a:ext>
-            </a:extLst>
-          </p:cNvPr>
-          <p:cNvSpPr>
-            <a:spLocks noGrp="1"/>
-          </p:cNvSpPr>
-          <p:nvPr>
-            <p:ph idx="1"/>
-          </p:nvPr>
-        </p:nvSpPr>
-        <p:spPr/>
-        <p:txBody>
-          <a:bodyPr>
-            <a:normAutofit/>
-          </a:bodyPr>
-          <a:lstStyle/>
-          <a:p>
-            <a:r>
-              <a:rPr lang="en-US" dirty="0"/>
-              <a:t>Feature scaling is done to Normalize data so that priority is not given to a particular feature. </a:t>
-            </a:r>
-          </a:p>
-          <a:p>
-            <a:pPr lvl="1"/>
-            <a:r>
-              <a:rPr lang="en-US" dirty="0">
-                <a:hlinkClick r:id="rId2"/>
-              </a:rPr>
-              <a:t>https://scikit-learn.org/stable/modules/preprocessing.html</a:t>
-            </a:r>
-            <a:r>
-              <a:rPr lang="en-US" dirty="0"/>
-              <a:t> </a:t>
-            </a:r>
-          </a:p>
-          <a:p>
-            <a:r>
-              <a:rPr lang="en-US" dirty="0"/>
-              <a:t>Role of scaling is mostly important in algorithms that are distance based (</a:t>
-            </a:r>
-            <a:r>
-              <a:rPr lang="en-US" dirty="0" err="1"/>
-              <a:t>e.g</a:t>
-            </a:r>
-            <a:r>
-              <a:rPr lang="en-US" dirty="0"/>
-              <a:t>, Euclidean metric).</a:t>
-            </a:r>
-          </a:p>
-          <a:p>
-            <a:pPr lvl="1"/>
-            <a:r>
-              <a:rPr lang="en-US" dirty="0"/>
-              <a:t>E.g., k-means clustering, Support Vector Machines, etc.</a:t>
-            </a:r>
-          </a:p>
-          <a:p>
-            <a:r>
-              <a:rPr lang="en-US" dirty="0"/>
-              <a:t>ASIDE -- Random Forest (RF) is a tree-based model and hence </a:t>
-            </a:r>
-            <a:r>
-              <a:rPr lang="en-US" b="1" dirty="0"/>
-              <a:t>does not require</a:t>
-            </a:r>
-            <a:r>
-              <a:rPr lang="en-US" dirty="0"/>
-              <a:t> feature scaling.</a:t>
-            </a:r>
-          </a:p>
-          <a:p>
-            <a:r>
-              <a:rPr lang="en-US" dirty="0"/>
-              <a:t>RF algorithm is based on partitioning, even if you apply Normalization then also the result would be the same.</a:t>
-            </a:r>
-          </a:p>
-          <a:p>
-            <a:endParaRPr lang="en-US" dirty="0"/>
-          </a:p>
-        </p:txBody>
-      </p:sp>
-    </p:spTree>
-    <p:extLst>
-      <p:ext uri="{BB962C8B-B14F-4D97-AF65-F5344CB8AC3E}">
-        <p14:creationId xmlns:p14="http://schemas.microsoft.com/office/powerpoint/2010/main" val="4235018102"/>
-      </p:ext>
-    </p:extLst>
-  </p:cSld>
-  <p:clrMapOvr>
-    <a:masterClrMapping/>
-  </p:clrMapOvr>
-</p:sld>
-</file>
-
-<file path=ppt/slides/slide26.xml><?xml version="1.0" encoding="utf-8"?>
-<p:sld xmlns:a="http://schemas.openxmlformats.org/drawingml/2006/main" xmlns:r="http://schemas.openxmlformats.org/officeDocument/2006/relationships" xmlns:p="http://schemas.openxmlformats.org/presentationml/2006/main">
-  <p:cSld>
-    <p:spTree>
-      <p:nvGrpSpPr>
-        <p:cNvPr id="1" name=""/>
-        <p:cNvGrpSpPr/>
-        <p:nvPr/>
-      </p:nvGrpSpPr>
-      <p:grpSpPr>
-        <a:xfrm>
-          <a:off x="0" y="0"/>
-          <a:ext cx="0" cy="0"/>
-          <a:chOff x="0" y="0"/>
-          <a:chExt cx="0" cy="0"/>
-        </a:xfrm>
-      </p:grpSpPr>
-      <p:sp>
-        <p:nvSpPr>
-          <p:cNvPr id="2" name="Title 1">
-            <a:extLst>
-              <a:ext uri="{FF2B5EF4-FFF2-40B4-BE49-F238E27FC236}">
-                <a16:creationId xmlns:a16="http://schemas.microsoft.com/office/drawing/2014/main" id="{01560502-1667-5140-AF58-5D0A5B061D91}"/>
-              </a:ext>
-            </a:extLst>
-          </p:cNvPr>
-          <p:cNvSpPr>
-            <a:spLocks noGrp="1"/>
-          </p:cNvSpPr>
-          <p:nvPr>
-            <p:ph type="title"/>
-          </p:nvPr>
-        </p:nvSpPr>
         <p:spPr>
           <a:xfrm>
             <a:off x="0" y="0"/>
@@ -7748,7 +7898,7 @@
 </p:sld>
 </file>
 
-<file path=ppt/slides/slide27.xml><?xml version="1.0" encoding="utf-8"?>
+<file path=ppt/slides/slide26.xml><?xml version="1.0" encoding="utf-8"?>
 <p:sld xmlns:a="http://schemas.openxmlformats.org/drawingml/2006/main" xmlns:r="http://schemas.openxmlformats.org/officeDocument/2006/relationships" xmlns:p="http://schemas.openxmlformats.org/presentationml/2006/main">
   <p:cSld>
     <p:spTree>

</xml_diff>

<commit_message>
Minor update ftrs engg
</commit_message>
<xml_diff>
--- a/presentations/Feature_Engineering_ML_SSA19.pptx
+++ b/presentations/Feature_Engineering_ML_SSA19.pptx
@@ -222,7 +222,7 @@
           <a:p>
             <a:fld id="{FEB909F9-03D2-0440-B8E0-F1611228BF6C}" type="datetimeFigureOut">
               <a:rPr lang="en-US" smtClean="0"/>
-              <a:t>4/22/19</a:t>
+              <a:t>4/23/19</a:t>
             </a:fld>
             <a:endParaRPr lang="en-US"/>
           </a:p>
@@ -854,7 +854,7 @@
           <a:p>
             <a:fld id="{C33EC7A1-935E-D748-85B9-D6F830ED6136}" type="datetimeFigureOut">
               <a:rPr lang="en-US" smtClean="0"/>
-              <a:t>4/22/19</a:t>
+              <a:t>4/23/19</a:t>
             </a:fld>
             <a:endParaRPr lang="en-US"/>
           </a:p>
@@ -1052,7 +1052,7 @@
           <a:p>
             <a:fld id="{C33EC7A1-935E-D748-85B9-D6F830ED6136}" type="datetimeFigureOut">
               <a:rPr lang="en-US" smtClean="0"/>
-              <a:t>4/22/19</a:t>
+              <a:t>4/23/19</a:t>
             </a:fld>
             <a:endParaRPr lang="en-US"/>
           </a:p>
@@ -1260,7 +1260,7 @@
           <a:p>
             <a:fld id="{C33EC7A1-935E-D748-85B9-D6F830ED6136}" type="datetimeFigureOut">
               <a:rPr lang="en-US" smtClean="0"/>
-              <a:t>4/22/19</a:t>
+              <a:t>4/23/19</a:t>
             </a:fld>
             <a:endParaRPr lang="en-US"/>
           </a:p>
@@ -1458,7 +1458,7 @@
           <a:p>
             <a:fld id="{C33EC7A1-935E-D748-85B9-D6F830ED6136}" type="datetimeFigureOut">
               <a:rPr lang="en-US" smtClean="0"/>
-              <a:t>4/22/19</a:t>
+              <a:t>4/23/19</a:t>
             </a:fld>
             <a:endParaRPr lang="en-US"/>
           </a:p>
@@ -1733,7 +1733,7 @@
           <a:p>
             <a:fld id="{C33EC7A1-935E-D748-85B9-D6F830ED6136}" type="datetimeFigureOut">
               <a:rPr lang="en-US" smtClean="0"/>
-              <a:t>4/22/19</a:t>
+              <a:t>4/23/19</a:t>
             </a:fld>
             <a:endParaRPr lang="en-US"/>
           </a:p>
@@ -1998,7 +1998,7 @@
           <a:p>
             <a:fld id="{C33EC7A1-935E-D748-85B9-D6F830ED6136}" type="datetimeFigureOut">
               <a:rPr lang="en-US" smtClean="0"/>
-              <a:t>4/22/19</a:t>
+              <a:t>4/23/19</a:t>
             </a:fld>
             <a:endParaRPr lang="en-US"/>
           </a:p>
@@ -2410,7 +2410,7 @@
           <a:p>
             <a:fld id="{C33EC7A1-935E-D748-85B9-D6F830ED6136}" type="datetimeFigureOut">
               <a:rPr lang="en-US" smtClean="0"/>
-              <a:t>4/22/19</a:t>
+              <a:t>4/23/19</a:t>
             </a:fld>
             <a:endParaRPr lang="en-US"/>
           </a:p>
@@ -2551,7 +2551,7 @@
           <a:p>
             <a:fld id="{C33EC7A1-935E-D748-85B9-D6F830ED6136}" type="datetimeFigureOut">
               <a:rPr lang="en-US" smtClean="0"/>
-              <a:t>4/22/19</a:t>
+              <a:t>4/23/19</a:t>
             </a:fld>
             <a:endParaRPr lang="en-US"/>
           </a:p>
@@ -2664,7 +2664,7 @@
           <a:p>
             <a:fld id="{C33EC7A1-935E-D748-85B9-D6F830ED6136}" type="datetimeFigureOut">
               <a:rPr lang="en-US" smtClean="0"/>
-              <a:t>4/22/19</a:t>
+              <a:t>4/23/19</a:t>
             </a:fld>
             <a:endParaRPr lang="en-US"/>
           </a:p>
@@ -2975,7 +2975,7 @@
           <a:p>
             <a:fld id="{C33EC7A1-935E-D748-85B9-D6F830ED6136}" type="datetimeFigureOut">
               <a:rPr lang="en-US" smtClean="0"/>
-              <a:t>4/22/19</a:t>
+              <a:t>4/23/19</a:t>
             </a:fld>
             <a:endParaRPr lang="en-US"/>
           </a:p>
@@ -3263,7 +3263,7 @@
           <a:p>
             <a:fld id="{C33EC7A1-935E-D748-85B9-D6F830ED6136}" type="datetimeFigureOut">
               <a:rPr lang="en-US" smtClean="0"/>
-              <a:t>4/22/19</a:t>
+              <a:t>4/23/19</a:t>
             </a:fld>
             <a:endParaRPr lang="en-US"/>
           </a:p>
@@ -3504,7 +3504,7 @@
           <a:p>
             <a:fld id="{C33EC7A1-935E-D748-85B9-D6F830ED6136}" type="datetimeFigureOut">
               <a:rPr lang="en-US" smtClean="0"/>
-              <a:t>4/22/19</a:t>
+              <a:t>4/23/19</a:t>
             </a:fld>
             <a:endParaRPr lang="en-US"/>
           </a:p>
@@ -4014,7 +4014,7 @@
         </p:spPr>
         <p:txBody>
           <a:bodyPr>
-            <a:normAutofit fontScale="92500" lnSpcReduction="10000"/>
+            <a:normAutofit fontScale="85000" lnSpcReduction="20000"/>
           </a:bodyPr>
           <a:lstStyle/>
           <a:p>
@@ -4058,11 +4058,23 @@
           <a:p>
             <a:r>
               <a:rPr lang="en-US" dirty="0"/>
-              <a:t>Date: April-23-2019, SSA </a:t>
+              <a:t>Date: April-23-2019, SSA ML Workshop, LA-UR-19-23588.</a:t>
+            </a:r>
+          </a:p>
+          <a:p>
+            <a:r>
+              <a:rPr lang="en-US" dirty="0"/>
+              <a:t>Email: </a:t>
+            </a:r>
+            <a:r>
+              <a:rPr lang="en-US" dirty="0">
+                <a:hlinkClick r:id="rId2"/>
+              </a:rPr>
+              <a:t>maruti@lanl.gov</a:t>
             </a:r>
             <a:r>
               <a:rPr lang="en-US"/>
-              <a:t>ML Workshop, LA-UR-19-23588.</a:t>
+              <a:t> </a:t>
             </a:r>
             <a:endParaRPr lang="en-US" dirty="0"/>
           </a:p>
@@ -4086,7 +4098,7 @@
           <p:nvPr/>
         </p:nvPicPr>
         <p:blipFill>
-          <a:blip r:embed="rId2">
+          <a:blip r:embed="rId3">
             <a:extLst>
               <a:ext uri="{28A0092B-C50C-407E-A947-70E740481C1C}">
                 <a14:useLocalDpi xmlns:a14="http://schemas.microsoft.com/office/drawing/2010/main" val="0"/>
@@ -4109,7 +4121,7 @@
           <a:effectLst/>
           <a:extLst>
             <a:ext uri="{909E8E84-426E-40dd-AFC4-6F175D3DCCD1}">
-              <a14:hiddenFill xmlns="" xmlns:a14="http://schemas.microsoft.com/office/drawing/2010/main">
+              <a14:hiddenFill xmlns:a14="http://schemas.microsoft.com/office/drawing/2010/main" xmlns="">
                 <a:solidFill>
                   <a:srgbClr val="FFFFFF"/>
                 </a:solidFill>
@@ -4133,7 +4145,7 @@
           <p:nvPr/>
         </p:nvPicPr>
         <p:blipFill>
-          <a:blip r:embed="rId3"/>
+          <a:blip r:embed="rId4"/>
           <a:stretch>
             <a:fillRect/>
           </a:stretch>

</xml_diff>